<commit_message>
First draft of Week11 / CSA assignment
</commit_message>
<xml_diff>
--- a/Pictures/bsa.pptx
+++ b/Pictures/bsa.pptx
@@ -117,14 +117,733 @@
 <file path=ppt/revisionInfo.xml><?xml version="1.0" encoding="utf-8"?>
 <p1510:revInfo xmlns:a="http://schemas.openxmlformats.org/drawingml/2006/main" xmlns:r="http://schemas.openxmlformats.org/officeDocument/2006/relationships" xmlns:p1510="http://schemas.microsoft.com/office/powerpoint/2015/10/main">
   <p1510:revLst>
-    <p1510:client id="{2872F0AD-8577-4B4A-BC20-359B4B720F94}" v="9" dt="2023-11-29T09:05:03.165"/>
-    <p1510:client id="{8E8083F4-F94F-4BBA-AAC9-F729A48391AA}" v="10" dt="2023-11-28T15:06:22.494"/>
+    <p1510:client id="{20ED24BE-3B0B-4CBE-BBD2-21406D114E28}" v="31" dt="2025-11-24T08:10:22.843"/>
   </p1510:revLst>
 </p1510:revInfo>
 </file>
 
 <file path=ppt/changesInfos/changesInfo1.xml><?xml version="1.0" encoding="utf-8"?>
 <pc:chgInfo xmlns:a="http://schemas.openxmlformats.org/drawingml/2006/main" xmlns:r="http://schemas.openxmlformats.org/officeDocument/2006/relationships" xmlns:ac="http://schemas.microsoft.com/office/drawing/2013/main/command" xmlns:pc="http://schemas.microsoft.com/office/powerpoint/2013/main/command">
+  <pc:docChgLst>
+    <pc:chgData name="Neill Campbell" userId="0c68e68e-714c-4571-8b4e-7246b46ba3fc" providerId="ADAL" clId="{9ECE9524-8A2C-456E-BC9E-5009EA46B350}"/>
+    <pc:docChg chg="undo custSel modSld">
+      <pc:chgData name="Neill Campbell" userId="0c68e68e-714c-4571-8b4e-7246b46ba3fc" providerId="ADAL" clId="{9ECE9524-8A2C-456E-BC9E-5009EA46B350}" dt="2025-11-24T08:12:52.127" v="465" actId="20577"/>
+      <pc:docMkLst>
+        <pc:docMk/>
+      </pc:docMkLst>
+      <pc:sldChg chg="addSp delSp modSp mod">
+        <pc:chgData name="Neill Campbell" userId="0c68e68e-714c-4571-8b4e-7246b46ba3fc" providerId="ADAL" clId="{9ECE9524-8A2C-456E-BC9E-5009EA46B350}" dt="2025-11-24T08:12:52.127" v="465" actId="20577"/>
+        <pc:sldMkLst>
+          <pc:docMk/>
+          <pc:sldMk cId="3630180020" sldId="257"/>
+        </pc:sldMkLst>
+        <pc:spChg chg="del">
+          <ac:chgData name="Neill Campbell" userId="0c68e68e-714c-4571-8b4e-7246b46ba3fc" providerId="ADAL" clId="{9ECE9524-8A2C-456E-BC9E-5009EA46B350}" dt="2025-11-24T07:53:01.993" v="61" actId="478"/>
+          <ac:spMkLst>
+            <pc:docMk/>
+            <pc:sldMk cId="3630180020" sldId="257"/>
+            <ac:spMk id="2" creationId="{E4FDFC28-7759-14E9-F18A-3CB485C95895}"/>
+          </ac:spMkLst>
+        </pc:spChg>
+        <pc:spChg chg="del">
+          <ac:chgData name="Neill Campbell" userId="0c68e68e-714c-4571-8b4e-7246b46ba3fc" providerId="ADAL" clId="{9ECE9524-8A2C-456E-BC9E-5009EA46B350}" dt="2025-11-24T07:52:52.024" v="55" actId="478"/>
+          <ac:spMkLst>
+            <pc:docMk/>
+            <pc:sldMk cId="3630180020" sldId="257"/>
+            <ac:spMk id="3" creationId="{F0F5982E-C8AA-B336-7B9C-53D9D5CFF57A}"/>
+          </ac:spMkLst>
+        </pc:spChg>
+        <pc:spChg chg="del">
+          <ac:chgData name="Neill Campbell" userId="0c68e68e-714c-4571-8b4e-7246b46ba3fc" providerId="ADAL" clId="{9ECE9524-8A2C-456E-BC9E-5009EA46B350}" dt="2025-11-24T07:53:01.993" v="61" actId="478"/>
+          <ac:spMkLst>
+            <pc:docMk/>
+            <pc:sldMk cId="3630180020" sldId="257"/>
+            <ac:spMk id="4" creationId="{B578E923-9CE7-614B-1115-25BEC7C7152C}"/>
+          </ac:spMkLst>
+        </pc:spChg>
+        <pc:spChg chg="del">
+          <ac:chgData name="Neill Campbell" userId="0c68e68e-714c-4571-8b4e-7246b46ba3fc" providerId="ADAL" clId="{9ECE9524-8A2C-456E-BC9E-5009EA46B350}" dt="2025-11-24T07:53:01.993" v="61" actId="478"/>
+          <ac:spMkLst>
+            <pc:docMk/>
+            <pc:sldMk cId="3630180020" sldId="257"/>
+            <ac:spMk id="5" creationId="{69CE46A2-C57D-45E3-5AA1-7A21154BE631}"/>
+          </ac:spMkLst>
+        </pc:spChg>
+        <pc:spChg chg="del">
+          <ac:chgData name="Neill Campbell" userId="0c68e68e-714c-4571-8b4e-7246b46ba3fc" providerId="ADAL" clId="{9ECE9524-8A2C-456E-BC9E-5009EA46B350}" dt="2025-11-24T07:53:01.993" v="61" actId="478"/>
+          <ac:spMkLst>
+            <pc:docMk/>
+            <pc:sldMk cId="3630180020" sldId="257"/>
+            <ac:spMk id="6" creationId="{553E75FF-3503-4E90-6B60-811E91DC3CA5}"/>
+          </ac:spMkLst>
+        </pc:spChg>
+        <pc:spChg chg="del">
+          <ac:chgData name="Neill Campbell" userId="0c68e68e-714c-4571-8b4e-7246b46ba3fc" providerId="ADAL" clId="{9ECE9524-8A2C-456E-BC9E-5009EA46B350}" dt="2025-11-24T07:53:01.993" v="61" actId="478"/>
+          <ac:spMkLst>
+            <pc:docMk/>
+            <pc:sldMk cId="3630180020" sldId="257"/>
+            <ac:spMk id="7" creationId="{A629C68F-2AC3-7FDD-FE9E-D1C7540178C5}"/>
+          </ac:spMkLst>
+        </pc:spChg>
+        <pc:spChg chg="mod">
+          <ac:chgData name="Neill Campbell" userId="0c68e68e-714c-4571-8b4e-7246b46ba3fc" providerId="ADAL" clId="{9ECE9524-8A2C-456E-BC9E-5009EA46B350}" dt="2025-11-24T08:09:15.719" v="245" actId="1076"/>
+          <ac:spMkLst>
+            <pc:docMk/>
+            <pc:sldMk cId="3630180020" sldId="257"/>
+            <ac:spMk id="8" creationId="{8ED5562F-7F71-2A62-8990-7B685D94BFBF}"/>
+          </ac:spMkLst>
+        </pc:spChg>
+        <pc:spChg chg="del">
+          <ac:chgData name="Neill Campbell" userId="0c68e68e-714c-4571-8b4e-7246b46ba3fc" providerId="ADAL" clId="{9ECE9524-8A2C-456E-BC9E-5009EA46B350}" dt="2025-11-24T07:52:52.024" v="55" actId="478"/>
+          <ac:spMkLst>
+            <pc:docMk/>
+            <pc:sldMk cId="3630180020" sldId="257"/>
+            <ac:spMk id="9" creationId="{2F289767-1E89-5F3D-EDE9-92C79F22B3BA}"/>
+          </ac:spMkLst>
+        </pc:spChg>
+        <pc:spChg chg="del">
+          <ac:chgData name="Neill Campbell" userId="0c68e68e-714c-4571-8b4e-7246b46ba3fc" providerId="ADAL" clId="{9ECE9524-8A2C-456E-BC9E-5009EA46B350}" dt="2025-11-24T07:52:53.413" v="56" actId="478"/>
+          <ac:spMkLst>
+            <pc:docMk/>
+            <pc:sldMk cId="3630180020" sldId="257"/>
+            <ac:spMk id="10" creationId="{D92C8AAE-4615-E2DD-5A35-AE346279F78A}"/>
+          </ac:spMkLst>
+        </pc:spChg>
+        <pc:spChg chg="del">
+          <ac:chgData name="Neill Campbell" userId="0c68e68e-714c-4571-8b4e-7246b46ba3fc" providerId="ADAL" clId="{9ECE9524-8A2C-456E-BC9E-5009EA46B350}" dt="2025-11-24T07:53:03.739" v="62" actId="478"/>
+          <ac:spMkLst>
+            <pc:docMk/>
+            <pc:sldMk cId="3630180020" sldId="257"/>
+            <ac:spMk id="11" creationId="{840E0AEB-3CF8-3E07-5CA2-88B7F493698A}"/>
+          </ac:spMkLst>
+        </pc:spChg>
+        <pc:spChg chg="del">
+          <ac:chgData name="Neill Campbell" userId="0c68e68e-714c-4571-8b4e-7246b46ba3fc" providerId="ADAL" clId="{9ECE9524-8A2C-456E-BC9E-5009EA46B350}" dt="2025-11-24T07:53:03.739" v="62" actId="478"/>
+          <ac:spMkLst>
+            <pc:docMk/>
+            <pc:sldMk cId="3630180020" sldId="257"/>
+            <ac:spMk id="12" creationId="{107654D5-60FE-9772-AE17-148F5AA0CAB5}"/>
+          </ac:spMkLst>
+        </pc:spChg>
+        <pc:spChg chg="add mod">
+          <ac:chgData name="Neill Campbell" userId="0c68e68e-714c-4571-8b4e-7246b46ba3fc" providerId="ADAL" clId="{9ECE9524-8A2C-456E-BC9E-5009EA46B350}" dt="2025-11-24T08:01:05.723" v="118" actId="12789"/>
+          <ac:spMkLst>
+            <pc:docMk/>
+            <pc:sldMk cId="3630180020" sldId="257"/>
+            <ac:spMk id="14" creationId="{DC4EAB14-77F5-E6D2-ED11-DA813EC80E7B}"/>
+          </ac:spMkLst>
+        </pc:spChg>
+        <pc:spChg chg="add del mod">
+          <ac:chgData name="Neill Campbell" userId="0c68e68e-714c-4571-8b4e-7246b46ba3fc" providerId="ADAL" clId="{9ECE9524-8A2C-456E-BC9E-5009EA46B350}" dt="2025-11-24T08:00:26.564" v="113" actId="478"/>
+          <ac:spMkLst>
+            <pc:docMk/>
+            <pc:sldMk cId="3630180020" sldId="257"/>
+            <ac:spMk id="16" creationId="{5DDE88AF-4C6C-2A39-E7F1-4AD99646A395}"/>
+          </ac:spMkLst>
+        </pc:spChg>
+        <pc:spChg chg="del mod">
+          <ac:chgData name="Neill Campbell" userId="0c68e68e-714c-4571-8b4e-7246b46ba3fc" providerId="ADAL" clId="{9ECE9524-8A2C-456E-BC9E-5009EA46B350}" dt="2025-11-24T07:58:50.542" v="105" actId="478"/>
+          <ac:spMkLst>
+            <pc:docMk/>
+            <pc:sldMk cId="3630180020" sldId="257"/>
+            <ac:spMk id="17" creationId="{736823E6-B07C-858B-8A07-9222F666CA28}"/>
+          </ac:spMkLst>
+        </pc:spChg>
+        <pc:spChg chg="del mod">
+          <ac:chgData name="Neill Campbell" userId="0c68e68e-714c-4571-8b4e-7246b46ba3fc" providerId="ADAL" clId="{9ECE9524-8A2C-456E-BC9E-5009EA46B350}" dt="2025-11-24T07:58:50.542" v="105" actId="478"/>
+          <ac:spMkLst>
+            <pc:docMk/>
+            <pc:sldMk cId="3630180020" sldId="257"/>
+            <ac:spMk id="18" creationId="{69F893B2-8CBF-39D9-9249-170A9ED36F70}"/>
+          </ac:spMkLst>
+        </pc:spChg>
+        <pc:spChg chg="del mod">
+          <ac:chgData name="Neill Campbell" userId="0c68e68e-714c-4571-8b4e-7246b46ba3fc" providerId="ADAL" clId="{9ECE9524-8A2C-456E-BC9E-5009EA46B350}" dt="2025-11-24T07:58:50.542" v="105" actId="478"/>
+          <ac:spMkLst>
+            <pc:docMk/>
+            <pc:sldMk cId="3630180020" sldId="257"/>
+            <ac:spMk id="19" creationId="{093E9589-0C51-1952-9EAD-335864EE6654}"/>
+          </ac:spMkLst>
+        </pc:spChg>
+        <pc:spChg chg="del mod">
+          <ac:chgData name="Neill Campbell" userId="0c68e68e-714c-4571-8b4e-7246b46ba3fc" providerId="ADAL" clId="{9ECE9524-8A2C-456E-BC9E-5009EA46B350}" dt="2025-11-24T07:58:50.542" v="105" actId="478"/>
+          <ac:spMkLst>
+            <pc:docMk/>
+            <pc:sldMk cId="3630180020" sldId="257"/>
+            <ac:spMk id="20" creationId="{690468A8-7F2B-3EFB-DF32-E1EBF37F6AA1}"/>
+          </ac:spMkLst>
+        </pc:spChg>
+        <pc:spChg chg="del mod">
+          <ac:chgData name="Neill Campbell" userId="0c68e68e-714c-4571-8b4e-7246b46ba3fc" providerId="ADAL" clId="{9ECE9524-8A2C-456E-BC9E-5009EA46B350}" dt="2025-11-24T08:00:26.564" v="113" actId="478"/>
+          <ac:spMkLst>
+            <pc:docMk/>
+            <pc:sldMk cId="3630180020" sldId="257"/>
+            <ac:spMk id="21" creationId="{1A3EB27A-29BA-5F19-D88A-208F8CA8312A}"/>
+          </ac:spMkLst>
+        </pc:spChg>
+        <pc:spChg chg="del mod">
+          <ac:chgData name="Neill Campbell" userId="0c68e68e-714c-4571-8b4e-7246b46ba3fc" providerId="ADAL" clId="{9ECE9524-8A2C-456E-BC9E-5009EA46B350}" dt="2025-11-24T08:00:26.564" v="113" actId="478"/>
+          <ac:spMkLst>
+            <pc:docMk/>
+            <pc:sldMk cId="3630180020" sldId="257"/>
+            <ac:spMk id="22" creationId="{4660CBEA-96EA-3821-FBEC-2C821C644621}"/>
+          </ac:spMkLst>
+        </pc:spChg>
+        <pc:spChg chg="del mod">
+          <ac:chgData name="Neill Campbell" userId="0c68e68e-714c-4571-8b4e-7246b46ba3fc" providerId="ADAL" clId="{9ECE9524-8A2C-456E-BC9E-5009EA46B350}" dt="2025-11-24T08:00:26.564" v="113" actId="478"/>
+          <ac:spMkLst>
+            <pc:docMk/>
+            <pc:sldMk cId="3630180020" sldId="257"/>
+            <ac:spMk id="23" creationId="{0FDD5E12-AA74-CE8A-E035-0740E0216DC1}"/>
+          </ac:spMkLst>
+        </pc:spChg>
+        <pc:spChg chg="del mod">
+          <ac:chgData name="Neill Campbell" userId="0c68e68e-714c-4571-8b4e-7246b46ba3fc" providerId="ADAL" clId="{9ECE9524-8A2C-456E-BC9E-5009EA46B350}" dt="2025-11-24T08:00:26.564" v="113" actId="478"/>
+          <ac:spMkLst>
+            <pc:docMk/>
+            <pc:sldMk cId="3630180020" sldId="257"/>
+            <ac:spMk id="24" creationId="{4A090EF1-6793-7F91-0CA2-96EEEB00CE4B}"/>
+          </ac:spMkLst>
+        </pc:spChg>
+        <pc:spChg chg="add del mod">
+          <ac:chgData name="Neill Campbell" userId="0c68e68e-714c-4571-8b4e-7246b46ba3fc" providerId="ADAL" clId="{9ECE9524-8A2C-456E-BC9E-5009EA46B350}" dt="2025-11-24T08:00:26.564" v="113" actId="478"/>
+          <ac:spMkLst>
+            <pc:docMk/>
+            <pc:sldMk cId="3630180020" sldId="257"/>
+            <ac:spMk id="26" creationId="{2D771C55-B478-5A86-40C3-12FE249073F5}"/>
+          </ac:spMkLst>
+        </pc:spChg>
+        <pc:spChg chg="del">
+          <ac:chgData name="Neill Campbell" userId="0c68e68e-714c-4571-8b4e-7246b46ba3fc" providerId="ADAL" clId="{9ECE9524-8A2C-456E-BC9E-5009EA46B350}" dt="2025-11-24T07:52:56.201" v="58" actId="478"/>
+          <ac:spMkLst>
+            <pc:docMk/>
+            <pc:sldMk cId="3630180020" sldId="257"/>
+            <ac:spMk id="30" creationId="{9EA753D1-22D4-0DD5-32D8-9CBDEBC004AA}"/>
+          </ac:spMkLst>
+        </pc:spChg>
+        <pc:spChg chg="add del mod">
+          <ac:chgData name="Neill Campbell" userId="0c68e68e-714c-4571-8b4e-7246b46ba3fc" providerId="ADAL" clId="{9ECE9524-8A2C-456E-BC9E-5009EA46B350}" dt="2025-11-24T08:00:26.564" v="113" actId="478"/>
+          <ac:spMkLst>
+            <pc:docMk/>
+            <pc:sldMk cId="3630180020" sldId="257"/>
+            <ac:spMk id="31" creationId="{4CB971DA-0602-9E8D-764E-B4A4C671DB11}"/>
+          </ac:spMkLst>
+        </pc:spChg>
+        <pc:spChg chg="del">
+          <ac:chgData name="Neill Campbell" userId="0c68e68e-714c-4571-8b4e-7246b46ba3fc" providerId="ADAL" clId="{9ECE9524-8A2C-456E-BC9E-5009EA46B350}" dt="2025-11-24T07:52:54.702" v="57" actId="478"/>
+          <ac:spMkLst>
+            <pc:docMk/>
+            <pc:sldMk cId="3630180020" sldId="257"/>
+            <ac:spMk id="32" creationId="{13021375-BA68-5A67-D51C-1B437C075942}"/>
+          </ac:spMkLst>
+        </pc:spChg>
+        <pc:spChg chg="del">
+          <ac:chgData name="Neill Campbell" userId="0c68e68e-714c-4571-8b4e-7246b46ba3fc" providerId="ADAL" clId="{9ECE9524-8A2C-456E-BC9E-5009EA46B350}" dt="2025-11-24T07:52:57.131" v="59" actId="478"/>
+          <ac:spMkLst>
+            <pc:docMk/>
+            <pc:sldMk cId="3630180020" sldId="257"/>
+            <ac:spMk id="33" creationId="{CDF8F6E1-6D58-9152-635B-C32182B4B316}"/>
+          </ac:spMkLst>
+        </pc:spChg>
+        <pc:spChg chg="del">
+          <ac:chgData name="Neill Campbell" userId="0c68e68e-714c-4571-8b4e-7246b46ba3fc" providerId="ADAL" clId="{9ECE9524-8A2C-456E-BC9E-5009EA46B350}" dt="2025-11-24T07:53:01.993" v="61" actId="478"/>
+          <ac:spMkLst>
+            <pc:docMk/>
+            <pc:sldMk cId="3630180020" sldId="257"/>
+            <ac:spMk id="34" creationId="{60A9B999-AB80-E27F-E282-82B966A29EEE}"/>
+          </ac:spMkLst>
+        </pc:spChg>
+        <pc:spChg chg="del">
+          <ac:chgData name="Neill Campbell" userId="0c68e68e-714c-4571-8b4e-7246b46ba3fc" providerId="ADAL" clId="{9ECE9524-8A2C-456E-BC9E-5009EA46B350}" dt="2025-11-24T07:52:52.024" v="55" actId="478"/>
+          <ac:spMkLst>
+            <pc:docMk/>
+            <pc:sldMk cId="3630180020" sldId="257"/>
+            <ac:spMk id="36" creationId="{3147626C-0688-E86E-3C8A-53DF37C73CFC}"/>
+          </ac:spMkLst>
+        </pc:spChg>
+        <pc:spChg chg="add del mod">
+          <ac:chgData name="Neill Campbell" userId="0c68e68e-714c-4571-8b4e-7246b46ba3fc" providerId="ADAL" clId="{9ECE9524-8A2C-456E-BC9E-5009EA46B350}" dt="2025-11-24T08:00:26.564" v="113" actId="478"/>
+          <ac:spMkLst>
+            <pc:docMk/>
+            <pc:sldMk cId="3630180020" sldId="257"/>
+            <ac:spMk id="37" creationId="{A70A4956-5C59-8AE1-2F22-33B14DD9B27B}"/>
+          </ac:spMkLst>
+        </pc:spChg>
+        <pc:spChg chg="add del mod">
+          <ac:chgData name="Neill Campbell" userId="0c68e68e-714c-4571-8b4e-7246b46ba3fc" providerId="ADAL" clId="{9ECE9524-8A2C-456E-BC9E-5009EA46B350}" dt="2025-11-24T07:58:50.542" v="105" actId="478"/>
+          <ac:spMkLst>
+            <pc:docMk/>
+            <pc:sldMk cId="3630180020" sldId="257"/>
+            <ac:spMk id="38" creationId="{044B2C2E-FEC3-ED84-38AC-D23AF5E0A75F}"/>
+          </ac:spMkLst>
+        </pc:spChg>
+        <pc:spChg chg="add mod">
+          <ac:chgData name="Neill Campbell" userId="0c68e68e-714c-4571-8b4e-7246b46ba3fc" providerId="ADAL" clId="{9ECE9524-8A2C-456E-BC9E-5009EA46B350}" dt="2025-11-24T07:58:56.483" v="106" actId="164"/>
+          <ac:spMkLst>
+            <pc:docMk/>
+            <pc:sldMk cId="3630180020" sldId="257"/>
+            <ac:spMk id="39" creationId="{72AA7F65-6A7B-C7DA-536B-B366CEC7D51B}"/>
+          </ac:spMkLst>
+        </pc:spChg>
+        <pc:spChg chg="add mod">
+          <ac:chgData name="Neill Campbell" userId="0c68e68e-714c-4571-8b4e-7246b46ba3fc" providerId="ADAL" clId="{9ECE9524-8A2C-456E-BC9E-5009EA46B350}" dt="2025-11-24T07:54:10.307" v="70"/>
+          <ac:spMkLst>
+            <pc:docMk/>
+            <pc:sldMk cId="3630180020" sldId="257"/>
+            <ac:spMk id="40" creationId="{9B11E350-39E8-8B14-3054-584CD7717040}"/>
+          </ac:spMkLst>
+        </pc:spChg>
+        <pc:spChg chg="add mod">
+          <ac:chgData name="Neill Campbell" userId="0c68e68e-714c-4571-8b4e-7246b46ba3fc" providerId="ADAL" clId="{9ECE9524-8A2C-456E-BC9E-5009EA46B350}" dt="2025-11-24T07:54:11.195" v="71"/>
+          <ac:spMkLst>
+            <pc:docMk/>
+            <pc:sldMk cId="3630180020" sldId="257"/>
+            <ac:spMk id="41" creationId="{8E710704-FBB6-671D-BCB9-79904FC335C2}"/>
+          </ac:spMkLst>
+        </pc:spChg>
+        <pc:spChg chg="add mod">
+          <ac:chgData name="Neill Campbell" userId="0c68e68e-714c-4571-8b4e-7246b46ba3fc" providerId="ADAL" clId="{9ECE9524-8A2C-456E-BC9E-5009EA46B350}" dt="2025-11-24T07:54:12.182" v="72"/>
+          <ac:spMkLst>
+            <pc:docMk/>
+            <pc:sldMk cId="3630180020" sldId="257"/>
+            <ac:spMk id="42" creationId="{C1EA2B7B-E42F-6968-35FC-8EAC60FA6619}"/>
+          </ac:spMkLst>
+        </pc:spChg>
+        <pc:spChg chg="add mod">
+          <ac:chgData name="Neill Campbell" userId="0c68e68e-714c-4571-8b4e-7246b46ba3fc" providerId="ADAL" clId="{9ECE9524-8A2C-456E-BC9E-5009EA46B350}" dt="2025-11-24T08:08:26.371" v="243" actId="2711"/>
+          <ac:spMkLst>
+            <pc:docMk/>
+            <pc:sldMk cId="3630180020" sldId="257"/>
+            <ac:spMk id="44" creationId="{0A18E6F5-B686-E202-2154-C3338B5E566A}"/>
+          </ac:spMkLst>
+        </pc:spChg>
+        <pc:spChg chg="add del mod">
+          <ac:chgData name="Neill Campbell" userId="0c68e68e-714c-4571-8b4e-7246b46ba3fc" providerId="ADAL" clId="{9ECE9524-8A2C-456E-BC9E-5009EA46B350}" dt="2025-11-24T07:58:50.542" v="105" actId="478"/>
+          <ac:spMkLst>
+            <pc:docMk/>
+            <pc:sldMk cId="3630180020" sldId="257"/>
+            <ac:spMk id="45" creationId="{1614F22F-821D-196A-020A-63AEF80B7062}"/>
+          </ac:spMkLst>
+        </pc:spChg>
+        <pc:spChg chg="add del mod">
+          <ac:chgData name="Neill Campbell" userId="0c68e68e-714c-4571-8b4e-7246b46ba3fc" providerId="ADAL" clId="{9ECE9524-8A2C-456E-BC9E-5009EA46B350}" dt="2025-11-24T07:58:50.542" v="105" actId="478"/>
+          <ac:spMkLst>
+            <pc:docMk/>
+            <pc:sldMk cId="3630180020" sldId="257"/>
+            <ac:spMk id="46" creationId="{159E2200-254D-100F-524D-FF5B589E4CE2}"/>
+          </ac:spMkLst>
+        </pc:spChg>
+        <pc:spChg chg="add del mod">
+          <ac:chgData name="Neill Campbell" userId="0c68e68e-714c-4571-8b4e-7246b46ba3fc" providerId="ADAL" clId="{9ECE9524-8A2C-456E-BC9E-5009EA46B350}" dt="2025-11-24T07:58:50.542" v="105" actId="478"/>
+          <ac:spMkLst>
+            <pc:docMk/>
+            <pc:sldMk cId="3630180020" sldId="257"/>
+            <ac:spMk id="47" creationId="{C5BDABF6-CEAE-4E77-5871-B11D8514D68D}"/>
+          </ac:spMkLst>
+        </pc:spChg>
+        <pc:spChg chg="add mod">
+          <ac:chgData name="Neill Campbell" userId="0c68e68e-714c-4571-8b4e-7246b46ba3fc" providerId="ADAL" clId="{9ECE9524-8A2C-456E-BC9E-5009EA46B350}" dt="2025-11-24T07:59:00.446" v="107" actId="164"/>
+          <ac:spMkLst>
+            <pc:docMk/>
+            <pc:sldMk cId="3630180020" sldId="257"/>
+            <ac:spMk id="48" creationId="{52D29309-BEE7-3AA7-34A5-5C97B28316F5}"/>
+          </ac:spMkLst>
+        </pc:spChg>
+        <pc:spChg chg="add mod">
+          <ac:chgData name="Neill Campbell" userId="0c68e68e-714c-4571-8b4e-7246b46ba3fc" providerId="ADAL" clId="{9ECE9524-8A2C-456E-BC9E-5009EA46B350}" dt="2025-11-24T08:01:47.430" v="123" actId="20577"/>
+          <ac:spMkLst>
+            <pc:docMk/>
+            <pc:sldMk cId="3630180020" sldId="257"/>
+            <ac:spMk id="49" creationId="{938F3B00-F4AC-45CF-6B93-7DB64A17B805}"/>
+          </ac:spMkLst>
+        </pc:spChg>
+        <pc:spChg chg="mod">
+          <ac:chgData name="Neill Campbell" userId="0c68e68e-714c-4571-8b4e-7246b46ba3fc" providerId="ADAL" clId="{9ECE9524-8A2C-456E-BC9E-5009EA46B350}" dt="2025-11-24T08:08:26.371" v="243" actId="2711"/>
+          <ac:spMkLst>
+            <pc:docMk/>
+            <pc:sldMk cId="3630180020" sldId="257"/>
+            <ac:spMk id="53" creationId="{BD148734-C86C-447D-FFC7-27C52D221F22}"/>
+          </ac:spMkLst>
+        </pc:spChg>
+        <pc:spChg chg="mod">
+          <ac:chgData name="Neill Campbell" userId="0c68e68e-714c-4571-8b4e-7246b46ba3fc" providerId="ADAL" clId="{9ECE9524-8A2C-456E-BC9E-5009EA46B350}" dt="2025-11-24T08:08:26.371" v="243" actId="2711"/>
+          <ac:spMkLst>
+            <pc:docMk/>
+            <pc:sldMk cId="3630180020" sldId="257"/>
+            <ac:spMk id="54" creationId="{039D0F38-C41C-B2A7-AC4E-EEE869D2FC07}"/>
+          </ac:spMkLst>
+        </pc:spChg>
+        <pc:spChg chg="mod">
+          <ac:chgData name="Neill Campbell" userId="0c68e68e-714c-4571-8b4e-7246b46ba3fc" providerId="ADAL" clId="{9ECE9524-8A2C-456E-BC9E-5009EA46B350}" dt="2025-11-24T08:00:04.028" v="110"/>
+          <ac:spMkLst>
+            <pc:docMk/>
+            <pc:sldMk cId="3630180020" sldId="257"/>
+            <ac:spMk id="56" creationId="{9A8FCC09-3D8A-ED6A-1DF4-4549E9534963}"/>
+          </ac:spMkLst>
+        </pc:spChg>
+        <pc:spChg chg="mod">
+          <ac:chgData name="Neill Campbell" userId="0c68e68e-714c-4571-8b4e-7246b46ba3fc" providerId="ADAL" clId="{9ECE9524-8A2C-456E-BC9E-5009EA46B350}" dt="2025-11-24T08:08:26.371" v="243" actId="2711"/>
+          <ac:spMkLst>
+            <pc:docMk/>
+            <pc:sldMk cId="3630180020" sldId="257"/>
+            <ac:spMk id="57" creationId="{C68B50A5-A71C-CE96-C62C-B05A71517C88}"/>
+          </ac:spMkLst>
+        </pc:spChg>
+        <pc:spChg chg="mod">
+          <ac:chgData name="Neill Campbell" userId="0c68e68e-714c-4571-8b4e-7246b46ba3fc" providerId="ADAL" clId="{9ECE9524-8A2C-456E-BC9E-5009EA46B350}" dt="2025-11-24T08:08:26.371" v="243" actId="2711"/>
+          <ac:spMkLst>
+            <pc:docMk/>
+            <pc:sldMk cId="3630180020" sldId="257"/>
+            <ac:spMk id="59" creationId="{A2BA69F1-85BC-B80D-1F15-E4BF8AF83E7F}"/>
+          </ac:spMkLst>
+        </pc:spChg>
+        <pc:spChg chg="mod">
+          <ac:chgData name="Neill Campbell" userId="0c68e68e-714c-4571-8b4e-7246b46ba3fc" providerId="ADAL" clId="{9ECE9524-8A2C-456E-BC9E-5009EA46B350}" dt="2025-11-24T08:08:26.371" v="243" actId="2711"/>
+          <ac:spMkLst>
+            <pc:docMk/>
+            <pc:sldMk cId="3630180020" sldId="257"/>
+            <ac:spMk id="60" creationId="{50B82765-85AF-B67E-30EE-B1D2A0D40960}"/>
+          </ac:spMkLst>
+        </pc:spChg>
+        <pc:spChg chg="mod">
+          <ac:chgData name="Neill Campbell" userId="0c68e68e-714c-4571-8b4e-7246b46ba3fc" providerId="ADAL" clId="{9ECE9524-8A2C-456E-BC9E-5009EA46B350}" dt="2025-11-24T08:00:39.828" v="116"/>
+          <ac:spMkLst>
+            <pc:docMk/>
+            <pc:sldMk cId="3630180020" sldId="257"/>
+            <ac:spMk id="62" creationId="{5D50A1CD-A471-D864-566A-75BD948AE061}"/>
+          </ac:spMkLst>
+        </pc:spChg>
+        <pc:spChg chg="mod">
+          <ac:chgData name="Neill Campbell" userId="0c68e68e-714c-4571-8b4e-7246b46ba3fc" providerId="ADAL" clId="{9ECE9524-8A2C-456E-BC9E-5009EA46B350}" dt="2025-11-24T08:02:02.992" v="126" actId="20577"/>
+          <ac:spMkLst>
+            <pc:docMk/>
+            <pc:sldMk cId="3630180020" sldId="257"/>
+            <ac:spMk id="63" creationId="{E9599E8B-451A-29BE-6E4A-7C278951E670}"/>
+          </ac:spMkLst>
+        </pc:spChg>
+        <pc:spChg chg="mod">
+          <ac:chgData name="Neill Campbell" userId="0c68e68e-714c-4571-8b4e-7246b46ba3fc" providerId="ADAL" clId="{9ECE9524-8A2C-456E-BC9E-5009EA46B350}" dt="2025-11-24T08:00:39.828" v="116"/>
+          <ac:spMkLst>
+            <pc:docMk/>
+            <pc:sldMk cId="3630180020" sldId="257"/>
+            <ac:spMk id="65" creationId="{A3AB3DA2-E92C-F028-D671-12F1118341EF}"/>
+          </ac:spMkLst>
+        </pc:spChg>
+        <pc:spChg chg="mod">
+          <ac:chgData name="Neill Campbell" userId="0c68e68e-714c-4571-8b4e-7246b46ba3fc" providerId="ADAL" clId="{9ECE9524-8A2C-456E-BC9E-5009EA46B350}" dt="2025-11-24T08:00:39.828" v="116"/>
+          <ac:spMkLst>
+            <pc:docMk/>
+            <pc:sldMk cId="3630180020" sldId="257"/>
+            <ac:spMk id="66" creationId="{E46A9AF1-718E-DE74-5F76-6D67D86B74B6}"/>
+          </ac:spMkLst>
+        </pc:spChg>
+        <pc:spChg chg="mod">
+          <ac:chgData name="Neill Campbell" userId="0c68e68e-714c-4571-8b4e-7246b46ba3fc" providerId="ADAL" clId="{9ECE9524-8A2C-456E-BC9E-5009EA46B350}" dt="2025-11-24T08:00:39.828" v="116"/>
+          <ac:spMkLst>
+            <pc:docMk/>
+            <pc:sldMk cId="3630180020" sldId="257"/>
+            <ac:spMk id="68" creationId="{A748057A-775B-F705-D2B6-33CA648C903E}"/>
+          </ac:spMkLst>
+        </pc:spChg>
+        <pc:spChg chg="mod">
+          <ac:chgData name="Neill Campbell" userId="0c68e68e-714c-4571-8b4e-7246b46ba3fc" providerId="ADAL" clId="{9ECE9524-8A2C-456E-BC9E-5009EA46B350}" dt="2025-11-24T08:01:58.834" v="125" actId="20577"/>
+          <ac:spMkLst>
+            <pc:docMk/>
+            <pc:sldMk cId="3630180020" sldId="257"/>
+            <ac:spMk id="69" creationId="{D8F624E4-6A7F-0B2B-3057-F3FE605CADB5}"/>
+          </ac:spMkLst>
+        </pc:spChg>
+        <pc:spChg chg="mod">
+          <ac:chgData name="Neill Campbell" userId="0c68e68e-714c-4571-8b4e-7246b46ba3fc" providerId="ADAL" clId="{9ECE9524-8A2C-456E-BC9E-5009EA46B350}" dt="2025-11-24T08:00:39.828" v="116"/>
+          <ac:spMkLst>
+            <pc:docMk/>
+            <pc:sldMk cId="3630180020" sldId="257"/>
+            <ac:spMk id="71" creationId="{A1543095-8981-3B92-2450-4AEE2639494A}"/>
+          </ac:spMkLst>
+        </pc:spChg>
+        <pc:spChg chg="mod">
+          <ac:chgData name="Neill Campbell" userId="0c68e68e-714c-4571-8b4e-7246b46ba3fc" providerId="ADAL" clId="{9ECE9524-8A2C-456E-BC9E-5009EA46B350}" dt="2025-11-24T08:00:39.828" v="116"/>
+          <ac:spMkLst>
+            <pc:docMk/>
+            <pc:sldMk cId="3630180020" sldId="257"/>
+            <ac:spMk id="72" creationId="{3885C96F-E8E7-6488-2189-B32458B35C62}"/>
+          </ac:spMkLst>
+        </pc:spChg>
+        <pc:spChg chg="mod">
+          <ac:chgData name="Neill Campbell" userId="0c68e68e-714c-4571-8b4e-7246b46ba3fc" providerId="ADAL" clId="{9ECE9524-8A2C-456E-BC9E-5009EA46B350}" dt="2025-11-24T08:01:29.234" v="120"/>
+          <ac:spMkLst>
+            <pc:docMk/>
+            <pc:sldMk cId="3630180020" sldId="257"/>
+            <ac:spMk id="74" creationId="{704AB8FB-32CD-C54A-51DC-B114443C4702}"/>
+          </ac:spMkLst>
+        </pc:spChg>
+        <pc:spChg chg="mod">
+          <ac:chgData name="Neill Campbell" userId="0c68e68e-714c-4571-8b4e-7246b46ba3fc" providerId="ADAL" clId="{9ECE9524-8A2C-456E-BC9E-5009EA46B350}" dt="2025-11-24T08:01:52.296" v="124" actId="20577"/>
+          <ac:spMkLst>
+            <pc:docMk/>
+            <pc:sldMk cId="3630180020" sldId="257"/>
+            <ac:spMk id="75" creationId="{F1BA94B4-9D60-A697-E2D3-307568F5A371}"/>
+          </ac:spMkLst>
+        </pc:spChg>
+        <pc:spChg chg="add mod">
+          <ac:chgData name="Neill Campbell" userId="0c68e68e-714c-4571-8b4e-7246b46ba3fc" providerId="ADAL" clId="{9ECE9524-8A2C-456E-BC9E-5009EA46B350}" dt="2025-11-24T08:08:26.371" v="243" actId="2711"/>
+          <ac:spMkLst>
+            <pc:docMk/>
+            <pc:sldMk cId="3630180020" sldId="257"/>
+            <ac:spMk id="77" creationId="{665BAAC0-766A-37C0-7088-25D10726ED11}"/>
+          </ac:spMkLst>
+        </pc:spChg>
+        <pc:spChg chg="add mod">
+          <ac:chgData name="Neill Campbell" userId="0c68e68e-714c-4571-8b4e-7246b46ba3fc" providerId="ADAL" clId="{9ECE9524-8A2C-456E-BC9E-5009EA46B350}" dt="2025-11-24T08:09:15.719" v="245" actId="1076"/>
+          <ac:spMkLst>
+            <pc:docMk/>
+            <pc:sldMk cId="3630180020" sldId="257"/>
+            <ac:spMk id="78" creationId="{35667B3F-D3E7-1B50-7041-8FE0F0065936}"/>
+          </ac:spMkLst>
+        </pc:spChg>
+        <pc:spChg chg="add del mod">
+          <ac:chgData name="Neill Campbell" userId="0c68e68e-714c-4571-8b4e-7246b46ba3fc" providerId="ADAL" clId="{9ECE9524-8A2C-456E-BC9E-5009EA46B350}" dt="2025-11-24T08:04:25.446" v="158" actId="478"/>
+          <ac:spMkLst>
+            <pc:docMk/>
+            <pc:sldMk cId="3630180020" sldId="257"/>
+            <ac:spMk id="79" creationId="{CA93F00A-DD19-9EA2-9BC7-9E28E703729E}"/>
+          </ac:spMkLst>
+        </pc:spChg>
+        <pc:spChg chg="mod">
+          <ac:chgData name="Neill Campbell" userId="0c68e68e-714c-4571-8b4e-7246b46ba3fc" providerId="ADAL" clId="{9ECE9524-8A2C-456E-BC9E-5009EA46B350}" dt="2025-11-24T08:03:51.351" v="146"/>
+          <ac:spMkLst>
+            <pc:docMk/>
+            <pc:sldMk cId="3630180020" sldId="257"/>
+            <ac:spMk id="82" creationId="{A040A789-0AA7-08EA-D24F-D9DB07D189AE}"/>
+          </ac:spMkLst>
+        </pc:spChg>
+        <pc:spChg chg="mod">
+          <ac:chgData name="Neill Campbell" userId="0c68e68e-714c-4571-8b4e-7246b46ba3fc" providerId="ADAL" clId="{9ECE9524-8A2C-456E-BC9E-5009EA46B350}" dt="2025-11-24T08:03:51.351" v="146"/>
+          <ac:spMkLst>
+            <pc:docMk/>
+            <pc:sldMk cId="3630180020" sldId="257"/>
+            <ac:spMk id="83" creationId="{339FCD83-0A49-08AC-7898-829491DB7C08}"/>
+          </ac:spMkLst>
+        </pc:spChg>
+        <pc:spChg chg="mod">
+          <ac:chgData name="Neill Campbell" userId="0c68e68e-714c-4571-8b4e-7246b46ba3fc" providerId="ADAL" clId="{9ECE9524-8A2C-456E-BC9E-5009EA46B350}" dt="2025-11-24T08:03:51.351" v="146"/>
+          <ac:spMkLst>
+            <pc:docMk/>
+            <pc:sldMk cId="3630180020" sldId="257"/>
+            <ac:spMk id="85" creationId="{B568646C-12B2-0217-536A-7EA24F481A02}"/>
+          </ac:spMkLst>
+        </pc:spChg>
+        <pc:spChg chg="mod">
+          <ac:chgData name="Neill Campbell" userId="0c68e68e-714c-4571-8b4e-7246b46ba3fc" providerId="ADAL" clId="{9ECE9524-8A2C-456E-BC9E-5009EA46B350}" dt="2025-11-24T08:03:51.351" v="146"/>
+          <ac:spMkLst>
+            <pc:docMk/>
+            <pc:sldMk cId="3630180020" sldId="257"/>
+            <ac:spMk id="86" creationId="{0210524E-A41B-E84D-3E50-010BB557BDD8}"/>
+          </ac:spMkLst>
+        </pc:spChg>
+        <pc:spChg chg="add mod">
+          <ac:chgData name="Neill Campbell" userId="0c68e68e-714c-4571-8b4e-7246b46ba3fc" providerId="ADAL" clId="{9ECE9524-8A2C-456E-BC9E-5009EA46B350}" dt="2025-11-24T08:10:19.793" v="303" actId="1076"/>
+          <ac:spMkLst>
+            <pc:docMk/>
+            <pc:sldMk cId="3630180020" sldId="257"/>
+            <ac:spMk id="87" creationId="{4F0775C5-C44F-AC8D-159A-925AF6EA6921}"/>
+          </ac:spMkLst>
+        </pc:spChg>
+        <pc:spChg chg="mod">
+          <ac:chgData name="Neill Campbell" userId="0c68e68e-714c-4571-8b4e-7246b46ba3fc" providerId="ADAL" clId="{9ECE9524-8A2C-456E-BC9E-5009EA46B350}" dt="2025-11-24T08:04:18.678" v="156"/>
+          <ac:spMkLst>
+            <pc:docMk/>
+            <pc:sldMk cId="3630180020" sldId="257"/>
+            <ac:spMk id="89" creationId="{B1CF5F8E-725D-DDD5-72F3-B954C8B2DFCF}"/>
+          </ac:spMkLst>
+        </pc:spChg>
+        <pc:spChg chg="mod">
+          <ac:chgData name="Neill Campbell" userId="0c68e68e-714c-4571-8b4e-7246b46ba3fc" providerId="ADAL" clId="{9ECE9524-8A2C-456E-BC9E-5009EA46B350}" dt="2025-11-24T08:08:26.371" v="243" actId="2711"/>
+          <ac:spMkLst>
+            <pc:docMk/>
+            <pc:sldMk cId="3630180020" sldId="257"/>
+            <ac:spMk id="90" creationId="{732A9445-8CFA-8FD9-7E87-8300DA31A51A}"/>
+          </ac:spMkLst>
+        </pc:spChg>
+        <pc:spChg chg="del mod topLvl">
+          <ac:chgData name="Neill Campbell" userId="0c68e68e-714c-4571-8b4e-7246b46ba3fc" providerId="ADAL" clId="{9ECE9524-8A2C-456E-BC9E-5009EA46B350}" dt="2025-11-24T08:05:42.992" v="166" actId="478"/>
+          <ac:spMkLst>
+            <pc:docMk/>
+            <pc:sldMk cId="3630180020" sldId="257"/>
+            <ac:spMk id="92" creationId="{211D2000-F9E0-216C-A62A-F4C750150A42}"/>
+          </ac:spMkLst>
+        </pc:spChg>
+        <pc:spChg chg="mod topLvl">
+          <ac:chgData name="Neill Campbell" userId="0c68e68e-714c-4571-8b4e-7246b46ba3fc" providerId="ADAL" clId="{9ECE9524-8A2C-456E-BC9E-5009EA46B350}" dt="2025-11-24T08:11:27.139" v="403" actId="1076"/>
+          <ac:spMkLst>
+            <pc:docMk/>
+            <pc:sldMk cId="3630180020" sldId="257"/>
+            <ac:spMk id="93" creationId="{186CFFD3-F8B4-C228-3D48-96674C8CFD36}"/>
+          </ac:spMkLst>
+        </pc:spChg>
+        <pc:spChg chg="add mod">
+          <ac:chgData name="Neill Campbell" userId="0c68e68e-714c-4571-8b4e-7246b46ba3fc" providerId="ADAL" clId="{9ECE9524-8A2C-456E-BC9E-5009EA46B350}" dt="2025-11-24T08:12:52.127" v="465" actId="20577"/>
+          <ac:spMkLst>
+            <pc:docMk/>
+            <pc:sldMk cId="3630180020" sldId="257"/>
+            <ac:spMk id="94" creationId="{0BEA27B2-E42C-0D15-DF9D-00F346E88ECE}"/>
+          </ac:spMkLst>
+        </pc:spChg>
+        <pc:spChg chg="add mod">
+          <ac:chgData name="Neill Campbell" userId="0c68e68e-714c-4571-8b4e-7246b46ba3fc" providerId="ADAL" clId="{9ECE9524-8A2C-456E-BC9E-5009EA46B350}" dt="2025-11-24T08:11:36.166" v="404" actId="1076"/>
+          <ac:spMkLst>
+            <pc:docMk/>
+            <pc:sldMk cId="3630180020" sldId="257"/>
+            <ac:spMk id="95" creationId="{B32E45CE-61BB-E60C-BBD2-F906284BA597}"/>
+          </ac:spMkLst>
+        </pc:spChg>
+        <pc:spChg chg="add mod">
+          <ac:chgData name="Neill Campbell" userId="0c68e68e-714c-4571-8b4e-7246b46ba3fc" providerId="ADAL" clId="{9ECE9524-8A2C-456E-BC9E-5009EA46B350}" dt="2025-11-24T08:11:41.086" v="405" actId="14100"/>
+          <ac:spMkLst>
+            <pc:docMk/>
+            <pc:sldMk cId="3630180020" sldId="257"/>
+            <ac:spMk id="96" creationId="{DFEFCA74-8C16-F1DB-6601-143E8400D186}"/>
+          </ac:spMkLst>
+        </pc:spChg>
+        <pc:grpChg chg="add mod">
+          <ac:chgData name="Neill Campbell" userId="0c68e68e-714c-4571-8b4e-7246b46ba3fc" providerId="ADAL" clId="{9ECE9524-8A2C-456E-BC9E-5009EA46B350}" dt="2025-11-24T08:01:05.723" v="118" actId="12789"/>
+          <ac:grpSpMkLst>
+            <pc:docMk/>
+            <pc:sldMk cId="3630180020" sldId="257"/>
+            <ac:grpSpMk id="50" creationId="{C74F82CD-D16E-5495-8B4B-BA5A4F95227D}"/>
+          </ac:grpSpMkLst>
+        </pc:grpChg>
+        <pc:grpChg chg="add mod">
+          <ac:chgData name="Neill Campbell" userId="0c68e68e-714c-4571-8b4e-7246b46ba3fc" providerId="ADAL" clId="{9ECE9524-8A2C-456E-BC9E-5009EA46B350}" dt="2025-11-24T08:09:15.719" v="245" actId="1076"/>
+          <ac:grpSpMkLst>
+            <pc:docMk/>
+            <pc:sldMk cId="3630180020" sldId="257"/>
+            <ac:grpSpMk id="51" creationId="{F975930E-5888-4A72-3A5F-00DB5BE05082}"/>
+          </ac:grpSpMkLst>
+        </pc:grpChg>
+        <pc:grpChg chg="add mod">
+          <ac:chgData name="Neill Campbell" userId="0c68e68e-714c-4571-8b4e-7246b46ba3fc" providerId="ADAL" clId="{9ECE9524-8A2C-456E-BC9E-5009EA46B350}" dt="2025-11-24T08:01:05.723" v="118" actId="12789"/>
+          <ac:grpSpMkLst>
+            <pc:docMk/>
+            <pc:sldMk cId="3630180020" sldId="257"/>
+            <ac:grpSpMk id="52" creationId="{2AE73F32-8BB7-D9B9-47C4-25158DD1F670}"/>
+          </ac:grpSpMkLst>
+        </pc:grpChg>
+        <pc:grpChg chg="add mod">
+          <ac:chgData name="Neill Campbell" userId="0c68e68e-714c-4571-8b4e-7246b46ba3fc" providerId="ADAL" clId="{9ECE9524-8A2C-456E-BC9E-5009EA46B350}" dt="2025-11-24T08:01:05.723" v="118" actId="12789"/>
+          <ac:grpSpMkLst>
+            <pc:docMk/>
+            <pc:sldMk cId="3630180020" sldId="257"/>
+            <ac:grpSpMk id="55" creationId="{DE378D8E-E8BF-1ADF-6061-62FD2512D860}"/>
+          </ac:grpSpMkLst>
+        </pc:grpChg>
+        <pc:grpChg chg="add mod">
+          <ac:chgData name="Neill Campbell" userId="0c68e68e-714c-4571-8b4e-7246b46ba3fc" providerId="ADAL" clId="{9ECE9524-8A2C-456E-BC9E-5009EA46B350}" dt="2025-11-24T08:01:05.723" v="118" actId="12789"/>
+          <ac:grpSpMkLst>
+            <pc:docMk/>
+            <pc:sldMk cId="3630180020" sldId="257"/>
+            <ac:grpSpMk id="58" creationId="{C8FD40BB-E90C-52B1-6391-15ABDAC3F08B}"/>
+          </ac:grpSpMkLst>
+        </pc:grpChg>
+        <pc:grpChg chg="add mod">
+          <ac:chgData name="Neill Campbell" userId="0c68e68e-714c-4571-8b4e-7246b46ba3fc" providerId="ADAL" clId="{9ECE9524-8A2C-456E-BC9E-5009EA46B350}" dt="2025-11-24T08:01:05.723" v="118" actId="12789"/>
+          <ac:grpSpMkLst>
+            <pc:docMk/>
+            <pc:sldMk cId="3630180020" sldId="257"/>
+            <ac:grpSpMk id="61" creationId="{035FAF2C-D939-DDFA-E485-4B0A820470BE}"/>
+          </ac:grpSpMkLst>
+        </pc:grpChg>
+        <pc:grpChg chg="mod">
+          <ac:chgData name="Neill Campbell" userId="0c68e68e-714c-4571-8b4e-7246b46ba3fc" providerId="ADAL" clId="{9ECE9524-8A2C-456E-BC9E-5009EA46B350}" dt="2025-11-24T08:01:05.723" v="118" actId="12789"/>
+          <ac:grpSpMkLst>
+            <pc:docMk/>
+            <pc:sldMk cId="3630180020" sldId="257"/>
+            <ac:grpSpMk id="64" creationId="{2F5C1BA0-893C-01D7-F62F-F4B35ABD93F2}"/>
+          </ac:grpSpMkLst>
+        </pc:grpChg>
+        <pc:grpChg chg="mod">
+          <ac:chgData name="Neill Campbell" userId="0c68e68e-714c-4571-8b4e-7246b46ba3fc" providerId="ADAL" clId="{9ECE9524-8A2C-456E-BC9E-5009EA46B350}" dt="2025-11-24T08:01:05.723" v="118" actId="12789"/>
+          <ac:grpSpMkLst>
+            <pc:docMk/>
+            <pc:sldMk cId="3630180020" sldId="257"/>
+            <ac:grpSpMk id="67" creationId="{F5C59F27-D979-04D9-4C86-6A03727CF23A}"/>
+          </ac:grpSpMkLst>
+        </pc:grpChg>
+        <pc:grpChg chg="add mod">
+          <ac:chgData name="Neill Campbell" userId="0c68e68e-714c-4571-8b4e-7246b46ba3fc" providerId="ADAL" clId="{9ECE9524-8A2C-456E-BC9E-5009EA46B350}" dt="2025-11-24T08:01:05.723" v="118" actId="12789"/>
+          <ac:grpSpMkLst>
+            <pc:docMk/>
+            <pc:sldMk cId="3630180020" sldId="257"/>
+            <ac:grpSpMk id="70" creationId="{63425E32-9BE1-1977-FA11-5A11C9E23EC7}"/>
+          </ac:grpSpMkLst>
+        </pc:grpChg>
+        <pc:grpChg chg="add mod">
+          <ac:chgData name="Neill Campbell" userId="0c68e68e-714c-4571-8b4e-7246b46ba3fc" providerId="ADAL" clId="{9ECE9524-8A2C-456E-BC9E-5009EA46B350}" dt="2025-11-24T08:09:15.719" v="245" actId="1076"/>
+          <ac:grpSpMkLst>
+            <pc:docMk/>
+            <pc:sldMk cId="3630180020" sldId="257"/>
+            <ac:grpSpMk id="73" creationId="{7146CB83-84CC-ECB1-95DC-1069D8228431}"/>
+          </ac:grpSpMkLst>
+        </pc:grpChg>
+        <pc:grpChg chg="add del mod">
+          <ac:chgData name="Neill Campbell" userId="0c68e68e-714c-4571-8b4e-7246b46ba3fc" providerId="ADAL" clId="{9ECE9524-8A2C-456E-BC9E-5009EA46B350}" dt="2025-11-24T08:04:04.840" v="155" actId="478"/>
+          <ac:grpSpMkLst>
+            <pc:docMk/>
+            <pc:sldMk cId="3630180020" sldId="257"/>
+            <ac:grpSpMk id="81" creationId="{B14BE791-4A30-1B0C-D8A5-7A9BF57DD0F9}"/>
+          </ac:grpSpMkLst>
+        </pc:grpChg>
+        <pc:grpChg chg="add del mod">
+          <ac:chgData name="Neill Campbell" userId="0c68e68e-714c-4571-8b4e-7246b46ba3fc" providerId="ADAL" clId="{9ECE9524-8A2C-456E-BC9E-5009EA46B350}" dt="2025-11-24T08:04:04.840" v="155" actId="478"/>
+          <ac:grpSpMkLst>
+            <pc:docMk/>
+            <pc:sldMk cId="3630180020" sldId="257"/>
+            <ac:grpSpMk id="84" creationId="{FC3162DE-B407-FF4C-B9C8-EDB6EE847C34}"/>
+          </ac:grpSpMkLst>
+        </pc:grpChg>
+        <pc:grpChg chg="add mod">
+          <ac:chgData name="Neill Campbell" userId="0c68e68e-714c-4571-8b4e-7246b46ba3fc" providerId="ADAL" clId="{9ECE9524-8A2C-456E-BC9E-5009EA46B350}" dt="2025-11-24T08:10:19.793" v="303" actId="1076"/>
+          <ac:grpSpMkLst>
+            <pc:docMk/>
+            <pc:sldMk cId="3630180020" sldId="257"/>
+            <ac:grpSpMk id="88" creationId="{2849272D-9424-D9E0-5776-908E5ACE50A4}"/>
+          </ac:grpSpMkLst>
+        </pc:grpChg>
+        <pc:grpChg chg="add del mod">
+          <ac:chgData name="Neill Campbell" userId="0c68e68e-714c-4571-8b4e-7246b46ba3fc" providerId="ADAL" clId="{9ECE9524-8A2C-456E-BC9E-5009EA46B350}" dt="2025-11-24T08:05:40.510" v="165" actId="165"/>
+          <ac:grpSpMkLst>
+            <pc:docMk/>
+            <pc:sldMk cId="3630180020" sldId="257"/>
+            <ac:grpSpMk id="91" creationId="{901BAEA7-2519-D30A-494D-6DA9CB3633FE}"/>
+          </ac:grpSpMkLst>
+        </pc:grpChg>
+        <pc:cxnChg chg="del">
+          <ac:chgData name="Neill Campbell" userId="0c68e68e-714c-4571-8b4e-7246b46ba3fc" providerId="ADAL" clId="{9ECE9524-8A2C-456E-BC9E-5009EA46B350}" dt="2025-11-24T07:53:03.739" v="62" actId="478"/>
+          <ac:cxnSpMkLst>
+            <pc:docMk/>
+            <pc:sldMk cId="3630180020" sldId="257"/>
+            <ac:cxnSpMk id="27" creationId="{24A64AFE-A7F5-93D5-4D04-5D438B11C0A3}"/>
+          </ac:cxnSpMkLst>
+        </pc:cxnChg>
+        <pc:cxnChg chg="mod">
+          <ac:chgData name="Neill Campbell" userId="0c68e68e-714c-4571-8b4e-7246b46ba3fc" providerId="ADAL" clId="{9ECE9524-8A2C-456E-BC9E-5009EA46B350}" dt="2025-11-24T08:09:15.719" v="245" actId="1076"/>
+          <ac:cxnSpMkLst>
+            <pc:docMk/>
+            <pc:sldMk cId="3630180020" sldId="257"/>
+            <ac:cxnSpMk id="29" creationId="{F8E6800A-2F4E-A089-D9A8-70D67ED6DF57}"/>
+          </ac:cxnSpMkLst>
+        </pc:cxnChg>
+        <pc:cxnChg chg="add del mod">
+          <ac:chgData name="Neill Campbell" userId="0c68e68e-714c-4571-8b4e-7246b46ba3fc" providerId="ADAL" clId="{9ECE9524-8A2C-456E-BC9E-5009EA46B350}" dt="2025-11-24T08:04:02.747" v="154" actId="478"/>
+          <ac:cxnSpMkLst>
+            <pc:docMk/>
+            <pc:sldMk cId="3630180020" sldId="257"/>
+            <ac:cxnSpMk id="80" creationId="{DA3BBA58-8B98-EAB8-B71D-2E1F6A3151DA}"/>
+          </ac:cxnSpMkLst>
+        </pc:cxnChg>
+      </pc:sldChg>
+    </pc:docChg>
+  </pc:docChgLst>
   <pc:docChgLst>
     <pc:chgData name="Neill Campbell" userId="0c68e68e-714c-4571-8b4e-7246b46ba3fc" providerId="ADAL" clId="{8E8083F4-F94F-4BBA-AAC9-F729A48391AA}"/>
     <pc:docChg chg="undo custSel addSld modSld">
@@ -138,198 +857,6 @@
           <pc:docMk/>
           <pc:sldMk cId="3603508021" sldId="256"/>
         </pc:sldMkLst>
-        <pc:spChg chg="mod">
-          <ac:chgData name="Neill Campbell" userId="0c68e68e-714c-4571-8b4e-7246b46ba3fc" providerId="ADAL" clId="{8E8083F4-F94F-4BBA-AAC9-F729A48391AA}" dt="2023-11-28T14:40:58.389" v="18" actId="1036"/>
-          <ac:spMkLst>
-            <pc:docMk/>
-            <pc:sldMk cId="3603508021" sldId="256"/>
-            <ac:spMk id="8" creationId="{8ED5562F-7F71-2A62-8990-7B685D94BFBF}"/>
-          </ac:spMkLst>
-        </pc:spChg>
-        <pc:spChg chg="mod">
-          <ac:chgData name="Neill Campbell" userId="0c68e68e-714c-4571-8b4e-7246b46ba3fc" providerId="ADAL" clId="{8E8083F4-F94F-4BBA-AAC9-F729A48391AA}" dt="2023-11-28T14:40:58.389" v="18" actId="1036"/>
-          <ac:spMkLst>
-            <pc:docMk/>
-            <pc:sldMk cId="3603508021" sldId="256"/>
-            <ac:spMk id="9" creationId="{2F289767-1E89-5F3D-EDE9-92C79F22B3BA}"/>
-          </ac:spMkLst>
-        </pc:spChg>
-        <pc:spChg chg="mod">
-          <ac:chgData name="Neill Campbell" userId="0c68e68e-714c-4571-8b4e-7246b46ba3fc" providerId="ADAL" clId="{8E8083F4-F94F-4BBA-AAC9-F729A48391AA}" dt="2023-11-28T15:05:03.063" v="166" actId="207"/>
-          <ac:spMkLst>
-            <pc:docMk/>
-            <pc:sldMk cId="3603508021" sldId="256"/>
-            <ac:spMk id="10" creationId="{D9CC4C30-E21E-C291-758E-BE9A545A634B}"/>
-          </ac:spMkLst>
-        </pc:spChg>
-        <pc:spChg chg="mod">
-          <ac:chgData name="Neill Campbell" userId="0c68e68e-714c-4571-8b4e-7246b46ba3fc" providerId="ADAL" clId="{8E8083F4-F94F-4BBA-AAC9-F729A48391AA}" dt="2023-11-28T15:05:03.063" v="166" actId="207"/>
-          <ac:spMkLst>
-            <pc:docMk/>
-            <pc:sldMk cId="3603508021" sldId="256"/>
-            <ac:spMk id="11" creationId="{840E0AEB-3CF8-3E07-5CA2-88B7F493698A}"/>
-          </ac:spMkLst>
-        </pc:spChg>
-        <pc:spChg chg="mod">
-          <ac:chgData name="Neill Campbell" userId="0c68e68e-714c-4571-8b4e-7246b46ba3fc" providerId="ADAL" clId="{8E8083F4-F94F-4BBA-AAC9-F729A48391AA}" dt="2023-11-28T15:05:03.063" v="166" actId="207"/>
-          <ac:spMkLst>
-            <pc:docMk/>
-            <pc:sldMk cId="3603508021" sldId="256"/>
-            <ac:spMk id="12" creationId="{107654D5-60FE-9772-AE17-148F5AA0CAB5}"/>
-          </ac:spMkLst>
-        </pc:spChg>
-        <pc:spChg chg="mod">
-          <ac:chgData name="Neill Campbell" userId="0c68e68e-714c-4571-8b4e-7246b46ba3fc" providerId="ADAL" clId="{8E8083F4-F94F-4BBA-AAC9-F729A48391AA}" dt="2023-11-28T15:05:03.063" v="166" actId="207"/>
-          <ac:spMkLst>
-            <pc:docMk/>
-            <pc:sldMk cId="3603508021" sldId="256"/>
-            <ac:spMk id="13" creationId="{2A69AC57-F722-1DA9-AA0E-DAE33E372119}"/>
-          </ac:spMkLst>
-        </pc:spChg>
-        <pc:spChg chg="mod">
-          <ac:chgData name="Neill Campbell" userId="0c68e68e-714c-4571-8b4e-7246b46ba3fc" providerId="ADAL" clId="{8E8083F4-F94F-4BBA-AAC9-F729A48391AA}" dt="2023-11-28T15:05:03.063" v="166" actId="207"/>
-          <ac:spMkLst>
-            <pc:docMk/>
-            <pc:sldMk cId="3603508021" sldId="256"/>
-            <ac:spMk id="14" creationId="{39580F22-0FAF-09FA-900E-F163D24681BB}"/>
-          </ac:spMkLst>
-        </pc:spChg>
-        <pc:spChg chg="mod">
-          <ac:chgData name="Neill Campbell" userId="0c68e68e-714c-4571-8b4e-7246b46ba3fc" providerId="ADAL" clId="{8E8083F4-F94F-4BBA-AAC9-F729A48391AA}" dt="2023-11-28T15:05:03.063" v="166" actId="207"/>
-          <ac:spMkLst>
-            <pc:docMk/>
-            <pc:sldMk cId="3603508021" sldId="256"/>
-            <ac:spMk id="15" creationId="{C9F2A1A3-20CB-20D6-45BA-7013CB2C2BD9}"/>
-          </ac:spMkLst>
-        </pc:spChg>
-        <pc:spChg chg="mod">
-          <ac:chgData name="Neill Campbell" userId="0c68e68e-714c-4571-8b4e-7246b46ba3fc" providerId="ADAL" clId="{8E8083F4-F94F-4BBA-AAC9-F729A48391AA}" dt="2023-11-28T15:05:03.063" v="166" actId="207"/>
-          <ac:spMkLst>
-            <pc:docMk/>
-            <pc:sldMk cId="3603508021" sldId="256"/>
-            <ac:spMk id="16" creationId="{5CB0C2A3-67DA-D948-77F4-491EBCC0466D}"/>
-          </ac:spMkLst>
-        </pc:spChg>
-        <pc:spChg chg="mod">
-          <ac:chgData name="Neill Campbell" userId="0c68e68e-714c-4571-8b4e-7246b46ba3fc" providerId="ADAL" clId="{8E8083F4-F94F-4BBA-AAC9-F729A48391AA}" dt="2023-11-28T15:05:03.063" v="166" actId="207"/>
-          <ac:spMkLst>
-            <pc:docMk/>
-            <pc:sldMk cId="3603508021" sldId="256"/>
-            <ac:spMk id="17" creationId="{736823E6-B07C-858B-8A07-9222F666CA28}"/>
-          </ac:spMkLst>
-        </pc:spChg>
-        <pc:spChg chg="mod">
-          <ac:chgData name="Neill Campbell" userId="0c68e68e-714c-4571-8b4e-7246b46ba3fc" providerId="ADAL" clId="{8E8083F4-F94F-4BBA-AAC9-F729A48391AA}" dt="2023-11-28T15:05:03.063" v="166" actId="207"/>
-          <ac:spMkLst>
-            <pc:docMk/>
-            <pc:sldMk cId="3603508021" sldId="256"/>
-            <ac:spMk id="18" creationId="{69F893B2-8CBF-39D9-9249-170A9ED36F70}"/>
-          </ac:spMkLst>
-        </pc:spChg>
-        <pc:spChg chg="mod">
-          <ac:chgData name="Neill Campbell" userId="0c68e68e-714c-4571-8b4e-7246b46ba3fc" providerId="ADAL" clId="{8E8083F4-F94F-4BBA-AAC9-F729A48391AA}" dt="2023-11-28T15:05:03.063" v="166" actId="207"/>
-          <ac:spMkLst>
-            <pc:docMk/>
-            <pc:sldMk cId="3603508021" sldId="256"/>
-            <ac:spMk id="19" creationId="{093E9589-0C51-1952-9EAD-335864EE6654}"/>
-          </ac:spMkLst>
-        </pc:spChg>
-        <pc:spChg chg="mod">
-          <ac:chgData name="Neill Campbell" userId="0c68e68e-714c-4571-8b4e-7246b46ba3fc" providerId="ADAL" clId="{8E8083F4-F94F-4BBA-AAC9-F729A48391AA}" dt="2023-11-28T15:05:03.063" v="166" actId="207"/>
-          <ac:spMkLst>
-            <pc:docMk/>
-            <pc:sldMk cId="3603508021" sldId="256"/>
-            <ac:spMk id="20" creationId="{690468A8-7F2B-3EFB-DF32-E1EBF37F6AA1}"/>
-          </ac:spMkLst>
-        </pc:spChg>
-        <pc:spChg chg="mod">
-          <ac:chgData name="Neill Campbell" userId="0c68e68e-714c-4571-8b4e-7246b46ba3fc" providerId="ADAL" clId="{8E8083F4-F94F-4BBA-AAC9-F729A48391AA}" dt="2023-11-28T15:05:03.063" v="166" actId="207"/>
-          <ac:spMkLst>
-            <pc:docMk/>
-            <pc:sldMk cId="3603508021" sldId="256"/>
-            <ac:spMk id="21" creationId="{1A3EB27A-29BA-5F19-D88A-208F8CA8312A}"/>
-          </ac:spMkLst>
-        </pc:spChg>
-        <pc:spChg chg="mod">
-          <ac:chgData name="Neill Campbell" userId="0c68e68e-714c-4571-8b4e-7246b46ba3fc" providerId="ADAL" clId="{8E8083F4-F94F-4BBA-AAC9-F729A48391AA}" dt="2023-11-28T15:05:03.063" v="166" actId="207"/>
-          <ac:spMkLst>
-            <pc:docMk/>
-            <pc:sldMk cId="3603508021" sldId="256"/>
-            <ac:spMk id="22" creationId="{4660CBEA-96EA-3821-FBEC-2C821C644621}"/>
-          </ac:spMkLst>
-        </pc:spChg>
-        <pc:spChg chg="mod">
-          <ac:chgData name="Neill Campbell" userId="0c68e68e-714c-4571-8b4e-7246b46ba3fc" providerId="ADAL" clId="{8E8083F4-F94F-4BBA-AAC9-F729A48391AA}" dt="2023-11-28T15:05:03.063" v="166" actId="207"/>
-          <ac:spMkLst>
-            <pc:docMk/>
-            <pc:sldMk cId="3603508021" sldId="256"/>
-            <ac:spMk id="23" creationId="{0FDD5E12-AA74-CE8A-E035-0740E0216DC1}"/>
-          </ac:spMkLst>
-        </pc:spChg>
-        <pc:spChg chg="mod">
-          <ac:chgData name="Neill Campbell" userId="0c68e68e-714c-4571-8b4e-7246b46ba3fc" providerId="ADAL" clId="{8E8083F4-F94F-4BBA-AAC9-F729A48391AA}" dt="2023-11-28T15:05:03.063" v="166" actId="207"/>
-          <ac:spMkLst>
-            <pc:docMk/>
-            <pc:sldMk cId="3603508021" sldId="256"/>
-            <ac:spMk id="24" creationId="{4A090EF1-6793-7F91-0CA2-96EEEB00CE4B}"/>
-          </ac:spMkLst>
-        </pc:spChg>
-        <pc:spChg chg="add mod">
-          <ac:chgData name="Neill Campbell" userId="0c68e68e-714c-4571-8b4e-7246b46ba3fc" providerId="ADAL" clId="{8E8083F4-F94F-4BBA-AAC9-F729A48391AA}" dt="2023-11-28T14:42:42.051" v="93" actId="692"/>
-          <ac:spMkLst>
-            <pc:docMk/>
-            <pc:sldMk cId="3603508021" sldId="256"/>
-            <ac:spMk id="30" creationId="{9EA753D1-22D4-0DD5-32D8-9CBDEBC004AA}"/>
-          </ac:spMkLst>
-        </pc:spChg>
-        <pc:spChg chg="add mod">
-          <ac:chgData name="Neill Campbell" userId="0c68e68e-714c-4571-8b4e-7246b46ba3fc" providerId="ADAL" clId="{8E8083F4-F94F-4BBA-AAC9-F729A48391AA}" dt="2023-11-28T14:42:42.051" v="93" actId="692"/>
-          <ac:spMkLst>
-            <pc:docMk/>
-            <pc:sldMk cId="3603508021" sldId="256"/>
-            <ac:spMk id="32" creationId="{13021375-BA68-5A67-D51C-1B437C075942}"/>
-          </ac:spMkLst>
-        </pc:spChg>
-        <pc:spChg chg="add mod">
-          <ac:chgData name="Neill Campbell" userId="0c68e68e-714c-4571-8b4e-7246b46ba3fc" providerId="ADAL" clId="{8E8083F4-F94F-4BBA-AAC9-F729A48391AA}" dt="2023-11-28T14:42:42.051" v="93" actId="692"/>
-          <ac:spMkLst>
-            <pc:docMk/>
-            <pc:sldMk cId="3603508021" sldId="256"/>
-            <ac:spMk id="33" creationId="{CDF8F6E1-6D58-9152-635B-C32182B4B316}"/>
-          </ac:spMkLst>
-        </pc:spChg>
-        <pc:spChg chg="add mod">
-          <ac:chgData name="Neill Campbell" userId="0c68e68e-714c-4571-8b4e-7246b46ba3fc" providerId="ADAL" clId="{8E8083F4-F94F-4BBA-AAC9-F729A48391AA}" dt="2023-11-28T14:43:52.733" v="163" actId="1076"/>
-          <ac:spMkLst>
-            <pc:docMk/>
-            <pc:sldMk cId="3603508021" sldId="256"/>
-            <ac:spMk id="34" creationId="{60A9B999-AB80-E27F-E282-82B966A29EEE}"/>
-          </ac:spMkLst>
-        </pc:spChg>
-        <pc:spChg chg="add del mod">
-          <ac:chgData name="Neill Campbell" userId="0c68e68e-714c-4571-8b4e-7246b46ba3fc" providerId="ADAL" clId="{8E8083F4-F94F-4BBA-AAC9-F729A48391AA}" dt="2023-11-28T14:43:46.153" v="161" actId="478"/>
-          <ac:spMkLst>
-            <pc:docMk/>
-            <pc:sldMk cId="3603508021" sldId="256"/>
-            <ac:spMk id="35" creationId="{5FB272E9-526C-CF26-CE76-C7A89AFCFFEF}"/>
-          </ac:spMkLst>
-        </pc:spChg>
-        <pc:spChg chg="add mod">
-          <ac:chgData name="Neill Campbell" userId="0c68e68e-714c-4571-8b4e-7246b46ba3fc" providerId="ADAL" clId="{8E8083F4-F94F-4BBA-AAC9-F729A48391AA}" dt="2023-11-28T14:43:57.295" v="164" actId="1076"/>
-          <ac:spMkLst>
-            <pc:docMk/>
-            <pc:sldMk cId="3603508021" sldId="256"/>
-            <ac:spMk id="36" creationId="{3147626C-0688-E86E-3C8A-53DF37C73CFC}"/>
-          </ac:spMkLst>
-        </pc:spChg>
-        <pc:cxnChg chg="add del mod">
-          <ac:chgData name="Neill Campbell" userId="0c68e68e-714c-4571-8b4e-7246b46ba3fc" providerId="ADAL" clId="{8E8083F4-F94F-4BBA-AAC9-F729A48391AA}" dt="2023-11-28T14:41:14.985" v="21"/>
-          <ac:cxnSpMkLst>
-            <pc:docMk/>
-            <pc:sldMk cId="3603508021" sldId="256"/>
-            <ac:cxnSpMk id="31" creationId="{9A12C106-66D3-AE29-E8F4-E92E8955A0F3}"/>
-          </ac:cxnSpMkLst>
-        </pc:cxnChg>
       </pc:sldChg>
       <pc:sldChg chg="addSp delSp modSp add mod">
         <pc:chgData name="Neill Campbell" userId="0c68e68e-714c-4571-8b4e-7246b46ba3fc" providerId="ADAL" clId="{8E8083F4-F94F-4BBA-AAC9-F729A48391AA}" dt="2023-11-28T15:07:40.845" v="244" actId="1076"/>
@@ -337,110 +864,6 @@
           <pc:docMk/>
           <pc:sldMk cId="3630180020" sldId="257"/>
         </pc:sldMkLst>
-        <pc:spChg chg="add mod">
-          <ac:chgData name="Neill Campbell" userId="0c68e68e-714c-4571-8b4e-7246b46ba3fc" providerId="ADAL" clId="{8E8083F4-F94F-4BBA-AAC9-F729A48391AA}" dt="2023-11-28T15:07:40.845" v="244" actId="1076"/>
-          <ac:spMkLst>
-            <pc:docMk/>
-            <pc:sldMk cId="3630180020" sldId="257"/>
-            <ac:spMk id="2" creationId="{E4FDFC28-7759-14E9-F18A-3CB485C95895}"/>
-          </ac:spMkLst>
-        </pc:spChg>
-        <pc:spChg chg="add mod">
-          <ac:chgData name="Neill Campbell" userId="0c68e68e-714c-4571-8b4e-7246b46ba3fc" providerId="ADAL" clId="{8E8083F4-F94F-4BBA-AAC9-F729A48391AA}" dt="2023-11-28T15:06:27.050" v="234" actId="1076"/>
-          <ac:spMkLst>
-            <pc:docMk/>
-            <pc:sldMk cId="3630180020" sldId="257"/>
-            <ac:spMk id="3" creationId="{F0F5982E-C8AA-B336-7B9C-53D9D5CFF57A}"/>
-          </ac:spMkLst>
-        </pc:spChg>
-        <pc:spChg chg="del">
-          <ac:chgData name="Neill Campbell" userId="0c68e68e-714c-4571-8b4e-7246b46ba3fc" providerId="ADAL" clId="{8E8083F4-F94F-4BBA-AAC9-F729A48391AA}" dt="2023-11-28T15:05:29.731" v="167" actId="478"/>
-          <ac:spMkLst>
-            <pc:docMk/>
-            <pc:sldMk cId="3630180020" sldId="257"/>
-            <ac:spMk id="10" creationId="{D9CC4C30-E21E-C291-758E-BE9A545A634B}"/>
-          </ac:spMkLst>
-        </pc:spChg>
-        <pc:spChg chg="mod">
-          <ac:chgData name="Neill Campbell" userId="0c68e68e-714c-4571-8b4e-7246b46ba3fc" providerId="ADAL" clId="{8E8083F4-F94F-4BBA-AAC9-F729A48391AA}" dt="2023-11-28T15:07:17.077" v="239" actId="207"/>
-          <ac:spMkLst>
-            <pc:docMk/>
-            <pc:sldMk cId="3630180020" sldId="257"/>
-            <ac:spMk id="12" creationId="{107654D5-60FE-9772-AE17-148F5AA0CAB5}"/>
-          </ac:spMkLst>
-        </pc:spChg>
-        <pc:spChg chg="del">
-          <ac:chgData name="Neill Campbell" userId="0c68e68e-714c-4571-8b4e-7246b46ba3fc" providerId="ADAL" clId="{8E8083F4-F94F-4BBA-AAC9-F729A48391AA}" dt="2023-11-28T15:06:46.817" v="237" actId="478"/>
-          <ac:spMkLst>
-            <pc:docMk/>
-            <pc:sldMk cId="3630180020" sldId="257"/>
-            <ac:spMk id="13" creationId="{2A69AC57-F722-1DA9-AA0E-DAE33E372119}"/>
-          </ac:spMkLst>
-        </pc:spChg>
-        <pc:spChg chg="del">
-          <ac:chgData name="Neill Campbell" userId="0c68e68e-714c-4571-8b4e-7246b46ba3fc" providerId="ADAL" clId="{8E8083F4-F94F-4BBA-AAC9-F729A48391AA}" dt="2023-11-28T15:06:46.817" v="237" actId="478"/>
-          <ac:spMkLst>
-            <pc:docMk/>
-            <pc:sldMk cId="3630180020" sldId="257"/>
-            <ac:spMk id="14" creationId="{39580F22-0FAF-09FA-900E-F163D24681BB}"/>
-          </ac:spMkLst>
-        </pc:spChg>
-        <pc:spChg chg="del">
-          <ac:chgData name="Neill Campbell" userId="0c68e68e-714c-4571-8b4e-7246b46ba3fc" providerId="ADAL" clId="{8E8083F4-F94F-4BBA-AAC9-F729A48391AA}" dt="2023-11-28T15:06:46.817" v="237" actId="478"/>
-          <ac:spMkLst>
-            <pc:docMk/>
-            <pc:sldMk cId="3630180020" sldId="257"/>
-            <ac:spMk id="15" creationId="{C9F2A1A3-20CB-20D6-45BA-7013CB2C2BD9}"/>
-          </ac:spMkLst>
-        </pc:spChg>
-        <pc:spChg chg="del">
-          <ac:chgData name="Neill Campbell" userId="0c68e68e-714c-4571-8b4e-7246b46ba3fc" providerId="ADAL" clId="{8E8083F4-F94F-4BBA-AAC9-F729A48391AA}" dt="2023-11-28T15:06:46.817" v="237" actId="478"/>
-          <ac:spMkLst>
-            <pc:docMk/>
-            <pc:sldMk cId="3630180020" sldId="257"/>
-            <ac:spMk id="16" creationId="{5CB0C2A3-67DA-D948-77F4-491EBCC0466D}"/>
-          </ac:spMkLst>
-        </pc:spChg>
-        <pc:spChg chg="mod">
-          <ac:chgData name="Neill Campbell" userId="0c68e68e-714c-4571-8b4e-7246b46ba3fc" providerId="ADAL" clId="{8E8083F4-F94F-4BBA-AAC9-F729A48391AA}" dt="2023-11-28T15:07:33.993" v="243" actId="207"/>
-          <ac:spMkLst>
-            <pc:docMk/>
-            <pc:sldMk cId="3630180020" sldId="257"/>
-            <ac:spMk id="22" creationId="{4660CBEA-96EA-3821-FBEC-2C821C644621}"/>
-          </ac:spMkLst>
-        </pc:spChg>
-        <pc:spChg chg="mod">
-          <ac:chgData name="Neill Campbell" userId="0c68e68e-714c-4571-8b4e-7246b46ba3fc" providerId="ADAL" clId="{8E8083F4-F94F-4BBA-AAC9-F729A48391AA}" dt="2023-11-28T15:05:52.568" v="225" actId="1037"/>
-          <ac:spMkLst>
-            <pc:docMk/>
-            <pc:sldMk cId="3630180020" sldId="257"/>
-            <ac:spMk id="34" creationId="{60A9B999-AB80-E27F-E282-82B966A29EEE}"/>
-          </ac:spMkLst>
-        </pc:spChg>
-        <pc:spChg chg="mod">
-          <ac:chgData name="Neill Campbell" userId="0c68e68e-714c-4571-8b4e-7246b46ba3fc" providerId="ADAL" clId="{8E8083F4-F94F-4BBA-AAC9-F729A48391AA}" dt="2023-11-28T15:06:18.460" v="231" actId="14100"/>
-          <ac:spMkLst>
-            <pc:docMk/>
-            <pc:sldMk cId="3630180020" sldId="257"/>
-            <ac:spMk id="36" creationId="{3147626C-0688-E86E-3C8A-53DF37C73CFC}"/>
-          </ac:spMkLst>
-        </pc:spChg>
-        <pc:cxnChg chg="del">
-          <ac:chgData name="Neill Campbell" userId="0c68e68e-714c-4571-8b4e-7246b46ba3fc" providerId="ADAL" clId="{8E8083F4-F94F-4BBA-AAC9-F729A48391AA}" dt="2023-11-28T15:05:32.162" v="168" actId="478"/>
-          <ac:cxnSpMkLst>
-            <pc:docMk/>
-            <pc:sldMk cId="3630180020" sldId="257"/>
-            <ac:cxnSpMk id="26" creationId="{BC6C5890-2874-5D87-09C2-2C0B60EDBD3E}"/>
-          </ac:cxnSpMkLst>
-        </pc:cxnChg>
-        <pc:cxnChg chg="del">
-          <ac:chgData name="Neill Campbell" userId="0c68e68e-714c-4571-8b4e-7246b46ba3fc" providerId="ADAL" clId="{8E8083F4-F94F-4BBA-AAC9-F729A48391AA}" dt="2023-11-28T15:06:39.260" v="236" actId="478"/>
-          <ac:cxnSpMkLst>
-            <pc:docMk/>
-            <pc:sldMk cId="3630180020" sldId="257"/>
-            <ac:cxnSpMk id="28" creationId="{C57DF09C-C212-EC87-E4D5-ED4F2EF97896}"/>
-          </ac:cxnSpMkLst>
-        </pc:cxnChg>
       </pc:sldChg>
     </pc:docChg>
   </pc:docChgLst>
@@ -457,278 +880,6 @@
           <pc:docMk/>
           <pc:sldMk cId="3603508021" sldId="256"/>
         </pc:sldMkLst>
-        <pc:spChg chg="add mod">
-          <ac:chgData name="Neill Campbell" userId="0c68e68e-714c-4571-8b4e-7246b46ba3fc" providerId="ADAL" clId="{2872F0AD-8577-4B4A-BC20-359B4B720F94}" dt="2023-11-29T09:06:21.953" v="271" actId="113"/>
-          <ac:spMkLst>
-            <pc:docMk/>
-            <pc:sldMk cId="3603508021" sldId="256"/>
-            <ac:spMk id="2" creationId="{F2593765-A2D1-39BA-CB31-3A6DD3D973AF}"/>
-          </ac:spMkLst>
-        </pc:spChg>
-        <pc:spChg chg="add del mod">
-          <ac:chgData name="Neill Campbell" userId="0c68e68e-714c-4571-8b4e-7246b46ba3fc" providerId="ADAL" clId="{2872F0AD-8577-4B4A-BC20-359B4B720F94}" dt="2023-11-29T07:55:12.259" v="176"/>
-          <ac:spMkLst>
-            <pc:docMk/>
-            <pc:sldMk cId="3603508021" sldId="256"/>
-            <ac:spMk id="3" creationId="{ED16675A-B82A-E775-A580-50B82186B750}"/>
-          </ac:spMkLst>
-        </pc:spChg>
-        <pc:spChg chg="mod">
-          <ac:chgData name="Neill Campbell" userId="0c68e68e-714c-4571-8b4e-7246b46ba3fc" providerId="ADAL" clId="{2872F0AD-8577-4B4A-BC20-359B4B720F94}" dt="2023-11-29T09:03:29.311" v="255" actId="692"/>
-          <ac:spMkLst>
-            <pc:docMk/>
-            <pc:sldMk cId="3603508021" sldId="256"/>
-            <ac:spMk id="4" creationId="{B578E923-9CE7-614B-1115-25BEC7C7152C}"/>
-          </ac:spMkLst>
-        </pc:spChg>
-        <pc:spChg chg="mod">
-          <ac:chgData name="Neill Campbell" userId="0c68e68e-714c-4571-8b4e-7246b46ba3fc" providerId="ADAL" clId="{2872F0AD-8577-4B4A-BC20-359B4B720F94}" dt="2023-11-29T09:03:29.311" v="255" actId="692"/>
-          <ac:spMkLst>
-            <pc:docMk/>
-            <pc:sldMk cId="3603508021" sldId="256"/>
-            <ac:spMk id="5" creationId="{69CE46A2-C57D-45E3-5AA1-7A21154BE631}"/>
-          </ac:spMkLst>
-        </pc:spChg>
-        <pc:spChg chg="mod">
-          <ac:chgData name="Neill Campbell" userId="0c68e68e-714c-4571-8b4e-7246b46ba3fc" providerId="ADAL" clId="{2872F0AD-8577-4B4A-BC20-359B4B720F94}" dt="2023-11-29T09:03:29.311" v="255" actId="692"/>
-          <ac:spMkLst>
-            <pc:docMk/>
-            <pc:sldMk cId="3603508021" sldId="256"/>
-            <ac:spMk id="6" creationId="{553E75FF-3503-4E90-6B60-811E91DC3CA5}"/>
-          </ac:spMkLst>
-        </pc:spChg>
-        <pc:spChg chg="mod">
-          <ac:chgData name="Neill Campbell" userId="0c68e68e-714c-4571-8b4e-7246b46ba3fc" providerId="ADAL" clId="{2872F0AD-8577-4B4A-BC20-359B4B720F94}" dt="2023-11-29T09:03:29.311" v="255" actId="692"/>
-          <ac:spMkLst>
-            <pc:docMk/>
-            <pc:sldMk cId="3603508021" sldId="256"/>
-            <ac:spMk id="7" creationId="{A629C68F-2AC3-7FDD-FE9E-D1C7540178C5}"/>
-          </ac:spMkLst>
-        </pc:spChg>
-        <pc:spChg chg="mod">
-          <ac:chgData name="Neill Campbell" userId="0c68e68e-714c-4571-8b4e-7246b46ba3fc" providerId="ADAL" clId="{2872F0AD-8577-4B4A-BC20-359B4B720F94}" dt="2023-11-29T09:03:29.311" v="255" actId="692"/>
-          <ac:spMkLst>
-            <pc:docMk/>
-            <pc:sldMk cId="3603508021" sldId="256"/>
-            <ac:spMk id="8" creationId="{8ED5562F-7F71-2A62-8990-7B685D94BFBF}"/>
-          </ac:spMkLst>
-        </pc:spChg>
-        <pc:spChg chg="mod">
-          <ac:chgData name="Neill Campbell" userId="0c68e68e-714c-4571-8b4e-7246b46ba3fc" providerId="ADAL" clId="{2872F0AD-8577-4B4A-BC20-359B4B720F94}" dt="2023-11-29T09:03:29.311" v="255" actId="692"/>
-          <ac:spMkLst>
-            <pc:docMk/>
-            <pc:sldMk cId="3603508021" sldId="256"/>
-            <ac:spMk id="9" creationId="{2F289767-1E89-5F3D-EDE9-92C79F22B3BA}"/>
-          </ac:spMkLst>
-        </pc:spChg>
-        <pc:spChg chg="mod">
-          <ac:chgData name="Neill Campbell" userId="0c68e68e-714c-4571-8b4e-7246b46ba3fc" providerId="ADAL" clId="{2872F0AD-8577-4B4A-BC20-359B4B720F94}" dt="2023-11-29T09:06:15.668" v="270" actId="404"/>
-          <ac:spMkLst>
-            <pc:docMk/>
-            <pc:sldMk cId="3603508021" sldId="256"/>
-            <ac:spMk id="10" creationId="{D9CC4C30-E21E-C291-758E-BE9A545A634B}"/>
-          </ac:spMkLst>
-        </pc:spChg>
-        <pc:spChg chg="mod">
-          <ac:chgData name="Neill Campbell" userId="0c68e68e-714c-4571-8b4e-7246b46ba3fc" providerId="ADAL" clId="{2872F0AD-8577-4B4A-BC20-359B4B720F94}" dt="2023-11-29T09:06:15.668" v="270" actId="404"/>
-          <ac:spMkLst>
-            <pc:docMk/>
-            <pc:sldMk cId="3603508021" sldId="256"/>
-            <ac:spMk id="11" creationId="{840E0AEB-3CF8-3E07-5CA2-88B7F493698A}"/>
-          </ac:spMkLst>
-        </pc:spChg>
-        <pc:spChg chg="mod">
-          <ac:chgData name="Neill Campbell" userId="0c68e68e-714c-4571-8b4e-7246b46ba3fc" providerId="ADAL" clId="{2872F0AD-8577-4B4A-BC20-359B4B720F94}" dt="2023-11-29T09:06:15.668" v="270" actId="404"/>
-          <ac:spMkLst>
-            <pc:docMk/>
-            <pc:sldMk cId="3603508021" sldId="256"/>
-            <ac:spMk id="12" creationId="{107654D5-60FE-9772-AE17-148F5AA0CAB5}"/>
-          </ac:spMkLst>
-        </pc:spChg>
-        <pc:spChg chg="mod">
-          <ac:chgData name="Neill Campbell" userId="0c68e68e-714c-4571-8b4e-7246b46ba3fc" providerId="ADAL" clId="{2872F0AD-8577-4B4A-BC20-359B4B720F94}" dt="2023-11-29T09:06:15.668" v="270" actId="404"/>
-          <ac:spMkLst>
-            <pc:docMk/>
-            <pc:sldMk cId="3603508021" sldId="256"/>
-            <ac:spMk id="13" creationId="{2A69AC57-F722-1DA9-AA0E-DAE33E372119}"/>
-          </ac:spMkLst>
-        </pc:spChg>
-        <pc:spChg chg="mod">
-          <ac:chgData name="Neill Campbell" userId="0c68e68e-714c-4571-8b4e-7246b46ba3fc" providerId="ADAL" clId="{2872F0AD-8577-4B4A-BC20-359B4B720F94}" dt="2023-11-29T09:06:15.668" v="270" actId="404"/>
-          <ac:spMkLst>
-            <pc:docMk/>
-            <pc:sldMk cId="3603508021" sldId="256"/>
-            <ac:spMk id="14" creationId="{39580F22-0FAF-09FA-900E-F163D24681BB}"/>
-          </ac:spMkLst>
-        </pc:spChg>
-        <pc:spChg chg="mod">
-          <ac:chgData name="Neill Campbell" userId="0c68e68e-714c-4571-8b4e-7246b46ba3fc" providerId="ADAL" clId="{2872F0AD-8577-4B4A-BC20-359B4B720F94}" dt="2023-11-29T09:06:15.668" v="270" actId="404"/>
-          <ac:spMkLst>
-            <pc:docMk/>
-            <pc:sldMk cId="3603508021" sldId="256"/>
-            <ac:spMk id="15" creationId="{C9F2A1A3-20CB-20D6-45BA-7013CB2C2BD9}"/>
-          </ac:spMkLst>
-        </pc:spChg>
-        <pc:spChg chg="mod">
-          <ac:chgData name="Neill Campbell" userId="0c68e68e-714c-4571-8b4e-7246b46ba3fc" providerId="ADAL" clId="{2872F0AD-8577-4B4A-BC20-359B4B720F94}" dt="2023-11-29T09:06:15.668" v="270" actId="404"/>
-          <ac:spMkLst>
-            <pc:docMk/>
-            <pc:sldMk cId="3603508021" sldId="256"/>
-            <ac:spMk id="16" creationId="{5CB0C2A3-67DA-D948-77F4-491EBCC0466D}"/>
-          </ac:spMkLst>
-        </pc:spChg>
-        <pc:spChg chg="mod">
-          <ac:chgData name="Neill Campbell" userId="0c68e68e-714c-4571-8b4e-7246b46ba3fc" providerId="ADAL" clId="{2872F0AD-8577-4B4A-BC20-359B4B720F94}" dt="2023-11-29T09:06:15.668" v="270" actId="404"/>
-          <ac:spMkLst>
-            <pc:docMk/>
-            <pc:sldMk cId="3603508021" sldId="256"/>
-            <ac:spMk id="17" creationId="{736823E6-B07C-858B-8A07-9222F666CA28}"/>
-          </ac:spMkLst>
-        </pc:spChg>
-        <pc:spChg chg="mod">
-          <ac:chgData name="Neill Campbell" userId="0c68e68e-714c-4571-8b4e-7246b46ba3fc" providerId="ADAL" clId="{2872F0AD-8577-4B4A-BC20-359B4B720F94}" dt="2023-11-29T09:06:15.668" v="270" actId="404"/>
-          <ac:spMkLst>
-            <pc:docMk/>
-            <pc:sldMk cId="3603508021" sldId="256"/>
-            <ac:spMk id="18" creationId="{69F893B2-8CBF-39D9-9249-170A9ED36F70}"/>
-          </ac:spMkLst>
-        </pc:spChg>
-        <pc:spChg chg="mod">
-          <ac:chgData name="Neill Campbell" userId="0c68e68e-714c-4571-8b4e-7246b46ba3fc" providerId="ADAL" clId="{2872F0AD-8577-4B4A-BC20-359B4B720F94}" dt="2023-11-29T09:06:15.668" v="270" actId="404"/>
-          <ac:spMkLst>
-            <pc:docMk/>
-            <pc:sldMk cId="3603508021" sldId="256"/>
-            <ac:spMk id="19" creationId="{093E9589-0C51-1952-9EAD-335864EE6654}"/>
-          </ac:spMkLst>
-        </pc:spChg>
-        <pc:spChg chg="mod">
-          <ac:chgData name="Neill Campbell" userId="0c68e68e-714c-4571-8b4e-7246b46ba3fc" providerId="ADAL" clId="{2872F0AD-8577-4B4A-BC20-359B4B720F94}" dt="2023-11-29T09:06:15.668" v="270" actId="404"/>
-          <ac:spMkLst>
-            <pc:docMk/>
-            <pc:sldMk cId="3603508021" sldId="256"/>
-            <ac:spMk id="20" creationId="{690468A8-7F2B-3EFB-DF32-E1EBF37F6AA1}"/>
-          </ac:spMkLst>
-        </pc:spChg>
-        <pc:spChg chg="mod">
-          <ac:chgData name="Neill Campbell" userId="0c68e68e-714c-4571-8b4e-7246b46ba3fc" providerId="ADAL" clId="{2872F0AD-8577-4B4A-BC20-359B4B720F94}" dt="2023-11-29T09:06:15.668" v="270" actId="404"/>
-          <ac:spMkLst>
-            <pc:docMk/>
-            <pc:sldMk cId="3603508021" sldId="256"/>
-            <ac:spMk id="21" creationId="{1A3EB27A-29BA-5F19-D88A-208F8CA8312A}"/>
-          </ac:spMkLst>
-        </pc:spChg>
-        <pc:spChg chg="mod">
-          <ac:chgData name="Neill Campbell" userId="0c68e68e-714c-4571-8b4e-7246b46ba3fc" providerId="ADAL" clId="{2872F0AD-8577-4B4A-BC20-359B4B720F94}" dt="2023-11-29T09:06:15.668" v="270" actId="404"/>
-          <ac:spMkLst>
-            <pc:docMk/>
-            <pc:sldMk cId="3603508021" sldId="256"/>
-            <ac:spMk id="22" creationId="{4660CBEA-96EA-3821-FBEC-2C821C644621}"/>
-          </ac:spMkLst>
-        </pc:spChg>
-        <pc:spChg chg="mod">
-          <ac:chgData name="Neill Campbell" userId="0c68e68e-714c-4571-8b4e-7246b46ba3fc" providerId="ADAL" clId="{2872F0AD-8577-4B4A-BC20-359B4B720F94}" dt="2023-11-29T09:06:15.668" v="270" actId="404"/>
-          <ac:spMkLst>
-            <pc:docMk/>
-            <pc:sldMk cId="3603508021" sldId="256"/>
-            <ac:spMk id="23" creationId="{0FDD5E12-AA74-CE8A-E035-0740E0216DC1}"/>
-          </ac:spMkLst>
-        </pc:spChg>
-        <pc:spChg chg="mod">
-          <ac:chgData name="Neill Campbell" userId="0c68e68e-714c-4571-8b4e-7246b46ba3fc" providerId="ADAL" clId="{2872F0AD-8577-4B4A-BC20-359B4B720F94}" dt="2023-11-29T09:06:15.668" v="270" actId="404"/>
-          <ac:spMkLst>
-            <pc:docMk/>
-            <pc:sldMk cId="3603508021" sldId="256"/>
-            <ac:spMk id="24" creationId="{4A090EF1-6793-7F91-0CA2-96EEEB00CE4B}"/>
-          </ac:spMkLst>
-        </pc:spChg>
-        <pc:spChg chg="add mod">
-          <ac:chgData name="Neill Campbell" userId="0c68e68e-714c-4571-8b4e-7246b46ba3fc" providerId="ADAL" clId="{2872F0AD-8577-4B4A-BC20-359B4B720F94}" dt="2023-11-29T09:03:29.311" v="255" actId="692"/>
-          <ac:spMkLst>
-            <pc:docMk/>
-            <pc:sldMk cId="3603508021" sldId="256"/>
-            <ac:spMk id="25" creationId="{B3D77738-786B-94B6-CE65-B4D0882AAC60}"/>
-          </ac:spMkLst>
-        </pc:spChg>
-        <pc:spChg chg="mod">
-          <ac:chgData name="Neill Campbell" userId="0c68e68e-714c-4571-8b4e-7246b46ba3fc" providerId="ADAL" clId="{2872F0AD-8577-4B4A-BC20-359B4B720F94}" dt="2023-11-29T09:03:29.311" v="255" actId="692"/>
-          <ac:spMkLst>
-            <pc:docMk/>
-            <pc:sldMk cId="3603508021" sldId="256"/>
-            <ac:spMk id="30" creationId="{9EA753D1-22D4-0DD5-32D8-9CBDEBC004AA}"/>
-          </ac:spMkLst>
-        </pc:spChg>
-        <pc:spChg chg="add mod">
-          <ac:chgData name="Neill Campbell" userId="0c68e68e-714c-4571-8b4e-7246b46ba3fc" providerId="ADAL" clId="{2872F0AD-8577-4B4A-BC20-359B4B720F94}" dt="2023-11-29T09:06:30.143" v="272" actId="114"/>
-          <ac:spMkLst>
-            <pc:docMk/>
-            <pc:sldMk cId="3603508021" sldId="256"/>
-            <ac:spMk id="31" creationId="{1E8FE586-1BAE-B304-E439-6490B7F4EC57}"/>
-          </ac:spMkLst>
-        </pc:spChg>
-        <pc:spChg chg="mod">
-          <ac:chgData name="Neill Campbell" userId="0c68e68e-714c-4571-8b4e-7246b46ba3fc" providerId="ADAL" clId="{2872F0AD-8577-4B4A-BC20-359B4B720F94}" dt="2023-11-29T09:03:29.311" v="255" actId="692"/>
-          <ac:spMkLst>
-            <pc:docMk/>
-            <pc:sldMk cId="3603508021" sldId="256"/>
-            <ac:spMk id="32" creationId="{13021375-BA68-5A67-D51C-1B437C075942}"/>
-          </ac:spMkLst>
-        </pc:spChg>
-        <pc:spChg chg="mod">
-          <ac:chgData name="Neill Campbell" userId="0c68e68e-714c-4571-8b4e-7246b46ba3fc" providerId="ADAL" clId="{2872F0AD-8577-4B4A-BC20-359B4B720F94}" dt="2023-11-29T09:03:29.311" v="255" actId="692"/>
-          <ac:spMkLst>
-            <pc:docMk/>
-            <pc:sldMk cId="3603508021" sldId="256"/>
-            <ac:spMk id="33" creationId="{CDF8F6E1-6D58-9152-635B-C32182B4B316}"/>
-          </ac:spMkLst>
-        </pc:spChg>
-        <pc:spChg chg="mod">
-          <ac:chgData name="Neill Campbell" userId="0c68e68e-714c-4571-8b4e-7246b46ba3fc" providerId="ADAL" clId="{2872F0AD-8577-4B4A-BC20-359B4B720F94}" dt="2023-11-29T09:03:29.311" v="255" actId="692"/>
-          <ac:spMkLst>
-            <pc:docMk/>
-            <pc:sldMk cId="3603508021" sldId="256"/>
-            <ac:spMk id="34" creationId="{60A9B999-AB80-E27F-E282-82B966A29EEE}"/>
-          </ac:spMkLst>
-        </pc:spChg>
-        <pc:spChg chg="mod">
-          <ac:chgData name="Neill Campbell" userId="0c68e68e-714c-4571-8b4e-7246b46ba3fc" providerId="ADAL" clId="{2872F0AD-8577-4B4A-BC20-359B4B720F94}" dt="2023-11-29T09:03:29.311" v="255" actId="692"/>
-          <ac:spMkLst>
-            <pc:docMk/>
-            <pc:sldMk cId="3603508021" sldId="256"/>
-            <ac:spMk id="36" creationId="{3147626C-0688-E86E-3C8A-53DF37C73CFC}"/>
-          </ac:spMkLst>
-        </pc:spChg>
-        <pc:cxnChg chg="mod">
-          <ac:chgData name="Neill Campbell" userId="0c68e68e-714c-4571-8b4e-7246b46ba3fc" providerId="ADAL" clId="{2872F0AD-8577-4B4A-BC20-359B4B720F94}" dt="2023-11-29T09:03:29.311" v="255" actId="692"/>
-          <ac:cxnSpMkLst>
-            <pc:docMk/>
-            <pc:sldMk cId="3603508021" sldId="256"/>
-            <ac:cxnSpMk id="26" creationId="{BC6C5890-2874-5D87-09C2-2C0B60EDBD3E}"/>
-          </ac:cxnSpMkLst>
-        </pc:cxnChg>
-        <pc:cxnChg chg="mod">
-          <ac:chgData name="Neill Campbell" userId="0c68e68e-714c-4571-8b4e-7246b46ba3fc" providerId="ADAL" clId="{2872F0AD-8577-4B4A-BC20-359B4B720F94}" dt="2023-11-29T09:03:29.311" v="255" actId="692"/>
-          <ac:cxnSpMkLst>
-            <pc:docMk/>
-            <pc:sldMk cId="3603508021" sldId="256"/>
-            <ac:cxnSpMk id="27" creationId="{24A64AFE-A7F5-93D5-4D04-5D438B11C0A3}"/>
-          </ac:cxnSpMkLst>
-        </pc:cxnChg>
-        <pc:cxnChg chg="mod">
-          <ac:chgData name="Neill Campbell" userId="0c68e68e-714c-4571-8b4e-7246b46ba3fc" providerId="ADAL" clId="{2872F0AD-8577-4B4A-BC20-359B4B720F94}" dt="2023-11-29T09:03:29.311" v="255" actId="692"/>
-          <ac:cxnSpMkLst>
-            <pc:docMk/>
-            <pc:sldMk cId="3603508021" sldId="256"/>
-            <ac:cxnSpMk id="28" creationId="{C57DF09C-C212-EC87-E4D5-ED4F2EF97896}"/>
-          </ac:cxnSpMkLst>
-        </pc:cxnChg>
-        <pc:cxnChg chg="mod">
-          <ac:chgData name="Neill Campbell" userId="0c68e68e-714c-4571-8b4e-7246b46ba3fc" providerId="ADAL" clId="{2872F0AD-8577-4B4A-BC20-359B4B720F94}" dt="2023-11-29T09:03:29.311" v="255" actId="692"/>
-          <ac:cxnSpMkLst>
-            <pc:docMk/>
-            <pc:sldMk cId="3603508021" sldId="256"/>
-            <ac:cxnSpMk id="29" creationId="{F8E6800A-2F4E-A089-D9A8-70D67ED6DF57}"/>
-          </ac:cxnSpMkLst>
-        </pc:cxnChg>
       </pc:sldChg>
       <pc:sldChg chg="addSp modSp mod">
         <pc:chgData name="Neill Campbell" userId="0c68e68e-714c-4571-8b4e-7246b46ba3fc" providerId="ADAL" clId="{2872F0AD-8577-4B4A-BC20-359B4B720F94}" dt="2023-11-29T09:06:35.478" v="273" actId="114"/>
@@ -736,94 +887,6 @@
           <pc:docMk/>
           <pc:sldMk cId="3630180020" sldId="257"/>
         </pc:sldMkLst>
-        <pc:spChg chg="add mod">
-          <ac:chgData name="Neill Campbell" userId="0c68e68e-714c-4571-8b4e-7246b46ba3fc" providerId="ADAL" clId="{2872F0AD-8577-4B4A-BC20-359B4B720F94}" dt="2023-11-29T09:06:35.478" v="273" actId="114"/>
-          <ac:spMkLst>
-            <pc:docMk/>
-            <pc:sldMk cId="3630180020" sldId="257"/>
-            <ac:spMk id="10" creationId="{D92C8AAE-4615-E2DD-5A35-AE346279F78A}"/>
-          </ac:spMkLst>
-        </pc:spChg>
-        <pc:spChg chg="mod">
-          <ac:chgData name="Neill Campbell" userId="0c68e68e-714c-4571-8b4e-7246b46ba3fc" providerId="ADAL" clId="{2872F0AD-8577-4B4A-BC20-359B4B720F94}" dt="2023-11-29T07:38:34.651" v="150" actId="207"/>
-          <ac:spMkLst>
-            <pc:docMk/>
-            <pc:sldMk cId="3630180020" sldId="257"/>
-            <ac:spMk id="11" creationId="{840E0AEB-3CF8-3E07-5CA2-88B7F493698A}"/>
-          </ac:spMkLst>
-        </pc:spChg>
-        <pc:spChg chg="mod">
-          <ac:chgData name="Neill Campbell" userId="0c68e68e-714c-4571-8b4e-7246b46ba3fc" providerId="ADAL" clId="{2872F0AD-8577-4B4A-BC20-359B4B720F94}" dt="2023-11-29T07:38:49.791" v="151" actId="113"/>
-          <ac:spMkLst>
-            <pc:docMk/>
-            <pc:sldMk cId="3630180020" sldId="257"/>
-            <ac:spMk id="12" creationId="{107654D5-60FE-9772-AE17-148F5AA0CAB5}"/>
-          </ac:spMkLst>
-        </pc:spChg>
-        <pc:spChg chg="mod">
-          <ac:chgData name="Neill Campbell" userId="0c68e68e-714c-4571-8b4e-7246b46ba3fc" providerId="ADAL" clId="{2872F0AD-8577-4B4A-BC20-359B4B720F94}" dt="2023-11-29T07:38:34.651" v="150" actId="207"/>
-          <ac:spMkLst>
-            <pc:docMk/>
-            <pc:sldMk cId="3630180020" sldId="257"/>
-            <ac:spMk id="17" creationId="{736823E6-B07C-858B-8A07-9222F666CA28}"/>
-          </ac:spMkLst>
-        </pc:spChg>
-        <pc:spChg chg="mod">
-          <ac:chgData name="Neill Campbell" userId="0c68e68e-714c-4571-8b4e-7246b46ba3fc" providerId="ADAL" clId="{2872F0AD-8577-4B4A-BC20-359B4B720F94}" dt="2023-11-29T07:38:34.651" v="150" actId="207"/>
-          <ac:spMkLst>
-            <pc:docMk/>
-            <pc:sldMk cId="3630180020" sldId="257"/>
-            <ac:spMk id="18" creationId="{69F893B2-8CBF-39D9-9249-170A9ED36F70}"/>
-          </ac:spMkLst>
-        </pc:spChg>
-        <pc:spChg chg="mod">
-          <ac:chgData name="Neill Campbell" userId="0c68e68e-714c-4571-8b4e-7246b46ba3fc" providerId="ADAL" clId="{2872F0AD-8577-4B4A-BC20-359B4B720F94}" dt="2023-11-29T07:38:34.651" v="150" actId="207"/>
-          <ac:spMkLst>
-            <pc:docMk/>
-            <pc:sldMk cId="3630180020" sldId="257"/>
-            <ac:spMk id="19" creationId="{093E9589-0C51-1952-9EAD-335864EE6654}"/>
-          </ac:spMkLst>
-        </pc:spChg>
-        <pc:spChg chg="mod">
-          <ac:chgData name="Neill Campbell" userId="0c68e68e-714c-4571-8b4e-7246b46ba3fc" providerId="ADAL" clId="{2872F0AD-8577-4B4A-BC20-359B4B720F94}" dt="2023-11-29T07:38:34.651" v="150" actId="207"/>
-          <ac:spMkLst>
-            <pc:docMk/>
-            <pc:sldMk cId="3630180020" sldId="257"/>
-            <ac:spMk id="20" creationId="{690468A8-7F2B-3EFB-DF32-E1EBF37F6AA1}"/>
-          </ac:spMkLst>
-        </pc:spChg>
-        <pc:spChg chg="mod">
-          <ac:chgData name="Neill Campbell" userId="0c68e68e-714c-4571-8b4e-7246b46ba3fc" providerId="ADAL" clId="{2872F0AD-8577-4B4A-BC20-359B4B720F94}" dt="2023-11-29T07:38:34.651" v="150" actId="207"/>
-          <ac:spMkLst>
-            <pc:docMk/>
-            <pc:sldMk cId="3630180020" sldId="257"/>
-            <ac:spMk id="21" creationId="{1A3EB27A-29BA-5F19-D88A-208F8CA8312A}"/>
-          </ac:spMkLst>
-        </pc:spChg>
-        <pc:spChg chg="mod">
-          <ac:chgData name="Neill Campbell" userId="0c68e68e-714c-4571-8b4e-7246b46ba3fc" providerId="ADAL" clId="{2872F0AD-8577-4B4A-BC20-359B4B720F94}" dt="2023-11-29T07:38:53.362" v="152" actId="113"/>
-          <ac:spMkLst>
-            <pc:docMk/>
-            <pc:sldMk cId="3630180020" sldId="257"/>
-            <ac:spMk id="22" creationId="{4660CBEA-96EA-3821-FBEC-2C821C644621}"/>
-          </ac:spMkLst>
-        </pc:spChg>
-        <pc:spChg chg="mod">
-          <ac:chgData name="Neill Campbell" userId="0c68e68e-714c-4571-8b4e-7246b46ba3fc" providerId="ADAL" clId="{2872F0AD-8577-4B4A-BC20-359B4B720F94}" dt="2023-11-29T07:38:34.651" v="150" actId="207"/>
-          <ac:spMkLst>
-            <pc:docMk/>
-            <pc:sldMk cId="3630180020" sldId="257"/>
-            <ac:spMk id="23" creationId="{0FDD5E12-AA74-CE8A-E035-0740E0216DC1}"/>
-          </ac:spMkLst>
-        </pc:spChg>
-        <pc:spChg chg="mod">
-          <ac:chgData name="Neill Campbell" userId="0c68e68e-714c-4571-8b4e-7246b46ba3fc" providerId="ADAL" clId="{2872F0AD-8577-4B4A-BC20-359B4B720F94}" dt="2023-11-29T07:38:34.651" v="150" actId="207"/>
-          <ac:spMkLst>
-            <pc:docMk/>
-            <pc:sldMk cId="3630180020" sldId="257"/>
-            <ac:spMk id="24" creationId="{4A090EF1-6793-7F91-0CA2-96EEEB00CE4B}"/>
-          </ac:spMkLst>
-        </pc:spChg>
       </pc:sldChg>
       <pc:sldChg chg="addSp delSp modSp add mod">
         <pc:chgData name="Neill Campbell" userId="0c68e68e-714c-4571-8b4e-7246b46ba3fc" providerId="ADAL" clId="{2872F0AD-8577-4B4A-BC20-359B4B720F94}" dt="2023-11-29T09:06:39.545" v="274" actId="114"/>
@@ -831,94 +894,6 @@
           <pc:docMk/>
           <pc:sldMk cId="3388442910" sldId="258"/>
         </pc:sldMkLst>
-        <pc:spChg chg="add mod">
-          <ac:chgData name="Neill Campbell" userId="0c68e68e-714c-4571-8b4e-7246b46ba3fc" providerId="ADAL" clId="{2872F0AD-8577-4B4A-BC20-359B4B720F94}" dt="2023-11-29T07:54:28.990" v="157" actId="1076"/>
-          <ac:spMkLst>
-            <pc:docMk/>
-            <pc:sldMk cId="3388442910" sldId="258"/>
-            <ac:spMk id="10" creationId="{D3BB708C-3177-199E-E30B-3DDF1983FF88}"/>
-          </ac:spMkLst>
-        </pc:spChg>
-        <pc:spChg chg="add mod">
-          <ac:chgData name="Neill Campbell" userId="0c68e68e-714c-4571-8b4e-7246b46ba3fc" providerId="ADAL" clId="{2872F0AD-8577-4B4A-BC20-359B4B720F94}" dt="2023-11-29T09:06:39.545" v="274" actId="114"/>
-          <ac:spMkLst>
-            <pc:docMk/>
-            <pc:sldMk cId="3388442910" sldId="258"/>
-            <ac:spMk id="13" creationId="{7FE8724C-6B77-7624-D27D-F518F57FD36C}"/>
-          </ac:spMkLst>
-        </pc:spChg>
-        <pc:spChg chg="del">
-          <ac:chgData name="Neill Campbell" userId="0c68e68e-714c-4571-8b4e-7246b46ba3fc" providerId="ADAL" clId="{2872F0AD-8577-4B4A-BC20-359B4B720F94}" dt="2023-11-29T07:54:13.945" v="154" actId="478"/>
-          <ac:spMkLst>
-            <pc:docMk/>
-            <pc:sldMk cId="3388442910" sldId="258"/>
-            <ac:spMk id="17" creationId="{736823E6-B07C-858B-8A07-9222F666CA28}"/>
-          </ac:spMkLst>
-        </pc:spChg>
-        <pc:spChg chg="del">
-          <ac:chgData name="Neill Campbell" userId="0c68e68e-714c-4571-8b4e-7246b46ba3fc" providerId="ADAL" clId="{2872F0AD-8577-4B4A-BC20-359B4B720F94}" dt="2023-11-29T07:54:13.945" v="154" actId="478"/>
-          <ac:spMkLst>
-            <pc:docMk/>
-            <pc:sldMk cId="3388442910" sldId="258"/>
-            <ac:spMk id="18" creationId="{69F893B2-8CBF-39D9-9249-170A9ED36F70}"/>
-          </ac:spMkLst>
-        </pc:spChg>
-        <pc:spChg chg="del">
-          <ac:chgData name="Neill Campbell" userId="0c68e68e-714c-4571-8b4e-7246b46ba3fc" providerId="ADAL" clId="{2872F0AD-8577-4B4A-BC20-359B4B720F94}" dt="2023-11-29T07:54:13.945" v="154" actId="478"/>
-          <ac:spMkLst>
-            <pc:docMk/>
-            <pc:sldMk cId="3388442910" sldId="258"/>
-            <ac:spMk id="19" creationId="{093E9589-0C51-1952-9EAD-335864EE6654}"/>
-          </ac:spMkLst>
-        </pc:spChg>
-        <pc:spChg chg="del">
-          <ac:chgData name="Neill Campbell" userId="0c68e68e-714c-4571-8b4e-7246b46ba3fc" providerId="ADAL" clId="{2872F0AD-8577-4B4A-BC20-359B4B720F94}" dt="2023-11-29T07:54:13.945" v="154" actId="478"/>
-          <ac:spMkLst>
-            <pc:docMk/>
-            <pc:sldMk cId="3388442910" sldId="258"/>
-            <ac:spMk id="20" creationId="{690468A8-7F2B-3EFB-DF32-E1EBF37F6AA1}"/>
-          </ac:spMkLst>
-        </pc:spChg>
-        <pc:spChg chg="del">
-          <ac:chgData name="Neill Campbell" userId="0c68e68e-714c-4571-8b4e-7246b46ba3fc" providerId="ADAL" clId="{2872F0AD-8577-4B4A-BC20-359B4B720F94}" dt="2023-11-29T07:54:13.945" v="154" actId="478"/>
-          <ac:spMkLst>
-            <pc:docMk/>
-            <pc:sldMk cId="3388442910" sldId="258"/>
-            <ac:spMk id="21" creationId="{1A3EB27A-29BA-5F19-D88A-208F8CA8312A}"/>
-          </ac:spMkLst>
-        </pc:spChg>
-        <pc:spChg chg="del">
-          <ac:chgData name="Neill Campbell" userId="0c68e68e-714c-4571-8b4e-7246b46ba3fc" providerId="ADAL" clId="{2872F0AD-8577-4B4A-BC20-359B4B720F94}" dt="2023-11-29T07:54:13.945" v="154" actId="478"/>
-          <ac:spMkLst>
-            <pc:docMk/>
-            <pc:sldMk cId="3388442910" sldId="258"/>
-            <ac:spMk id="22" creationId="{4660CBEA-96EA-3821-FBEC-2C821C644621}"/>
-          </ac:spMkLst>
-        </pc:spChg>
-        <pc:spChg chg="del">
-          <ac:chgData name="Neill Campbell" userId="0c68e68e-714c-4571-8b4e-7246b46ba3fc" providerId="ADAL" clId="{2872F0AD-8577-4B4A-BC20-359B4B720F94}" dt="2023-11-29T07:54:13.945" v="154" actId="478"/>
-          <ac:spMkLst>
-            <pc:docMk/>
-            <pc:sldMk cId="3388442910" sldId="258"/>
-            <ac:spMk id="23" creationId="{0FDD5E12-AA74-CE8A-E035-0740E0216DC1}"/>
-          </ac:spMkLst>
-        </pc:spChg>
-        <pc:spChg chg="del">
-          <ac:chgData name="Neill Campbell" userId="0c68e68e-714c-4571-8b4e-7246b46ba3fc" providerId="ADAL" clId="{2872F0AD-8577-4B4A-BC20-359B4B720F94}" dt="2023-11-29T07:54:13.945" v="154" actId="478"/>
-          <ac:spMkLst>
-            <pc:docMk/>
-            <pc:sldMk cId="3388442910" sldId="258"/>
-            <ac:spMk id="24" creationId="{4A090EF1-6793-7F91-0CA2-96EEEB00CE4B}"/>
-          </ac:spMkLst>
-        </pc:spChg>
-        <pc:cxnChg chg="del">
-          <ac:chgData name="Neill Campbell" userId="0c68e68e-714c-4571-8b4e-7246b46ba3fc" providerId="ADAL" clId="{2872F0AD-8577-4B4A-BC20-359B4B720F94}" dt="2023-11-29T07:54:15.659" v="155" actId="478"/>
-          <ac:cxnSpMkLst>
-            <pc:docMk/>
-            <pc:sldMk cId="3388442910" sldId="258"/>
-            <ac:cxnSpMk id="29" creationId="{F8E6800A-2F4E-A089-D9A8-70D67ED6DF57}"/>
-          </ac:cxnSpMkLst>
-        </pc:cxnChg>
       </pc:sldChg>
     </pc:docChg>
   </pc:docChgLst>
@@ -1074,7 +1049,7 @@
           <a:p>
             <a:fld id="{B751627B-DBBE-4B6C-93C3-7AC219ABBF58}" type="datetimeFigureOut">
               <a:rPr lang="en-GB" smtClean="0"/>
-              <a:t>29/11/2023</a:t>
+              <a:t>24/11/2025</a:t>
             </a:fld>
             <a:endParaRPr lang="en-GB"/>
           </a:p>
@@ -1274,7 +1249,7 @@
           <a:p>
             <a:fld id="{B751627B-DBBE-4B6C-93C3-7AC219ABBF58}" type="datetimeFigureOut">
               <a:rPr lang="en-GB" smtClean="0"/>
-              <a:t>29/11/2023</a:t>
+              <a:t>24/11/2025</a:t>
             </a:fld>
             <a:endParaRPr lang="en-GB"/>
           </a:p>
@@ -1484,7 +1459,7 @@
           <a:p>
             <a:fld id="{B751627B-DBBE-4B6C-93C3-7AC219ABBF58}" type="datetimeFigureOut">
               <a:rPr lang="en-GB" smtClean="0"/>
-              <a:t>29/11/2023</a:t>
+              <a:t>24/11/2025</a:t>
             </a:fld>
             <a:endParaRPr lang="en-GB"/>
           </a:p>
@@ -1684,7 +1659,7 @@
           <a:p>
             <a:fld id="{B751627B-DBBE-4B6C-93C3-7AC219ABBF58}" type="datetimeFigureOut">
               <a:rPr lang="en-GB" smtClean="0"/>
-              <a:t>29/11/2023</a:t>
+              <a:t>24/11/2025</a:t>
             </a:fld>
             <a:endParaRPr lang="en-GB"/>
           </a:p>
@@ -1960,7 +1935,7 @@
           <a:p>
             <a:fld id="{B751627B-DBBE-4B6C-93C3-7AC219ABBF58}" type="datetimeFigureOut">
               <a:rPr lang="en-GB" smtClean="0"/>
-              <a:t>29/11/2023</a:t>
+              <a:t>24/11/2025</a:t>
             </a:fld>
             <a:endParaRPr lang="en-GB"/>
           </a:p>
@@ -2228,7 +2203,7 @@
           <a:p>
             <a:fld id="{B751627B-DBBE-4B6C-93C3-7AC219ABBF58}" type="datetimeFigureOut">
               <a:rPr lang="en-GB" smtClean="0"/>
-              <a:t>29/11/2023</a:t>
+              <a:t>24/11/2025</a:t>
             </a:fld>
             <a:endParaRPr lang="en-GB"/>
           </a:p>
@@ -2643,7 +2618,7 @@
           <a:p>
             <a:fld id="{B751627B-DBBE-4B6C-93C3-7AC219ABBF58}" type="datetimeFigureOut">
               <a:rPr lang="en-GB" smtClean="0"/>
-              <a:t>29/11/2023</a:t>
+              <a:t>24/11/2025</a:t>
             </a:fld>
             <a:endParaRPr lang="en-GB"/>
           </a:p>
@@ -2785,7 +2760,7 @@
           <a:p>
             <a:fld id="{B751627B-DBBE-4B6C-93C3-7AC219ABBF58}" type="datetimeFigureOut">
               <a:rPr lang="en-GB" smtClean="0"/>
-              <a:t>29/11/2023</a:t>
+              <a:t>24/11/2025</a:t>
             </a:fld>
             <a:endParaRPr lang="en-GB"/>
           </a:p>
@@ -2898,7 +2873,7 @@
           <a:p>
             <a:fld id="{B751627B-DBBE-4B6C-93C3-7AC219ABBF58}" type="datetimeFigureOut">
               <a:rPr lang="en-GB" smtClean="0"/>
-              <a:t>29/11/2023</a:t>
+              <a:t>24/11/2025</a:t>
             </a:fld>
             <a:endParaRPr lang="en-GB"/>
           </a:p>
@@ -3211,7 +3186,7 @@
           <a:p>
             <a:fld id="{B751627B-DBBE-4B6C-93C3-7AC219ABBF58}" type="datetimeFigureOut">
               <a:rPr lang="en-GB" smtClean="0"/>
-              <a:t>29/11/2023</a:t>
+              <a:t>24/11/2025</a:t>
             </a:fld>
             <a:endParaRPr lang="en-GB"/>
           </a:p>
@@ -3500,7 +3475,7 @@
           <a:p>
             <a:fld id="{B751627B-DBBE-4B6C-93C3-7AC219ABBF58}" type="datetimeFigureOut">
               <a:rPr lang="en-GB" smtClean="0"/>
-              <a:t>29/11/2023</a:t>
+              <a:t>24/11/2025</a:t>
             </a:fld>
             <a:endParaRPr lang="en-GB"/>
           </a:p>
@@ -3743,7 +3718,7 @@
           <a:p>
             <a:fld id="{B751627B-DBBE-4B6C-93C3-7AC219ABBF58}" type="datetimeFigureOut">
               <a:rPr lang="en-GB" smtClean="0"/>
-              <a:t>29/11/2023</a:t>
+              <a:t>24/11/2025</a:t>
             </a:fld>
             <a:endParaRPr lang="en-GB"/>
           </a:p>
@@ -6205,10 +6180,10 @@
       </p:grpSpPr>
       <p:sp>
         <p:nvSpPr>
-          <p:cNvPr id="4" name="Rectangle 3">
-            <a:extLst>
-              <a:ext uri="{FF2B5EF4-FFF2-40B4-BE49-F238E27FC236}">
-                <a16:creationId xmlns:a16="http://schemas.microsoft.com/office/drawing/2014/main" id="{B578E923-9CE7-614B-1115-25BEC7C7152C}"/>
+          <p:cNvPr id="8" name="Rectangle 7">
+            <a:extLst>
+              <a:ext uri="{FF2B5EF4-FFF2-40B4-BE49-F238E27FC236}">
+                <a16:creationId xmlns:a16="http://schemas.microsoft.com/office/drawing/2014/main" id="{8ED5562F-7F71-2A62-8990-7B685D94BFBF}"/>
               </a:ext>
             </a:extLst>
           </p:cNvPr>
@@ -6217,7 +6192,7 @@
         </p:nvSpPr>
         <p:spPr>
           <a:xfrm>
-            <a:off x="4572000" y="2140085"/>
+            <a:off x="5496786" y="4151338"/>
             <a:ext cx="379379" cy="359924"/>
           </a:xfrm>
           <a:prstGeom prst="rect">
@@ -6262,1027 +6237,12 @@
           </a:p>
         </p:txBody>
       </p:sp>
-      <p:sp>
-        <p:nvSpPr>
-          <p:cNvPr id="5" name="Rectangle 4">
-            <a:extLst>
-              <a:ext uri="{FF2B5EF4-FFF2-40B4-BE49-F238E27FC236}">
-                <a16:creationId xmlns:a16="http://schemas.microsoft.com/office/drawing/2014/main" id="{69CE46A2-C57D-45E3-5AA1-7A21154BE631}"/>
-              </a:ext>
-            </a:extLst>
-          </p:cNvPr>
-          <p:cNvSpPr/>
-          <p:nvPr/>
-        </p:nvSpPr>
-        <p:spPr>
-          <a:xfrm>
-            <a:off x="4572000" y="2500009"/>
-            <a:ext cx="379379" cy="359924"/>
-          </a:xfrm>
-          <a:prstGeom prst="rect">
-            <a:avLst/>
-          </a:prstGeom>
-          <a:noFill/>
-          <a:ln w="19050">
-            <a:solidFill>
-              <a:schemeClr val="accent2">
-                <a:lumMod val="60000"/>
-                <a:lumOff val="40000"/>
-              </a:schemeClr>
-            </a:solidFill>
-          </a:ln>
-        </p:spPr>
-        <p:style>
-          <a:lnRef idx="2">
-            <a:schemeClr val="accent2">
-              <a:shade val="15000"/>
-            </a:schemeClr>
-          </a:lnRef>
-          <a:fillRef idx="1">
-            <a:schemeClr val="accent2"/>
-          </a:fillRef>
-          <a:effectRef idx="0">
-            <a:schemeClr val="accent2"/>
-          </a:effectRef>
-          <a:fontRef idx="minor">
-            <a:schemeClr val="lt1"/>
-          </a:fontRef>
-        </p:style>
-        <p:txBody>
-          <a:bodyPr rtlCol="0" anchor="ctr"/>
-          <a:lstStyle/>
-          <a:p>
-            <a:pPr algn="ctr"/>
-            <a:endParaRPr lang="en-GB" sz="1200">
-              <a:solidFill>
-                <a:schemeClr val="tx1"/>
-              </a:solidFill>
-            </a:endParaRPr>
-          </a:p>
-        </p:txBody>
-      </p:sp>
-      <p:sp>
-        <p:nvSpPr>
-          <p:cNvPr id="6" name="Rectangle 5">
-            <a:extLst>
-              <a:ext uri="{FF2B5EF4-FFF2-40B4-BE49-F238E27FC236}">
-                <a16:creationId xmlns:a16="http://schemas.microsoft.com/office/drawing/2014/main" id="{553E75FF-3503-4E90-6B60-811E91DC3CA5}"/>
-              </a:ext>
-            </a:extLst>
-          </p:cNvPr>
-          <p:cNvSpPr/>
-          <p:nvPr/>
-        </p:nvSpPr>
-        <p:spPr>
-          <a:xfrm>
-            <a:off x="4572000" y="2859933"/>
-            <a:ext cx="379379" cy="359924"/>
-          </a:xfrm>
-          <a:prstGeom prst="rect">
-            <a:avLst/>
-          </a:prstGeom>
-          <a:noFill/>
-          <a:ln w="19050">
-            <a:solidFill>
-              <a:schemeClr val="accent2">
-                <a:lumMod val="60000"/>
-                <a:lumOff val="40000"/>
-              </a:schemeClr>
-            </a:solidFill>
-          </a:ln>
-        </p:spPr>
-        <p:style>
-          <a:lnRef idx="2">
-            <a:schemeClr val="accent2">
-              <a:shade val="15000"/>
-            </a:schemeClr>
-          </a:lnRef>
-          <a:fillRef idx="1">
-            <a:schemeClr val="accent2"/>
-          </a:fillRef>
-          <a:effectRef idx="0">
-            <a:schemeClr val="accent2"/>
-          </a:effectRef>
-          <a:fontRef idx="minor">
-            <a:schemeClr val="lt1"/>
-          </a:fontRef>
-        </p:style>
-        <p:txBody>
-          <a:bodyPr rtlCol="0" anchor="ctr"/>
-          <a:lstStyle/>
-          <a:p>
-            <a:pPr algn="ctr"/>
-            <a:endParaRPr lang="en-GB" sz="1200">
-              <a:solidFill>
-                <a:schemeClr val="tx1"/>
-              </a:solidFill>
-            </a:endParaRPr>
-          </a:p>
-        </p:txBody>
-      </p:sp>
-      <p:sp>
-        <p:nvSpPr>
-          <p:cNvPr id="7" name="Rectangle 6">
-            <a:extLst>
-              <a:ext uri="{FF2B5EF4-FFF2-40B4-BE49-F238E27FC236}">
-                <a16:creationId xmlns:a16="http://schemas.microsoft.com/office/drawing/2014/main" id="{A629C68F-2AC3-7FDD-FE9E-D1C7540178C5}"/>
-              </a:ext>
-            </a:extLst>
-          </p:cNvPr>
-          <p:cNvSpPr/>
-          <p:nvPr/>
-        </p:nvSpPr>
-        <p:spPr>
-          <a:xfrm>
-            <a:off x="4571999" y="3219857"/>
-            <a:ext cx="379379" cy="359924"/>
-          </a:xfrm>
-          <a:prstGeom prst="rect">
-            <a:avLst/>
-          </a:prstGeom>
-          <a:noFill/>
-          <a:ln w="19050">
-            <a:solidFill>
-              <a:schemeClr val="accent2">
-                <a:lumMod val="60000"/>
-                <a:lumOff val="40000"/>
-              </a:schemeClr>
-            </a:solidFill>
-          </a:ln>
-        </p:spPr>
-        <p:style>
-          <a:lnRef idx="2">
-            <a:schemeClr val="accent2">
-              <a:shade val="15000"/>
-            </a:schemeClr>
-          </a:lnRef>
-          <a:fillRef idx="1">
-            <a:schemeClr val="accent2"/>
-          </a:fillRef>
-          <a:effectRef idx="0">
-            <a:schemeClr val="accent2"/>
-          </a:effectRef>
-          <a:fontRef idx="minor">
-            <a:schemeClr val="lt1"/>
-          </a:fontRef>
-        </p:style>
-        <p:txBody>
-          <a:bodyPr rtlCol="0" anchor="ctr"/>
-          <a:lstStyle/>
-          <a:p>
-            <a:pPr algn="ctr"/>
-            <a:endParaRPr lang="en-GB" sz="1200">
-              <a:solidFill>
-                <a:schemeClr val="tx1"/>
-              </a:solidFill>
-            </a:endParaRPr>
-          </a:p>
-        </p:txBody>
-      </p:sp>
-      <p:sp>
-        <p:nvSpPr>
-          <p:cNvPr id="8" name="Rectangle 7">
-            <a:extLst>
-              <a:ext uri="{FF2B5EF4-FFF2-40B4-BE49-F238E27FC236}">
-                <a16:creationId xmlns:a16="http://schemas.microsoft.com/office/drawing/2014/main" id="{8ED5562F-7F71-2A62-8990-7B685D94BFBF}"/>
-              </a:ext>
-            </a:extLst>
-          </p:cNvPr>
-          <p:cNvSpPr/>
-          <p:nvPr/>
-        </p:nvSpPr>
-        <p:spPr>
-          <a:xfrm>
-            <a:off x="4571997" y="4215346"/>
-            <a:ext cx="379379" cy="359924"/>
-          </a:xfrm>
-          <a:prstGeom prst="rect">
-            <a:avLst/>
-          </a:prstGeom>
-          <a:noFill/>
-          <a:ln w="19050">
-            <a:solidFill>
-              <a:schemeClr val="accent2">
-                <a:lumMod val="60000"/>
-                <a:lumOff val="40000"/>
-              </a:schemeClr>
-            </a:solidFill>
-          </a:ln>
-        </p:spPr>
-        <p:style>
-          <a:lnRef idx="2">
-            <a:schemeClr val="accent2">
-              <a:shade val="15000"/>
-            </a:schemeClr>
-          </a:lnRef>
-          <a:fillRef idx="1">
-            <a:schemeClr val="accent2"/>
-          </a:fillRef>
-          <a:effectRef idx="0">
-            <a:schemeClr val="accent2"/>
-          </a:effectRef>
-          <a:fontRef idx="minor">
-            <a:schemeClr val="lt1"/>
-          </a:fontRef>
-        </p:style>
-        <p:txBody>
-          <a:bodyPr rtlCol="0" anchor="ctr"/>
-          <a:lstStyle/>
-          <a:p>
-            <a:pPr algn="ctr"/>
-            <a:endParaRPr lang="en-GB" sz="1200">
-              <a:solidFill>
-                <a:schemeClr val="tx1"/>
-              </a:solidFill>
-            </a:endParaRPr>
-          </a:p>
-        </p:txBody>
-      </p:sp>
-      <p:sp>
-        <p:nvSpPr>
-          <p:cNvPr id="9" name="Rectangle 8">
-            <a:extLst>
-              <a:ext uri="{FF2B5EF4-FFF2-40B4-BE49-F238E27FC236}">
-                <a16:creationId xmlns:a16="http://schemas.microsoft.com/office/drawing/2014/main" id="{2F289767-1E89-5F3D-EDE9-92C79F22B3BA}"/>
-              </a:ext>
-            </a:extLst>
-          </p:cNvPr>
-          <p:cNvSpPr/>
-          <p:nvPr/>
-        </p:nvSpPr>
-        <p:spPr>
-          <a:xfrm>
-            <a:off x="4571998" y="4575270"/>
-            <a:ext cx="379379" cy="359924"/>
-          </a:xfrm>
-          <a:prstGeom prst="rect">
-            <a:avLst/>
-          </a:prstGeom>
-          <a:noFill/>
-          <a:ln w="19050">
-            <a:solidFill>
-              <a:schemeClr val="accent2">
-                <a:lumMod val="60000"/>
-                <a:lumOff val="40000"/>
-              </a:schemeClr>
-            </a:solidFill>
-          </a:ln>
-        </p:spPr>
-        <p:style>
-          <a:lnRef idx="2">
-            <a:schemeClr val="accent2">
-              <a:shade val="15000"/>
-            </a:schemeClr>
-          </a:lnRef>
-          <a:fillRef idx="1">
-            <a:schemeClr val="accent2"/>
-          </a:fillRef>
-          <a:effectRef idx="0">
-            <a:schemeClr val="accent2"/>
-          </a:effectRef>
-          <a:fontRef idx="minor">
-            <a:schemeClr val="lt1"/>
-          </a:fontRef>
-        </p:style>
-        <p:txBody>
-          <a:bodyPr rtlCol="0" anchor="ctr"/>
-          <a:lstStyle/>
-          <a:p>
-            <a:pPr algn="ctr"/>
-            <a:endParaRPr lang="en-GB" sz="1200">
-              <a:solidFill>
-                <a:schemeClr val="tx1"/>
-              </a:solidFill>
-            </a:endParaRPr>
-          </a:p>
-        </p:txBody>
-      </p:sp>
-      <p:sp>
-        <p:nvSpPr>
-          <p:cNvPr id="11" name="Rectangle 10">
-            <a:extLst>
-              <a:ext uri="{FF2B5EF4-FFF2-40B4-BE49-F238E27FC236}">
-                <a16:creationId xmlns:a16="http://schemas.microsoft.com/office/drawing/2014/main" id="{840E0AEB-3CF8-3E07-5CA2-88B7F493698A}"/>
-              </a:ext>
-            </a:extLst>
-          </p:cNvPr>
-          <p:cNvSpPr/>
-          <p:nvPr/>
-        </p:nvSpPr>
-        <p:spPr>
-          <a:xfrm>
-            <a:off x="5361124" y="2500009"/>
-            <a:ext cx="379379" cy="359924"/>
-          </a:xfrm>
-          <a:prstGeom prst="rect">
-            <a:avLst/>
-          </a:prstGeom>
-          <a:noFill/>
-          <a:ln w="19050">
-            <a:solidFill>
-              <a:schemeClr val="accent2">
-                <a:lumMod val="60000"/>
-                <a:lumOff val="40000"/>
-              </a:schemeClr>
-            </a:solidFill>
-          </a:ln>
-        </p:spPr>
-        <p:style>
-          <a:lnRef idx="2">
-            <a:schemeClr val="accent2">
-              <a:shade val="15000"/>
-            </a:schemeClr>
-          </a:lnRef>
-          <a:fillRef idx="1">
-            <a:schemeClr val="accent2"/>
-          </a:fillRef>
-          <a:effectRef idx="0">
-            <a:schemeClr val="accent2"/>
-          </a:effectRef>
-          <a:fontRef idx="minor">
-            <a:schemeClr val="lt1"/>
-          </a:fontRef>
-        </p:style>
-        <p:txBody>
-          <a:bodyPr rtlCol="0" anchor="ctr"/>
-          <a:lstStyle/>
-          <a:p>
-            <a:pPr algn="ctr"/>
-            <a:r>
-              <a:rPr lang="en-US" sz="1200" dirty="0">
-                <a:solidFill>
-                  <a:schemeClr val="tx1">
-                    <a:alpha val="16000"/>
-                  </a:schemeClr>
-                </a:solidFill>
-              </a:rPr>
-              <a:t> 1</a:t>
-            </a:r>
-            <a:endParaRPr lang="en-GB" sz="1200" dirty="0">
-              <a:solidFill>
-                <a:schemeClr val="tx1">
-                  <a:alpha val="16000"/>
-                </a:schemeClr>
-              </a:solidFill>
-            </a:endParaRPr>
-          </a:p>
-        </p:txBody>
-      </p:sp>
-      <p:sp>
-        <p:nvSpPr>
-          <p:cNvPr id="12" name="Rectangle 11">
-            <a:extLst>
-              <a:ext uri="{FF2B5EF4-FFF2-40B4-BE49-F238E27FC236}">
-                <a16:creationId xmlns:a16="http://schemas.microsoft.com/office/drawing/2014/main" id="{107654D5-60FE-9772-AE17-148F5AA0CAB5}"/>
-              </a:ext>
-            </a:extLst>
-          </p:cNvPr>
-          <p:cNvSpPr/>
-          <p:nvPr/>
-        </p:nvSpPr>
-        <p:spPr>
-          <a:xfrm>
-            <a:off x="5740503" y="2500009"/>
-            <a:ext cx="379379" cy="359924"/>
-          </a:xfrm>
-          <a:prstGeom prst="rect">
-            <a:avLst/>
-          </a:prstGeom>
-          <a:solidFill>
-            <a:schemeClr val="accent2">
-              <a:lumMod val="60000"/>
-              <a:lumOff val="40000"/>
-            </a:schemeClr>
-          </a:solidFill>
-          <a:ln w="19050">
-            <a:solidFill>
-              <a:schemeClr val="accent2">
-                <a:lumMod val="60000"/>
-                <a:lumOff val="40000"/>
-              </a:schemeClr>
-            </a:solidFill>
-          </a:ln>
-        </p:spPr>
-        <p:style>
-          <a:lnRef idx="2">
-            <a:schemeClr val="accent2">
-              <a:shade val="15000"/>
-            </a:schemeClr>
-          </a:lnRef>
-          <a:fillRef idx="1">
-            <a:schemeClr val="accent2"/>
-          </a:fillRef>
-          <a:effectRef idx="0">
-            <a:schemeClr val="accent2"/>
-          </a:effectRef>
-          <a:fontRef idx="minor">
-            <a:schemeClr val="lt1"/>
-          </a:fontRef>
-        </p:style>
-        <p:txBody>
-          <a:bodyPr rtlCol="0" anchor="ctr"/>
-          <a:lstStyle/>
-          <a:p>
-            <a:pPr algn="ctr"/>
-            <a:r>
-              <a:rPr lang="en-US" sz="1200" b="1" dirty="0">
-                <a:solidFill>
-                  <a:schemeClr val="tx1">
-                    <a:alpha val="44000"/>
-                  </a:schemeClr>
-                </a:solidFill>
-              </a:rPr>
-              <a:t>2</a:t>
-            </a:r>
-            <a:endParaRPr lang="en-GB" sz="1200" b="1" dirty="0">
-              <a:solidFill>
-                <a:schemeClr val="tx1">
-                  <a:alpha val="44000"/>
-                </a:schemeClr>
-              </a:solidFill>
-            </a:endParaRPr>
-          </a:p>
-        </p:txBody>
-      </p:sp>
-      <p:sp>
-        <p:nvSpPr>
-          <p:cNvPr id="17" name="Rectangle 16">
-            <a:extLst>
-              <a:ext uri="{FF2B5EF4-FFF2-40B4-BE49-F238E27FC236}">
-                <a16:creationId xmlns:a16="http://schemas.microsoft.com/office/drawing/2014/main" id="{736823E6-B07C-858B-8A07-9222F666CA28}"/>
-              </a:ext>
-            </a:extLst>
-          </p:cNvPr>
-          <p:cNvSpPr/>
-          <p:nvPr/>
-        </p:nvSpPr>
-        <p:spPr>
-          <a:xfrm>
-            <a:off x="5361124" y="3219857"/>
-            <a:ext cx="379379" cy="359924"/>
-          </a:xfrm>
-          <a:prstGeom prst="rect">
-            <a:avLst/>
-          </a:prstGeom>
-          <a:noFill/>
-          <a:ln w="19050">
-            <a:solidFill>
-              <a:schemeClr val="accent2">
-                <a:lumMod val="60000"/>
-                <a:lumOff val="40000"/>
-              </a:schemeClr>
-            </a:solidFill>
-          </a:ln>
-        </p:spPr>
-        <p:style>
-          <a:lnRef idx="2">
-            <a:schemeClr val="accent2">
-              <a:shade val="15000"/>
-            </a:schemeClr>
-          </a:lnRef>
-          <a:fillRef idx="1">
-            <a:schemeClr val="accent2"/>
-          </a:fillRef>
-          <a:effectRef idx="0">
-            <a:schemeClr val="accent2"/>
-          </a:effectRef>
-          <a:fontRef idx="minor">
-            <a:schemeClr val="lt1"/>
-          </a:fontRef>
-        </p:style>
-        <p:txBody>
-          <a:bodyPr rtlCol="0" anchor="ctr"/>
-          <a:lstStyle/>
-          <a:p>
-            <a:pPr algn="ctr"/>
-            <a:r>
-              <a:rPr lang="en-US" sz="1200" dirty="0">
-                <a:solidFill>
-                  <a:schemeClr val="tx1">
-                    <a:alpha val="16000"/>
-                  </a:schemeClr>
-                </a:solidFill>
-              </a:rPr>
-              <a:t>7</a:t>
-            </a:r>
-            <a:endParaRPr lang="en-GB" sz="1200" dirty="0">
-              <a:solidFill>
-                <a:schemeClr val="tx1">
-                  <a:alpha val="16000"/>
-                </a:schemeClr>
-              </a:solidFill>
-            </a:endParaRPr>
-          </a:p>
-        </p:txBody>
-      </p:sp>
-      <p:sp>
-        <p:nvSpPr>
-          <p:cNvPr id="18" name="Rectangle 17">
-            <a:extLst>
-              <a:ext uri="{FF2B5EF4-FFF2-40B4-BE49-F238E27FC236}">
-                <a16:creationId xmlns:a16="http://schemas.microsoft.com/office/drawing/2014/main" id="{69F893B2-8CBF-39D9-9249-170A9ED36F70}"/>
-              </a:ext>
-            </a:extLst>
-          </p:cNvPr>
-          <p:cNvSpPr/>
-          <p:nvPr/>
-        </p:nvSpPr>
-        <p:spPr>
-          <a:xfrm>
-            <a:off x="5740503" y="3219857"/>
-            <a:ext cx="379379" cy="359924"/>
-          </a:xfrm>
-          <a:prstGeom prst="rect">
-            <a:avLst/>
-          </a:prstGeom>
-          <a:noFill/>
-          <a:ln w="19050">
-            <a:solidFill>
-              <a:schemeClr val="accent2">
-                <a:lumMod val="60000"/>
-                <a:lumOff val="40000"/>
-              </a:schemeClr>
-            </a:solidFill>
-          </a:ln>
-        </p:spPr>
-        <p:style>
-          <a:lnRef idx="2">
-            <a:schemeClr val="accent2">
-              <a:shade val="15000"/>
-            </a:schemeClr>
-          </a:lnRef>
-          <a:fillRef idx="1">
-            <a:schemeClr val="accent2"/>
-          </a:fillRef>
-          <a:effectRef idx="0">
-            <a:schemeClr val="accent2"/>
-          </a:effectRef>
-          <a:fontRef idx="minor">
-            <a:schemeClr val="lt1"/>
-          </a:fontRef>
-        </p:style>
-        <p:txBody>
-          <a:bodyPr rtlCol="0" anchor="ctr"/>
-          <a:lstStyle/>
-          <a:p>
-            <a:pPr algn="ctr"/>
-            <a:r>
-              <a:rPr lang="en-US" sz="1200" dirty="0">
-                <a:solidFill>
-                  <a:schemeClr val="tx1">
-                    <a:alpha val="16000"/>
-                  </a:schemeClr>
-                </a:solidFill>
-              </a:rPr>
-              <a:t>8</a:t>
-            </a:r>
-            <a:endParaRPr lang="en-GB" sz="1200" dirty="0">
-              <a:solidFill>
-                <a:schemeClr val="tx1">
-                  <a:alpha val="16000"/>
-                </a:schemeClr>
-              </a:solidFill>
-            </a:endParaRPr>
-          </a:p>
-        </p:txBody>
-      </p:sp>
-      <p:sp>
-        <p:nvSpPr>
-          <p:cNvPr id="19" name="Rectangle 18">
-            <a:extLst>
-              <a:ext uri="{FF2B5EF4-FFF2-40B4-BE49-F238E27FC236}">
-                <a16:creationId xmlns:a16="http://schemas.microsoft.com/office/drawing/2014/main" id="{093E9589-0C51-1952-9EAD-335864EE6654}"/>
-              </a:ext>
-            </a:extLst>
-          </p:cNvPr>
-          <p:cNvSpPr/>
-          <p:nvPr/>
-        </p:nvSpPr>
-        <p:spPr>
-          <a:xfrm>
-            <a:off x="6119882" y="3219857"/>
-            <a:ext cx="379379" cy="359924"/>
-          </a:xfrm>
-          <a:prstGeom prst="rect">
-            <a:avLst/>
-          </a:prstGeom>
-          <a:noFill/>
-          <a:ln w="19050">
-            <a:solidFill>
-              <a:schemeClr val="accent2">
-                <a:lumMod val="60000"/>
-                <a:lumOff val="40000"/>
-              </a:schemeClr>
-            </a:solidFill>
-          </a:ln>
-        </p:spPr>
-        <p:style>
-          <a:lnRef idx="2">
-            <a:schemeClr val="accent2">
-              <a:shade val="15000"/>
-            </a:schemeClr>
-          </a:lnRef>
-          <a:fillRef idx="1">
-            <a:schemeClr val="accent2"/>
-          </a:fillRef>
-          <a:effectRef idx="0">
-            <a:schemeClr val="accent2"/>
-          </a:effectRef>
-          <a:fontRef idx="minor">
-            <a:schemeClr val="lt1"/>
-          </a:fontRef>
-        </p:style>
-        <p:txBody>
-          <a:bodyPr rtlCol="0" anchor="ctr"/>
-          <a:lstStyle/>
-          <a:p>
-            <a:pPr algn="ctr"/>
-            <a:r>
-              <a:rPr lang="en-US" sz="1200" dirty="0">
-                <a:solidFill>
-                  <a:schemeClr val="tx1">
-                    <a:alpha val="16000"/>
-                  </a:schemeClr>
-                </a:solidFill>
-              </a:rPr>
-              <a:t>9</a:t>
-            </a:r>
-            <a:endParaRPr lang="en-GB" sz="1200" dirty="0">
-              <a:solidFill>
-                <a:schemeClr val="tx1">
-                  <a:alpha val="16000"/>
-                </a:schemeClr>
-              </a:solidFill>
-            </a:endParaRPr>
-          </a:p>
-        </p:txBody>
-      </p:sp>
-      <p:sp>
-        <p:nvSpPr>
-          <p:cNvPr id="20" name="Rectangle 19">
-            <a:extLst>
-              <a:ext uri="{FF2B5EF4-FFF2-40B4-BE49-F238E27FC236}">
-                <a16:creationId xmlns:a16="http://schemas.microsoft.com/office/drawing/2014/main" id="{690468A8-7F2B-3EFB-DF32-E1EBF37F6AA1}"/>
-              </a:ext>
-            </a:extLst>
-          </p:cNvPr>
-          <p:cNvSpPr/>
-          <p:nvPr/>
-        </p:nvSpPr>
-        <p:spPr>
-          <a:xfrm>
-            <a:off x="6499261" y="3219857"/>
-            <a:ext cx="379379" cy="359924"/>
-          </a:xfrm>
-          <a:prstGeom prst="rect">
-            <a:avLst/>
-          </a:prstGeom>
-          <a:noFill/>
-          <a:ln w="19050">
-            <a:solidFill>
-              <a:schemeClr val="accent2">
-                <a:lumMod val="60000"/>
-                <a:lumOff val="40000"/>
-              </a:schemeClr>
-            </a:solidFill>
-          </a:ln>
-        </p:spPr>
-        <p:style>
-          <a:lnRef idx="2">
-            <a:schemeClr val="accent2">
-              <a:shade val="15000"/>
-            </a:schemeClr>
-          </a:lnRef>
-          <a:fillRef idx="1">
-            <a:schemeClr val="accent2"/>
-          </a:fillRef>
-          <a:effectRef idx="0">
-            <a:schemeClr val="accent2"/>
-          </a:effectRef>
-          <a:fontRef idx="minor">
-            <a:schemeClr val="lt1"/>
-          </a:fontRef>
-        </p:style>
-        <p:txBody>
-          <a:bodyPr rtlCol="0" anchor="ctr"/>
-          <a:lstStyle/>
-          <a:p>
-            <a:pPr algn="ctr"/>
-            <a:r>
-              <a:rPr lang="en-US" sz="1200" dirty="0">
-                <a:solidFill>
-                  <a:schemeClr val="tx1">
-                    <a:alpha val="16000"/>
-                  </a:schemeClr>
-                </a:solidFill>
-              </a:rPr>
-              <a:t>10</a:t>
-            </a:r>
-            <a:endParaRPr lang="en-GB" sz="1200" dirty="0">
-              <a:solidFill>
-                <a:schemeClr val="tx1">
-                  <a:alpha val="16000"/>
-                </a:schemeClr>
-              </a:solidFill>
-            </a:endParaRPr>
-          </a:p>
-        </p:txBody>
-      </p:sp>
-      <p:sp>
-        <p:nvSpPr>
-          <p:cNvPr id="21" name="Rectangle 20">
-            <a:extLst>
-              <a:ext uri="{FF2B5EF4-FFF2-40B4-BE49-F238E27FC236}">
-                <a16:creationId xmlns:a16="http://schemas.microsoft.com/office/drawing/2014/main" id="{1A3EB27A-29BA-5F19-D88A-208F8CA8312A}"/>
-              </a:ext>
-            </a:extLst>
-          </p:cNvPr>
-          <p:cNvSpPr/>
-          <p:nvPr/>
-        </p:nvSpPr>
-        <p:spPr>
-          <a:xfrm>
-            <a:off x="6878640" y="3219857"/>
-            <a:ext cx="379379" cy="359924"/>
-          </a:xfrm>
-          <a:prstGeom prst="rect">
-            <a:avLst/>
-          </a:prstGeom>
-          <a:noFill/>
-          <a:ln w="19050">
-            <a:solidFill>
-              <a:schemeClr val="accent2">
-                <a:lumMod val="60000"/>
-                <a:lumOff val="40000"/>
-              </a:schemeClr>
-            </a:solidFill>
-          </a:ln>
-        </p:spPr>
-        <p:style>
-          <a:lnRef idx="2">
-            <a:schemeClr val="accent2">
-              <a:shade val="15000"/>
-            </a:schemeClr>
-          </a:lnRef>
-          <a:fillRef idx="1">
-            <a:schemeClr val="accent2"/>
-          </a:fillRef>
-          <a:effectRef idx="0">
-            <a:schemeClr val="accent2"/>
-          </a:effectRef>
-          <a:fontRef idx="minor">
-            <a:schemeClr val="lt1"/>
-          </a:fontRef>
-        </p:style>
-        <p:txBody>
-          <a:bodyPr rtlCol="0" anchor="ctr"/>
-          <a:lstStyle/>
-          <a:p>
-            <a:pPr algn="ctr"/>
-            <a:r>
-              <a:rPr lang="en-US" sz="1200" dirty="0">
-                <a:solidFill>
-                  <a:schemeClr val="tx1">
-                    <a:alpha val="16000"/>
-                  </a:schemeClr>
-                </a:solidFill>
-              </a:rPr>
-              <a:t>11</a:t>
-            </a:r>
-            <a:endParaRPr lang="en-GB" sz="1200" dirty="0">
-              <a:solidFill>
-                <a:schemeClr val="tx1">
-                  <a:alpha val="16000"/>
-                </a:schemeClr>
-              </a:solidFill>
-            </a:endParaRPr>
-          </a:p>
-        </p:txBody>
-      </p:sp>
-      <p:sp>
-        <p:nvSpPr>
-          <p:cNvPr id="22" name="Rectangle 21">
-            <a:extLst>
-              <a:ext uri="{FF2B5EF4-FFF2-40B4-BE49-F238E27FC236}">
-                <a16:creationId xmlns:a16="http://schemas.microsoft.com/office/drawing/2014/main" id="{4660CBEA-96EA-3821-FBEC-2C821C644621}"/>
-              </a:ext>
-            </a:extLst>
-          </p:cNvPr>
-          <p:cNvSpPr/>
-          <p:nvPr/>
-        </p:nvSpPr>
-        <p:spPr>
-          <a:xfrm>
-            <a:off x="7258019" y="3219857"/>
-            <a:ext cx="379379" cy="359924"/>
-          </a:xfrm>
-          <a:prstGeom prst="rect">
-            <a:avLst/>
-          </a:prstGeom>
-          <a:solidFill>
-            <a:schemeClr val="accent2">
-              <a:lumMod val="60000"/>
-              <a:lumOff val="40000"/>
-            </a:schemeClr>
-          </a:solidFill>
-          <a:ln w="19050">
-            <a:solidFill>
-              <a:schemeClr val="accent2">
-                <a:lumMod val="60000"/>
-                <a:lumOff val="40000"/>
-              </a:schemeClr>
-            </a:solidFill>
-          </a:ln>
-        </p:spPr>
-        <p:style>
-          <a:lnRef idx="2">
-            <a:schemeClr val="accent2">
-              <a:shade val="15000"/>
-            </a:schemeClr>
-          </a:lnRef>
-          <a:fillRef idx="1">
-            <a:schemeClr val="accent2"/>
-          </a:fillRef>
-          <a:effectRef idx="0">
-            <a:schemeClr val="accent2"/>
-          </a:effectRef>
-          <a:fontRef idx="minor">
-            <a:schemeClr val="lt1"/>
-          </a:fontRef>
-        </p:style>
-        <p:txBody>
-          <a:bodyPr rtlCol="0" anchor="ctr"/>
-          <a:lstStyle/>
-          <a:p>
-            <a:pPr algn="ctr"/>
-            <a:r>
-              <a:rPr lang="en-US" sz="1200" b="1" dirty="0">
-                <a:solidFill>
-                  <a:schemeClr val="tx1">
-                    <a:alpha val="44000"/>
-                  </a:schemeClr>
-                </a:solidFill>
-              </a:rPr>
-              <a:t>12</a:t>
-            </a:r>
-            <a:endParaRPr lang="en-GB" sz="1200" b="1" dirty="0">
-              <a:solidFill>
-                <a:schemeClr val="tx1">
-                  <a:alpha val="44000"/>
-                </a:schemeClr>
-              </a:solidFill>
-            </a:endParaRPr>
-          </a:p>
-        </p:txBody>
-      </p:sp>
-      <p:sp>
-        <p:nvSpPr>
-          <p:cNvPr id="23" name="Rectangle 22">
-            <a:extLst>
-              <a:ext uri="{FF2B5EF4-FFF2-40B4-BE49-F238E27FC236}">
-                <a16:creationId xmlns:a16="http://schemas.microsoft.com/office/drawing/2014/main" id="{0FDD5E12-AA74-CE8A-E035-0740E0216DC1}"/>
-              </a:ext>
-            </a:extLst>
-          </p:cNvPr>
-          <p:cNvSpPr/>
-          <p:nvPr/>
-        </p:nvSpPr>
-        <p:spPr>
-          <a:xfrm>
-            <a:off x="7637398" y="3219857"/>
-            <a:ext cx="379379" cy="359924"/>
-          </a:xfrm>
-          <a:prstGeom prst="rect">
-            <a:avLst/>
-          </a:prstGeom>
-          <a:noFill/>
-          <a:ln w="19050">
-            <a:solidFill>
-              <a:schemeClr val="accent2">
-                <a:lumMod val="60000"/>
-                <a:lumOff val="40000"/>
-              </a:schemeClr>
-            </a:solidFill>
-          </a:ln>
-        </p:spPr>
-        <p:style>
-          <a:lnRef idx="2">
-            <a:schemeClr val="accent2">
-              <a:shade val="15000"/>
-            </a:schemeClr>
-          </a:lnRef>
-          <a:fillRef idx="1">
-            <a:schemeClr val="accent2"/>
-          </a:fillRef>
-          <a:effectRef idx="0">
-            <a:schemeClr val="accent2"/>
-          </a:effectRef>
-          <a:fontRef idx="minor">
-            <a:schemeClr val="lt1"/>
-          </a:fontRef>
-        </p:style>
-        <p:txBody>
-          <a:bodyPr rtlCol="0" anchor="ctr"/>
-          <a:lstStyle/>
-          <a:p>
-            <a:pPr algn="ctr"/>
-            <a:r>
-              <a:rPr lang="en-US" sz="1200" dirty="0">
-                <a:solidFill>
-                  <a:schemeClr val="tx1">
-                    <a:alpha val="16000"/>
-                  </a:schemeClr>
-                </a:solidFill>
-              </a:rPr>
-              <a:t>13</a:t>
-            </a:r>
-            <a:endParaRPr lang="en-GB" sz="1200" dirty="0">
-              <a:solidFill>
-                <a:schemeClr val="tx1">
-                  <a:alpha val="16000"/>
-                </a:schemeClr>
-              </a:solidFill>
-            </a:endParaRPr>
-          </a:p>
-        </p:txBody>
-      </p:sp>
-      <p:sp>
-        <p:nvSpPr>
-          <p:cNvPr id="24" name="Rectangle 23">
-            <a:extLst>
-              <a:ext uri="{FF2B5EF4-FFF2-40B4-BE49-F238E27FC236}">
-                <a16:creationId xmlns:a16="http://schemas.microsoft.com/office/drawing/2014/main" id="{4A090EF1-6793-7F91-0CA2-96EEEB00CE4B}"/>
-              </a:ext>
-            </a:extLst>
-          </p:cNvPr>
-          <p:cNvSpPr/>
-          <p:nvPr/>
-        </p:nvSpPr>
-        <p:spPr>
-          <a:xfrm>
-            <a:off x="8016777" y="3219857"/>
-            <a:ext cx="379379" cy="359924"/>
-          </a:xfrm>
-          <a:prstGeom prst="rect">
-            <a:avLst/>
-          </a:prstGeom>
-          <a:noFill/>
-          <a:ln w="19050">
-            <a:solidFill>
-              <a:schemeClr val="accent2">
-                <a:lumMod val="60000"/>
-                <a:lumOff val="40000"/>
-              </a:schemeClr>
-            </a:solidFill>
-          </a:ln>
-        </p:spPr>
-        <p:style>
-          <a:lnRef idx="2">
-            <a:schemeClr val="accent2">
-              <a:shade val="15000"/>
-            </a:schemeClr>
-          </a:lnRef>
-          <a:fillRef idx="1">
-            <a:schemeClr val="accent2"/>
-          </a:fillRef>
-          <a:effectRef idx="0">
-            <a:schemeClr val="accent2"/>
-          </a:effectRef>
-          <a:fontRef idx="minor">
-            <a:schemeClr val="lt1"/>
-          </a:fontRef>
-        </p:style>
-        <p:txBody>
-          <a:bodyPr rtlCol="0" anchor="ctr"/>
-          <a:lstStyle/>
-          <a:p>
-            <a:pPr algn="ctr"/>
-            <a:r>
-              <a:rPr lang="en-US" sz="1200" dirty="0">
-                <a:solidFill>
-                  <a:schemeClr val="tx1">
-                    <a:alpha val="16000"/>
-                  </a:schemeClr>
-                </a:solidFill>
-              </a:rPr>
-              <a:t>14</a:t>
-            </a:r>
-            <a:endParaRPr lang="en-GB" sz="1200" dirty="0">
-              <a:solidFill>
-                <a:schemeClr val="tx1">
-                  <a:alpha val="16000"/>
-                </a:schemeClr>
-              </a:solidFill>
-            </a:endParaRPr>
-          </a:p>
-        </p:txBody>
-      </p:sp>
       <p:cxnSp>
         <p:nvCxnSpPr>
-          <p:cNvPr id="27" name="Straight Arrow Connector 26">
-            <a:extLst>
-              <a:ext uri="{FF2B5EF4-FFF2-40B4-BE49-F238E27FC236}">
-                <a16:creationId xmlns:a16="http://schemas.microsoft.com/office/drawing/2014/main" id="{24A64AFE-A7F5-93D5-4D04-5D438B11C0A3}"/>
+          <p:cNvPr id="29" name="Straight Arrow Connector 28">
+            <a:extLst>
+              <a:ext uri="{FF2B5EF4-FFF2-40B4-BE49-F238E27FC236}">
+                <a16:creationId xmlns:a16="http://schemas.microsoft.com/office/drawing/2014/main" id="{F8E6800A-2F4E-A089-D9A8-70D67ED6DF57}"/>
               </a:ext>
             </a:extLst>
           </p:cNvPr>
@@ -7291,7 +6251,7 @@
         </p:nvCxnSpPr>
         <p:spPr>
           <a:xfrm>
-            <a:off x="4781550" y="2663190"/>
+            <a:off x="5760133" y="4319070"/>
             <a:ext cx="525780" cy="0"/>
           </a:xfrm>
           <a:prstGeom prst="straightConnector1">
@@ -7322,453 +6282,12 @@
           </a:fontRef>
         </p:style>
       </p:cxnSp>
-      <p:cxnSp>
-        <p:nvCxnSpPr>
-          <p:cNvPr id="29" name="Straight Arrow Connector 28">
-            <a:extLst>
-              <a:ext uri="{FF2B5EF4-FFF2-40B4-BE49-F238E27FC236}">
-                <a16:creationId xmlns:a16="http://schemas.microsoft.com/office/drawing/2014/main" id="{F8E6800A-2F4E-A089-D9A8-70D67ED6DF57}"/>
-              </a:ext>
-            </a:extLst>
-          </p:cNvPr>
-          <p:cNvCxnSpPr/>
-          <p:nvPr/>
-        </p:nvCxnSpPr>
-        <p:spPr>
-          <a:xfrm>
-            <a:off x="4781550" y="3398520"/>
-            <a:ext cx="525780" cy="0"/>
-          </a:xfrm>
-          <a:prstGeom prst="straightConnector1">
-            <a:avLst/>
-          </a:prstGeom>
-          <a:ln w="19050">
-            <a:solidFill>
-              <a:schemeClr val="accent2">
-                <a:lumMod val="60000"/>
-                <a:lumOff val="40000"/>
-              </a:schemeClr>
-            </a:solidFill>
-            <a:tailEnd type="triangle"/>
-          </a:ln>
-        </p:spPr>
-        <p:style>
-          <a:lnRef idx="1">
-            <a:schemeClr val="accent1"/>
-          </a:lnRef>
-          <a:fillRef idx="0">
-            <a:schemeClr val="accent1"/>
-          </a:fillRef>
-          <a:effectRef idx="0">
-            <a:schemeClr val="accent1"/>
-          </a:effectRef>
-          <a:fontRef idx="minor">
-            <a:schemeClr val="tx1"/>
-          </a:fontRef>
-        </p:style>
-      </p:cxnSp>
-      <p:sp>
-        <p:nvSpPr>
-          <p:cNvPr id="30" name="Oval 29">
-            <a:extLst>
-              <a:ext uri="{FF2B5EF4-FFF2-40B4-BE49-F238E27FC236}">
-                <a16:creationId xmlns:a16="http://schemas.microsoft.com/office/drawing/2014/main" id="{9EA753D1-22D4-0DD5-32D8-9CBDEBC004AA}"/>
-              </a:ext>
-            </a:extLst>
-          </p:cNvPr>
-          <p:cNvSpPr/>
-          <p:nvPr/>
-        </p:nvSpPr>
-        <p:spPr>
-          <a:xfrm>
-            <a:off x="4747260" y="3733800"/>
-            <a:ext cx="45719" cy="45719"/>
-          </a:xfrm>
-          <a:prstGeom prst="ellipse">
-            <a:avLst/>
-          </a:prstGeom>
-          <a:solidFill>
-            <a:schemeClr val="accent2">
-              <a:lumMod val="60000"/>
-              <a:lumOff val="40000"/>
-            </a:schemeClr>
-          </a:solidFill>
-          <a:ln>
-            <a:solidFill>
-              <a:schemeClr val="accent2">
-                <a:lumMod val="60000"/>
-                <a:lumOff val="40000"/>
-              </a:schemeClr>
-            </a:solidFill>
-          </a:ln>
-        </p:spPr>
-        <p:style>
-          <a:lnRef idx="2">
-            <a:schemeClr val="accent1">
-              <a:shade val="15000"/>
-            </a:schemeClr>
-          </a:lnRef>
-          <a:fillRef idx="1">
-            <a:schemeClr val="accent1"/>
-          </a:fillRef>
-          <a:effectRef idx="0">
-            <a:schemeClr val="accent1"/>
-          </a:effectRef>
-          <a:fontRef idx="minor">
-            <a:schemeClr val="lt1"/>
-          </a:fontRef>
-        </p:style>
-        <p:txBody>
-          <a:bodyPr rtlCol="0" anchor="ctr"/>
-          <a:lstStyle/>
-          <a:p>
-            <a:pPr algn="ctr"/>
-            <a:endParaRPr lang="en-GB"/>
-          </a:p>
-        </p:txBody>
-      </p:sp>
-      <p:sp>
-        <p:nvSpPr>
-          <p:cNvPr id="32" name="Oval 31">
-            <a:extLst>
-              <a:ext uri="{FF2B5EF4-FFF2-40B4-BE49-F238E27FC236}">
-                <a16:creationId xmlns:a16="http://schemas.microsoft.com/office/drawing/2014/main" id="{13021375-BA68-5A67-D51C-1B437C075942}"/>
-              </a:ext>
-            </a:extLst>
-          </p:cNvPr>
-          <p:cNvSpPr/>
-          <p:nvPr/>
-        </p:nvSpPr>
-        <p:spPr>
-          <a:xfrm>
-            <a:off x="4747260" y="3886200"/>
-            <a:ext cx="45719" cy="45719"/>
-          </a:xfrm>
-          <a:prstGeom prst="ellipse">
-            <a:avLst/>
-          </a:prstGeom>
-          <a:solidFill>
-            <a:schemeClr val="accent2">
-              <a:lumMod val="60000"/>
-              <a:lumOff val="40000"/>
-            </a:schemeClr>
-          </a:solidFill>
-          <a:ln>
-            <a:solidFill>
-              <a:schemeClr val="accent2">
-                <a:lumMod val="60000"/>
-                <a:lumOff val="40000"/>
-              </a:schemeClr>
-            </a:solidFill>
-          </a:ln>
-        </p:spPr>
-        <p:style>
-          <a:lnRef idx="2">
-            <a:schemeClr val="accent1">
-              <a:shade val="15000"/>
-            </a:schemeClr>
-          </a:lnRef>
-          <a:fillRef idx="1">
-            <a:schemeClr val="accent1"/>
-          </a:fillRef>
-          <a:effectRef idx="0">
-            <a:schemeClr val="accent1"/>
-          </a:effectRef>
-          <a:fontRef idx="minor">
-            <a:schemeClr val="lt1"/>
-          </a:fontRef>
-        </p:style>
-        <p:txBody>
-          <a:bodyPr rtlCol="0" anchor="ctr"/>
-          <a:lstStyle/>
-          <a:p>
-            <a:pPr algn="ctr"/>
-            <a:endParaRPr lang="en-GB"/>
-          </a:p>
-        </p:txBody>
-      </p:sp>
-      <p:sp>
-        <p:nvSpPr>
-          <p:cNvPr id="33" name="Oval 32">
-            <a:extLst>
-              <a:ext uri="{FF2B5EF4-FFF2-40B4-BE49-F238E27FC236}">
-                <a16:creationId xmlns:a16="http://schemas.microsoft.com/office/drawing/2014/main" id="{CDF8F6E1-6D58-9152-635B-C32182B4B316}"/>
-              </a:ext>
-            </a:extLst>
-          </p:cNvPr>
-          <p:cNvSpPr/>
-          <p:nvPr/>
-        </p:nvSpPr>
-        <p:spPr>
-          <a:xfrm>
-            <a:off x="4747260" y="4038600"/>
-            <a:ext cx="45719" cy="45719"/>
-          </a:xfrm>
-          <a:prstGeom prst="ellipse">
-            <a:avLst/>
-          </a:prstGeom>
-          <a:solidFill>
-            <a:schemeClr val="accent2">
-              <a:lumMod val="60000"/>
-              <a:lumOff val="40000"/>
-            </a:schemeClr>
-          </a:solidFill>
-          <a:ln>
-            <a:solidFill>
-              <a:schemeClr val="accent2">
-                <a:lumMod val="60000"/>
-                <a:lumOff val="40000"/>
-              </a:schemeClr>
-            </a:solidFill>
-          </a:ln>
-        </p:spPr>
-        <p:style>
-          <a:lnRef idx="2">
-            <a:schemeClr val="accent1">
-              <a:shade val="15000"/>
-            </a:schemeClr>
-          </a:lnRef>
-          <a:fillRef idx="1">
-            <a:schemeClr val="accent1"/>
-          </a:fillRef>
-          <a:effectRef idx="0">
-            <a:schemeClr val="accent1"/>
-          </a:effectRef>
-          <a:fontRef idx="minor">
-            <a:schemeClr val="lt1"/>
-          </a:fontRef>
-        </p:style>
-        <p:txBody>
-          <a:bodyPr rtlCol="0" anchor="ctr"/>
-          <a:lstStyle/>
-          <a:p>
-            <a:pPr algn="ctr"/>
-            <a:endParaRPr lang="en-GB"/>
-          </a:p>
-        </p:txBody>
-      </p:sp>
-      <p:sp>
-        <p:nvSpPr>
-          <p:cNvPr id="34" name="Oval 33">
-            <a:extLst>
-              <a:ext uri="{FF2B5EF4-FFF2-40B4-BE49-F238E27FC236}">
-                <a16:creationId xmlns:a16="http://schemas.microsoft.com/office/drawing/2014/main" id="{60A9B999-AB80-E27F-E282-82B966A29EEE}"/>
-              </a:ext>
-            </a:extLst>
-          </p:cNvPr>
-          <p:cNvSpPr/>
-          <p:nvPr/>
-        </p:nvSpPr>
-        <p:spPr>
-          <a:xfrm>
-            <a:off x="4718050" y="2273624"/>
-            <a:ext cx="106680" cy="99059"/>
-          </a:xfrm>
-          <a:prstGeom prst="ellipse">
-            <a:avLst/>
-          </a:prstGeom>
-          <a:solidFill>
-            <a:schemeClr val="tx1"/>
-          </a:solidFill>
-          <a:ln>
-            <a:solidFill>
-              <a:schemeClr val="tx1"/>
-            </a:solidFill>
-          </a:ln>
-        </p:spPr>
-        <p:style>
-          <a:lnRef idx="2">
-            <a:schemeClr val="accent1">
-              <a:shade val="15000"/>
-            </a:schemeClr>
-          </a:lnRef>
-          <a:fillRef idx="1">
-            <a:schemeClr val="accent1"/>
-          </a:fillRef>
-          <a:effectRef idx="0">
-            <a:schemeClr val="accent1"/>
-          </a:effectRef>
-          <a:fontRef idx="minor">
-            <a:schemeClr val="lt1"/>
-          </a:fontRef>
-        </p:style>
-        <p:txBody>
-          <a:bodyPr rtlCol="0" anchor="ctr"/>
-          <a:lstStyle/>
-          <a:p>
-            <a:pPr algn="ctr"/>
-            <a:endParaRPr lang="en-GB" dirty="0"/>
-          </a:p>
-        </p:txBody>
-      </p:sp>
-      <p:sp>
-        <p:nvSpPr>
-          <p:cNvPr id="36" name="Oval 35">
-            <a:extLst>
-              <a:ext uri="{FF2B5EF4-FFF2-40B4-BE49-F238E27FC236}">
-                <a16:creationId xmlns:a16="http://schemas.microsoft.com/office/drawing/2014/main" id="{3147626C-0688-E86E-3C8A-53DF37C73CFC}"/>
-              </a:ext>
-            </a:extLst>
-          </p:cNvPr>
-          <p:cNvSpPr/>
-          <p:nvPr/>
-        </p:nvSpPr>
-        <p:spPr>
-          <a:xfrm>
-            <a:off x="4728210" y="4689087"/>
-            <a:ext cx="106680" cy="99059"/>
-          </a:xfrm>
-          <a:prstGeom prst="ellipse">
-            <a:avLst/>
-          </a:prstGeom>
-          <a:solidFill>
-            <a:schemeClr val="tx1"/>
-          </a:solidFill>
-          <a:ln>
-            <a:solidFill>
-              <a:schemeClr val="tx1"/>
-            </a:solidFill>
-          </a:ln>
-        </p:spPr>
-        <p:style>
-          <a:lnRef idx="2">
-            <a:schemeClr val="accent1">
-              <a:shade val="15000"/>
-            </a:schemeClr>
-          </a:lnRef>
-          <a:fillRef idx="1">
-            <a:schemeClr val="accent1"/>
-          </a:fillRef>
-          <a:effectRef idx="0">
-            <a:schemeClr val="accent1"/>
-          </a:effectRef>
-          <a:fontRef idx="minor">
-            <a:schemeClr val="lt1"/>
-          </a:fontRef>
-        </p:style>
-        <p:txBody>
-          <a:bodyPr rtlCol="0" anchor="ctr"/>
-          <a:lstStyle/>
-          <a:p>
-            <a:pPr algn="ctr"/>
-            <a:endParaRPr lang="en-GB"/>
-          </a:p>
-        </p:txBody>
-      </p:sp>
-      <p:sp>
-        <p:nvSpPr>
-          <p:cNvPr id="2" name="Oval 1">
-            <a:extLst>
-              <a:ext uri="{FF2B5EF4-FFF2-40B4-BE49-F238E27FC236}">
-                <a16:creationId xmlns:a16="http://schemas.microsoft.com/office/drawing/2014/main" id="{E4FDFC28-7759-14E9-F18A-3CB485C95895}"/>
-              </a:ext>
-            </a:extLst>
-          </p:cNvPr>
-          <p:cNvSpPr/>
-          <p:nvPr/>
-        </p:nvSpPr>
-        <p:spPr>
-          <a:xfrm>
-            <a:off x="4693920" y="2993812"/>
-            <a:ext cx="106680" cy="99059"/>
-          </a:xfrm>
-          <a:prstGeom prst="ellipse">
-            <a:avLst/>
-          </a:prstGeom>
-          <a:solidFill>
-            <a:schemeClr val="tx1"/>
-          </a:solidFill>
-          <a:ln>
-            <a:solidFill>
-              <a:schemeClr val="tx1"/>
-            </a:solidFill>
-          </a:ln>
-        </p:spPr>
-        <p:style>
-          <a:lnRef idx="2">
-            <a:schemeClr val="accent1">
-              <a:shade val="15000"/>
-            </a:schemeClr>
-          </a:lnRef>
-          <a:fillRef idx="1">
-            <a:schemeClr val="accent1"/>
-          </a:fillRef>
-          <a:effectRef idx="0">
-            <a:schemeClr val="accent1"/>
-          </a:effectRef>
-          <a:fontRef idx="minor">
-            <a:schemeClr val="lt1"/>
-          </a:fontRef>
-        </p:style>
-        <p:txBody>
-          <a:bodyPr rtlCol="0" anchor="ctr"/>
-          <a:lstStyle/>
-          <a:p>
-            <a:pPr algn="ctr"/>
-            <a:endParaRPr lang="en-GB" dirty="0"/>
-          </a:p>
-        </p:txBody>
-      </p:sp>
-      <p:sp>
-        <p:nvSpPr>
-          <p:cNvPr id="3" name="Oval 2">
-            <a:extLst>
-              <a:ext uri="{FF2B5EF4-FFF2-40B4-BE49-F238E27FC236}">
-                <a16:creationId xmlns:a16="http://schemas.microsoft.com/office/drawing/2014/main" id="{F0F5982E-C8AA-B336-7B9C-53D9D5CFF57A}"/>
-              </a:ext>
-            </a:extLst>
-          </p:cNvPr>
-          <p:cNvSpPr/>
-          <p:nvPr/>
-        </p:nvSpPr>
-        <p:spPr>
-          <a:xfrm>
-            <a:off x="4718050" y="4344480"/>
-            <a:ext cx="106680" cy="99059"/>
-          </a:xfrm>
-          <a:prstGeom prst="ellipse">
-            <a:avLst/>
-          </a:prstGeom>
-          <a:solidFill>
-            <a:schemeClr val="tx1"/>
-          </a:solidFill>
-          <a:ln>
-            <a:solidFill>
-              <a:schemeClr val="tx1"/>
-            </a:solidFill>
-          </a:ln>
-        </p:spPr>
-        <p:style>
-          <a:lnRef idx="2">
-            <a:schemeClr val="accent1">
-              <a:shade val="15000"/>
-            </a:schemeClr>
-          </a:lnRef>
-          <a:fillRef idx="1">
-            <a:schemeClr val="accent1"/>
-          </a:fillRef>
-          <a:effectRef idx="0">
-            <a:schemeClr val="accent1"/>
-          </a:effectRef>
-          <a:fontRef idx="minor">
-            <a:schemeClr val="lt1"/>
-          </a:fontRef>
-        </p:style>
-        <p:txBody>
-          <a:bodyPr rtlCol="0" anchor="ctr"/>
-          <a:lstStyle/>
-          <a:p>
-            <a:pPr algn="ctr"/>
-            <a:endParaRPr lang="en-GB"/>
-          </a:p>
-        </p:txBody>
-      </p:sp>
-      <p:sp>
-        <p:nvSpPr>
-          <p:cNvPr id="10" name="TextBox 9">
-            <a:extLst>
-              <a:ext uri="{FF2B5EF4-FFF2-40B4-BE49-F238E27FC236}">
-                <a16:creationId xmlns:a16="http://schemas.microsoft.com/office/drawing/2014/main" id="{D92C8AAE-4615-E2DD-5A35-AE346279F78A}"/>
+      <p:sp>
+        <p:nvSpPr>
+          <p:cNvPr id="14" name="TextBox 13">
+            <a:extLst>
+              <a:ext uri="{FF2B5EF4-FFF2-40B4-BE49-F238E27FC236}">
+                <a16:creationId xmlns:a16="http://schemas.microsoft.com/office/drawing/2014/main" id="{DC4EAB14-77F5-E6D2-ED11-DA813EC80E7B}"/>
               </a:ext>
             </a:extLst>
           </p:cNvPr>
@@ -7777,8 +6296,8 @@
         </p:nvSpPr>
         <p:spPr>
           <a:xfrm>
-            <a:off x="4143643" y="2140085"/>
-            <a:ext cx="461665" cy="2795108"/>
+            <a:off x="6980331" y="3234991"/>
+            <a:ext cx="445563" cy="369332"/>
           </a:xfrm>
           <a:prstGeom prst="rect">
             <a:avLst/>
@@ -7786,16 +6305,1663 @@
           <a:noFill/>
         </p:spPr>
         <p:txBody>
-          <a:bodyPr vert="vert270" wrap="square" rtlCol="0">
+          <a:bodyPr wrap="square">
             <a:spAutoFit/>
           </a:bodyPr>
           <a:lstStyle/>
           <a:p>
             <a:pPr algn="ctr"/>
             <a:r>
-              <a:rPr lang="en-GB" i="1" dirty="0"/>
-              <a:t>Row Pointer Table</a:t>
-            </a:r>
+              <a:rPr lang="en-US" sz="1800" b="1" dirty="0">
+                <a:solidFill>
+                  <a:schemeClr val="tx1">
+                    <a:alpha val="44000"/>
+                  </a:schemeClr>
+                </a:solidFill>
+              </a:rPr>
+              <a:t>…</a:t>
+            </a:r>
+            <a:endParaRPr lang="en-GB" sz="1800" b="1" dirty="0">
+              <a:solidFill>
+                <a:schemeClr val="tx1">
+                  <a:alpha val="44000"/>
+                </a:schemeClr>
+              </a:solidFill>
+            </a:endParaRPr>
+          </a:p>
+        </p:txBody>
+      </p:sp>
+      <p:grpSp>
+        <p:nvGrpSpPr>
+          <p:cNvPr id="50" name="Group 49">
+            <a:extLst>
+              <a:ext uri="{FF2B5EF4-FFF2-40B4-BE49-F238E27FC236}">
+                <a16:creationId xmlns:a16="http://schemas.microsoft.com/office/drawing/2014/main" id="{C74F82CD-D16E-5495-8B4B-BA5A4F95227D}"/>
+              </a:ext>
+            </a:extLst>
+          </p:cNvPr>
+          <p:cNvGrpSpPr/>
+          <p:nvPr/>
+        </p:nvGrpSpPr>
+        <p:grpSpPr>
+          <a:xfrm>
+            <a:off x="5496786" y="3234991"/>
+            <a:ext cx="379379" cy="369332"/>
+            <a:chOff x="6309571" y="1422711"/>
+            <a:chExt cx="379379" cy="369332"/>
+          </a:xfrm>
+        </p:grpSpPr>
+        <p:sp>
+          <p:nvSpPr>
+            <p:cNvPr id="39" name="Rectangle 38">
+              <a:extLst>
+                <a:ext uri="{FF2B5EF4-FFF2-40B4-BE49-F238E27FC236}">
+                  <a16:creationId xmlns:a16="http://schemas.microsoft.com/office/drawing/2014/main" id="{72AA7F65-6A7B-C7DA-536B-B366CEC7D51B}"/>
+                </a:ext>
+              </a:extLst>
+            </p:cNvPr>
+            <p:cNvSpPr/>
+            <p:nvPr/>
+          </p:nvSpPr>
+          <p:spPr>
+            <a:xfrm>
+              <a:off x="6309571" y="1422711"/>
+              <a:ext cx="379379" cy="359924"/>
+            </a:xfrm>
+            <a:prstGeom prst="rect">
+              <a:avLst/>
+            </a:prstGeom>
+            <a:noFill/>
+            <a:ln w="19050">
+              <a:solidFill>
+                <a:schemeClr val="accent2">
+                  <a:lumMod val="60000"/>
+                  <a:lumOff val="40000"/>
+                </a:schemeClr>
+              </a:solidFill>
+            </a:ln>
+          </p:spPr>
+          <p:style>
+            <a:lnRef idx="2">
+              <a:schemeClr val="accent2">
+                <a:shade val="15000"/>
+              </a:schemeClr>
+            </a:lnRef>
+            <a:fillRef idx="1">
+              <a:schemeClr val="accent2"/>
+            </a:fillRef>
+            <a:effectRef idx="0">
+              <a:schemeClr val="accent2"/>
+            </a:effectRef>
+            <a:fontRef idx="minor">
+              <a:schemeClr val="lt1"/>
+            </a:fontRef>
+          </p:style>
+          <p:txBody>
+            <a:bodyPr rtlCol="0" anchor="ctr"/>
+            <a:lstStyle/>
+            <a:p>
+              <a:pPr algn="ctr"/>
+              <a:endParaRPr lang="en-GB" sz="1200" dirty="0">
+                <a:solidFill>
+                  <a:schemeClr val="tx1">
+                    <a:alpha val="16000"/>
+                  </a:schemeClr>
+                </a:solidFill>
+              </a:endParaRPr>
+            </a:p>
+          </p:txBody>
+        </p:sp>
+        <p:sp>
+          <p:nvSpPr>
+            <p:cNvPr id="44" name="TextBox 43">
+              <a:extLst>
+                <a:ext uri="{FF2B5EF4-FFF2-40B4-BE49-F238E27FC236}">
+                  <a16:creationId xmlns:a16="http://schemas.microsoft.com/office/drawing/2014/main" id="{0A18E6F5-B686-E202-2154-C3338B5E566A}"/>
+                </a:ext>
+              </a:extLst>
+            </p:cNvPr>
+            <p:cNvSpPr txBox="1"/>
+            <p:nvPr/>
+          </p:nvSpPr>
+          <p:spPr>
+            <a:xfrm>
+              <a:off x="6360278" y="1422711"/>
+              <a:ext cx="253746" cy="369332"/>
+            </a:xfrm>
+            <a:prstGeom prst="rect">
+              <a:avLst/>
+            </a:prstGeom>
+            <a:noFill/>
+          </p:spPr>
+          <p:txBody>
+            <a:bodyPr wrap="square">
+              <a:spAutoFit/>
+            </a:bodyPr>
+            <a:lstStyle/>
+            <a:p>
+              <a:r>
+                <a:rPr lang="en-US" b="1" dirty="0">
+                  <a:solidFill>
+                    <a:schemeClr val="tx1">
+                      <a:alpha val="44000"/>
+                    </a:schemeClr>
+                  </a:solidFill>
+                </a:rPr>
+                <a:t>0</a:t>
+              </a:r>
+              <a:endParaRPr lang="en-GB" dirty="0"/>
+            </a:p>
+          </p:txBody>
+        </p:sp>
+      </p:grpSp>
+      <p:grpSp>
+        <p:nvGrpSpPr>
+          <p:cNvPr id="51" name="Group 50">
+            <a:extLst>
+              <a:ext uri="{FF2B5EF4-FFF2-40B4-BE49-F238E27FC236}">
+                <a16:creationId xmlns:a16="http://schemas.microsoft.com/office/drawing/2014/main" id="{F975930E-5888-4A72-3A5F-00DB5BE05082}"/>
+              </a:ext>
+            </a:extLst>
+          </p:cNvPr>
+          <p:cNvGrpSpPr/>
+          <p:nvPr/>
+        </p:nvGrpSpPr>
+        <p:grpSpPr>
+          <a:xfrm>
+            <a:off x="6275742" y="4151338"/>
+            <a:ext cx="379379" cy="369332"/>
+            <a:chOff x="7898099" y="1597969"/>
+            <a:chExt cx="379379" cy="369332"/>
+          </a:xfrm>
+        </p:grpSpPr>
+        <p:sp>
+          <p:nvSpPr>
+            <p:cNvPr id="48" name="Rectangle 47">
+              <a:extLst>
+                <a:ext uri="{FF2B5EF4-FFF2-40B4-BE49-F238E27FC236}">
+                  <a16:creationId xmlns:a16="http://schemas.microsoft.com/office/drawing/2014/main" id="{52D29309-BEE7-3AA7-34A5-5C97B28316F5}"/>
+                </a:ext>
+              </a:extLst>
+            </p:cNvPr>
+            <p:cNvSpPr/>
+            <p:nvPr/>
+          </p:nvSpPr>
+          <p:spPr>
+            <a:xfrm>
+              <a:off x="7898099" y="1597969"/>
+              <a:ext cx="379379" cy="359924"/>
+            </a:xfrm>
+            <a:prstGeom prst="rect">
+              <a:avLst/>
+            </a:prstGeom>
+            <a:noFill/>
+            <a:ln w="19050">
+              <a:solidFill>
+                <a:schemeClr val="accent2">
+                  <a:lumMod val="60000"/>
+                  <a:lumOff val="40000"/>
+                </a:schemeClr>
+              </a:solidFill>
+            </a:ln>
+          </p:spPr>
+          <p:style>
+            <a:lnRef idx="2">
+              <a:schemeClr val="accent2">
+                <a:shade val="15000"/>
+              </a:schemeClr>
+            </a:lnRef>
+            <a:fillRef idx="1">
+              <a:schemeClr val="accent2"/>
+            </a:fillRef>
+            <a:effectRef idx="0">
+              <a:schemeClr val="accent2"/>
+            </a:effectRef>
+            <a:fontRef idx="minor">
+              <a:schemeClr val="lt1"/>
+            </a:fontRef>
+          </p:style>
+          <p:txBody>
+            <a:bodyPr rtlCol="0" anchor="ctr"/>
+            <a:lstStyle/>
+            <a:p>
+              <a:pPr algn="ctr"/>
+              <a:endParaRPr lang="en-GB" sz="1200" dirty="0">
+                <a:solidFill>
+                  <a:schemeClr val="tx1">
+                    <a:alpha val="16000"/>
+                  </a:schemeClr>
+                </a:solidFill>
+              </a:endParaRPr>
+            </a:p>
+          </p:txBody>
+        </p:sp>
+        <p:sp>
+          <p:nvSpPr>
+            <p:cNvPr id="49" name="TextBox 48">
+              <a:extLst>
+                <a:ext uri="{FF2B5EF4-FFF2-40B4-BE49-F238E27FC236}">
+                  <a16:creationId xmlns:a16="http://schemas.microsoft.com/office/drawing/2014/main" id="{938F3B00-F4AC-45CF-6B93-7DB64A17B805}"/>
+                </a:ext>
+              </a:extLst>
+            </p:cNvPr>
+            <p:cNvSpPr txBox="1"/>
+            <p:nvPr/>
+          </p:nvSpPr>
+          <p:spPr>
+            <a:xfrm>
+              <a:off x="7948806" y="1597969"/>
+              <a:ext cx="253746" cy="369332"/>
+            </a:xfrm>
+            <a:prstGeom prst="rect">
+              <a:avLst/>
+            </a:prstGeom>
+            <a:noFill/>
+          </p:spPr>
+          <p:txBody>
+            <a:bodyPr wrap="square">
+              <a:spAutoFit/>
+            </a:bodyPr>
+            <a:lstStyle/>
+            <a:p>
+              <a:r>
+                <a:rPr lang="en-US" b="1" dirty="0">
+                  <a:solidFill>
+                    <a:schemeClr val="tx1">
+                      <a:alpha val="44000"/>
+                    </a:schemeClr>
+                  </a:solidFill>
+                </a:rPr>
+                <a:t>5</a:t>
+              </a:r>
+              <a:endParaRPr lang="en-GB" dirty="0"/>
+            </a:p>
+          </p:txBody>
+        </p:sp>
+      </p:grpSp>
+      <p:grpSp>
+        <p:nvGrpSpPr>
+          <p:cNvPr id="52" name="Group 51">
+            <a:extLst>
+              <a:ext uri="{FF2B5EF4-FFF2-40B4-BE49-F238E27FC236}">
+                <a16:creationId xmlns:a16="http://schemas.microsoft.com/office/drawing/2014/main" id="{2AE73F32-8BB7-D9B9-47C4-25158DD1F670}"/>
+              </a:ext>
+            </a:extLst>
+          </p:cNvPr>
+          <p:cNvGrpSpPr/>
+          <p:nvPr/>
+        </p:nvGrpSpPr>
+        <p:grpSpPr>
+          <a:xfrm>
+            <a:off x="5876165" y="3234991"/>
+            <a:ext cx="379379" cy="369332"/>
+            <a:chOff x="6309571" y="1422711"/>
+            <a:chExt cx="379379" cy="369332"/>
+          </a:xfrm>
+        </p:grpSpPr>
+        <p:sp>
+          <p:nvSpPr>
+            <p:cNvPr id="53" name="Rectangle 52">
+              <a:extLst>
+                <a:ext uri="{FF2B5EF4-FFF2-40B4-BE49-F238E27FC236}">
+                  <a16:creationId xmlns:a16="http://schemas.microsoft.com/office/drawing/2014/main" id="{BD148734-C86C-447D-FFC7-27C52D221F22}"/>
+                </a:ext>
+              </a:extLst>
+            </p:cNvPr>
+            <p:cNvSpPr/>
+            <p:nvPr/>
+          </p:nvSpPr>
+          <p:spPr>
+            <a:xfrm>
+              <a:off x="6309571" y="1422711"/>
+              <a:ext cx="379379" cy="359924"/>
+            </a:xfrm>
+            <a:prstGeom prst="rect">
+              <a:avLst/>
+            </a:prstGeom>
+            <a:noFill/>
+            <a:ln w="19050">
+              <a:solidFill>
+                <a:schemeClr val="accent2">
+                  <a:lumMod val="60000"/>
+                  <a:lumOff val="40000"/>
+                </a:schemeClr>
+              </a:solidFill>
+            </a:ln>
+          </p:spPr>
+          <p:style>
+            <a:lnRef idx="2">
+              <a:schemeClr val="accent2">
+                <a:shade val="15000"/>
+              </a:schemeClr>
+            </a:lnRef>
+            <a:fillRef idx="1">
+              <a:schemeClr val="accent2"/>
+            </a:fillRef>
+            <a:effectRef idx="0">
+              <a:schemeClr val="accent2"/>
+            </a:effectRef>
+            <a:fontRef idx="minor">
+              <a:schemeClr val="lt1"/>
+            </a:fontRef>
+          </p:style>
+          <p:txBody>
+            <a:bodyPr rtlCol="0" anchor="ctr"/>
+            <a:lstStyle/>
+            <a:p>
+              <a:pPr algn="ctr"/>
+              <a:endParaRPr lang="en-GB" sz="1200" dirty="0">
+                <a:solidFill>
+                  <a:schemeClr val="tx1">
+                    <a:alpha val="16000"/>
+                  </a:schemeClr>
+                </a:solidFill>
+              </a:endParaRPr>
+            </a:p>
+          </p:txBody>
+        </p:sp>
+        <p:sp>
+          <p:nvSpPr>
+            <p:cNvPr id="54" name="TextBox 53">
+              <a:extLst>
+                <a:ext uri="{FF2B5EF4-FFF2-40B4-BE49-F238E27FC236}">
+                  <a16:creationId xmlns:a16="http://schemas.microsoft.com/office/drawing/2014/main" id="{039D0F38-C41C-B2A7-AC4E-EEE869D2FC07}"/>
+                </a:ext>
+              </a:extLst>
+            </p:cNvPr>
+            <p:cNvSpPr txBox="1"/>
+            <p:nvPr/>
+          </p:nvSpPr>
+          <p:spPr>
+            <a:xfrm>
+              <a:off x="6360278" y="1422711"/>
+              <a:ext cx="253746" cy="369332"/>
+            </a:xfrm>
+            <a:prstGeom prst="rect">
+              <a:avLst/>
+            </a:prstGeom>
+            <a:noFill/>
+          </p:spPr>
+          <p:txBody>
+            <a:bodyPr wrap="square">
+              <a:spAutoFit/>
+            </a:bodyPr>
+            <a:lstStyle/>
+            <a:p>
+              <a:r>
+                <a:rPr lang="en-US" b="1" dirty="0">
+                  <a:solidFill>
+                    <a:schemeClr val="tx1">
+                      <a:alpha val="44000"/>
+                    </a:schemeClr>
+                  </a:solidFill>
+                </a:rPr>
+                <a:t>0</a:t>
+              </a:r>
+              <a:endParaRPr lang="en-GB" dirty="0"/>
+            </a:p>
+          </p:txBody>
+        </p:sp>
+      </p:grpSp>
+      <p:grpSp>
+        <p:nvGrpSpPr>
+          <p:cNvPr id="55" name="Group 54">
+            <a:extLst>
+              <a:ext uri="{FF2B5EF4-FFF2-40B4-BE49-F238E27FC236}">
+                <a16:creationId xmlns:a16="http://schemas.microsoft.com/office/drawing/2014/main" id="{DE378D8E-E8BF-1ADF-6061-62FD2512D860}"/>
+              </a:ext>
+            </a:extLst>
+          </p:cNvPr>
+          <p:cNvGrpSpPr/>
+          <p:nvPr/>
+        </p:nvGrpSpPr>
+        <p:grpSpPr>
+          <a:xfrm>
+            <a:off x="6253587" y="3234991"/>
+            <a:ext cx="379379" cy="369332"/>
+            <a:chOff x="6309571" y="1422711"/>
+            <a:chExt cx="379379" cy="369332"/>
+          </a:xfrm>
+        </p:grpSpPr>
+        <p:sp>
+          <p:nvSpPr>
+            <p:cNvPr id="56" name="Rectangle 55">
+              <a:extLst>
+                <a:ext uri="{FF2B5EF4-FFF2-40B4-BE49-F238E27FC236}">
+                  <a16:creationId xmlns:a16="http://schemas.microsoft.com/office/drawing/2014/main" id="{9A8FCC09-3D8A-ED6A-1DF4-4549E9534963}"/>
+                </a:ext>
+              </a:extLst>
+            </p:cNvPr>
+            <p:cNvSpPr/>
+            <p:nvPr/>
+          </p:nvSpPr>
+          <p:spPr>
+            <a:xfrm>
+              <a:off x="6309571" y="1422711"/>
+              <a:ext cx="379379" cy="359924"/>
+            </a:xfrm>
+            <a:prstGeom prst="rect">
+              <a:avLst/>
+            </a:prstGeom>
+            <a:noFill/>
+            <a:ln w="19050">
+              <a:solidFill>
+                <a:schemeClr val="accent2">
+                  <a:lumMod val="60000"/>
+                  <a:lumOff val="40000"/>
+                </a:schemeClr>
+              </a:solidFill>
+            </a:ln>
+          </p:spPr>
+          <p:style>
+            <a:lnRef idx="2">
+              <a:schemeClr val="accent2">
+                <a:shade val="15000"/>
+              </a:schemeClr>
+            </a:lnRef>
+            <a:fillRef idx="1">
+              <a:schemeClr val="accent2"/>
+            </a:fillRef>
+            <a:effectRef idx="0">
+              <a:schemeClr val="accent2"/>
+            </a:effectRef>
+            <a:fontRef idx="minor">
+              <a:schemeClr val="lt1"/>
+            </a:fontRef>
+          </p:style>
+          <p:txBody>
+            <a:bodyPr rtlCol="0" anchor="ctr"/>
+            <a:lstStyle/>
+            <a:p>
+              <a:pPr algn="ctr"/>
+              <a:endParaRPr lang="en-GB" sz="1200" dirty="0">
+                <a:solidFill>
+                  <a:schemeClr val="tx1">
+                    <a:alpha val="16000"/>
+                  </a:schemeClr>
+                </a:solidFill>
+              </a:endParaRPr>
+            </a:p>
+          </p:txBody>
+        </p:sp>
+        <p:sp>
+          <p:nvSpPr>
+            <p:cNvPr id="57" name="TextBox 56">
+              <a:extLst>
+                <a:ext uri="{FF2B5EF4-FFF2-40B4-BE49-F238E27FC236}">
+                  <a16:creationId xmlns:a16="http://schemas.microsoft.com/office/drawing/2014/main" id="{C68B50A5-A71C-CE96-C62C-B05A71517C88}"/>
+                </a:ext>
+              </a:extLst>
+            </p:cNvPr>
+            <p:cNvSpPr txBox="1"/>
+            <p:nvPr/>
+          </p:nvSpPr>
+          <p:spPr>
+            <a:xfrm>
+              <a:off x="6360278" y="1422711"/>
+              <a:ext cx="253746" cy="369332"/>
+            </a:xfrm>
+            <a:prstGeom prst="rect">
+              <a:avLst/>
+            </a:prstGeom>
+            <a:noFill/>
+          </p:spPr>
+          <p:txBody>
+            <a:bodyPr wrap="square">
+              <a:spAutoFit/>
+            </a:bodyPr>
+            <a:lstStyle/>
+            <a:p>
+              <a:r>
+                <a:rPr lang="en-US" b="1" dirty="0">
+                  <a:solidFill>
+                    <a:schemeClr val="tx1">
+                      <a:alpha val="44000"/>
+                    </a:schemeClr>
+                  </a:solidFill>
+                </a:rPr>
+                <a:t>0</a:t>
+              </a:r>
+              <a:endParaRPr lang="en-GB" dirty="0"/>
+            </a:p>
+          </p:txBody>
+        </p:sp>
+      </p:grpSp>
+      <p:grpSp>
+        <p:nvGrpSpPr>
+          <p:cNvPr id="58" name="Group 57">
+            <a:extLst>
+              <a:ext uri="{FF2B5EF4-FFF2-40B4-BE49-F238E27FC236}">
+                <a16:creationId xmlns:a16="http://schemas.microsoft.com/office/drawing/2014/main" id="{C8FD40BB-E90C-52B1-6391-15ABDAC3F08B}"/>
+              </a:ext>
+            </a:extLst>
+          </p:cNvPr>
+          <p:cNvGrpSpPr/>
+          <p:nvPr/>
+        </p:nvGrpSpPr>
+        <p:grpSpPr>
+          <a:xfrm>
+            <a:off x="6632966" y="3234991"/>
+            <a:ext cx="379379" cy="369332"/>
+            <a:chOff x="6309571" y="1422711"/>
+            <a:chExt cx="379379" cy="369332"/>
+          </a:xfrm>
+        </p:grpSpPr>
+        <p:sp>
+          <p:nvSpPr>
+            <p:cNvPr id="59" name="Rectangle 58">
+              <a:extLst>
+                <a:ext uri="{FF2B5EF4-FFF2-40B4-BE49-F238E27FC236}">
+                  <a16:creationId xmlns:a16="http://schemas.microsoft.com/office/drawing/2014/main" id="{A2BA69F1-85BC-B80D-1F15-E4BF8AF83E7F}"/>
+                </a:ext>
+              </a:extLst>
+            </p:cNvPr>
+            <p:cNvSpPr/>
+            <p:nvPr/>
+          </p:nvSpPr>
+          <p:spPr>
+            <a:xfrm>
+              <a:off x="6309571" y="1422711"/>
+              <a:ext cx="379379" cy="359924"/>
+            </a:xfrm>
+            <a:prstGeom prst="rect">
+              <a:avLst/>
+            </a:prstGeom>
+            <a:noFill/>
+            <a:ln w="19050">
+              <a:solidFill>
+                <a:schemeClr val="accent2">
+                  <a:lumMod val="60000"/>
+                  <a:lumOff val="40000"/>
+                </a:schemeClr>
+              </a:solidFill>
+            </a:ln>
+          </p:spPr>
+          <p:style>
+            <a:lnRef idx="2">
+              <a:schemeClr val="accent2">
+                <a:shade val="15000"/>
+              </a:schemeClr>
+            </a:lnRef>
+            <a:fillRef idx="1">
+              <a:schemeClr val="accent2"/>
+            </a:fillRef>
+            <a:effectRef idx="0">
+              <a:schemeClr val="accent2"/>
+            </a:effectRef>
+            <a:fontRef idx="minor">
+              <a:schemeClr val="lt1"/>
+            </a:fontRef>
+          </p:style>
+          <p:txBody>
+            <a:bodyPr rtlCol="0" anchor="ctr"/>
+            <a:lstStyle/>
+            <a:p>
+              <a:pPr algn="ctr"/>
+              <a:endParaRPr lang="en-GB" sz="1200" dirty="0">
+                <a:solidFill>
+                  <a:schemeClr val="tx1">
+                    <a:alpha val="16000"/>
+                  </a:schemeClr>
+                </a:solidFill>
+              </a:endParaRPr>
+            </a:p>
+          </p:txBody>
+        </p:sp>
+        <p:sp>
+          <p:nvSpPr>
+            <p:cNvPr id="60" name="TextBox 59">
+              <a:extLst>
+                <a:ext uri="{FF2B5EF4-FFF2-40B4-BE49-F238E27FC236}">
+                  <a16:creationId xmlns:a16="http://schemas.microsoft.com/office/drawing/2014/main" id="{50B82765-85AF-B67E-30EE-B1D2A0D40960}"/>
+                </a:ext>
+              </a:extLst>
+            </p:cNvPr>
+            <p:cNvSpPr txBox="1"/>
+            <p:nvPr/>
+          </p:nvSpPr>
+          <p:spPr>
+            <a:xfrm>
+              <a:off x="6360278" y="1422711"/>
+              <a:ext cx="253746" cy="369332"/>
+            </a:xfrm>
+            <a:prstGeom prst="rect">
+              <a:avLst/>
+            </a:prstGeom>
+            <a:noFill/>
+          </p:spPr>
+          <p:txBody>
+            <a:bodyPr wrap="square">
+              <a:spAutoFit/>
+            </a:bodyPr>
+            <a:lstStyle/>
+            <a:p>
+              <a:r>
+                <a:rPr lang="en-US" b="1" dirty="0">
+                  <a:solidFill>
+                    <a:schemeClr val="tx1">
+                      <a:alpha val="44000"/>
+                    </a:schemeClr>
+                  </a:solidFill>
+                </a:rPr>
+                <a:t>0</a:t>
+              </a:r>
+              <a:endParaRPr lang="en-GB" dirty="0"/>
+            </a:p>
+          </p:txBody>
+        </p:sp>
+      </p:grpSp>
+      <p:grpSp>
+        <p:nvGrpSpPr>
+          <p:cNvPr id="61" name="Group 60">
+            <a:extLst>
+              <a:ext uri="{FF2B5EF4-FFF2-40B4-BE49-F238E27FC236}">
+                <a16:creationId xmlns:a16="http://schemas.microsoft.com/office/drawing/2014/main" id="{035FAF2C-D939-DDFA-E485-4B0A820470BE}"/>
+              </a:ext>
+            </a:extLst>
+          </p:cNvPr>
+          <p:cNvGrpSpPr/>
+          <p:nvPr/>
+        </p:nvGrpSpPr>
+        <p:grpSpPr>
+          <a:xfrm>
+            <a:off x="7357753" y="3234991"/>
+            <a:ext cx="379379" cy="369332"/>
+            <a:chOff x="6309571" y="1422711"/>
+            <a:chExt cx="379379" cy="369332"/>
+          </a:xfrm>
+        </p:grpSpPr>
+        <p:sp>
+          <p:nvSpPr>
+            <p:cNvPr id="62" name="Rectangle 61">
+              <a:extLst>
+                <a:ext uri="{FF2B5EF4-FFF2-40B4-BE49-F238E27FC236}">
+                  <a16:creationId xmlns:a16="http://schemas.microsoft.com/office/drawing/2014/main" id="{5D50A1CD-A471-D864-566A-75BD948AE061}"/>
+                </a:ext>
+              </a:extLst>
+            </p:cNvPr>
+            <p:cNvSpPr/>
+            <p:nvPr/>
+          </p:nvSpPr>
+          <p:spPr>
+            <a:xfrm>
+              <a:off x="6309571" y="1422711"/>
+              <a:ext cx="379379" cy="359924"/>
+            </a:xfrm>
+            <a:prstGeom prst="rect">
+              <a:avLst/>
+            </a:prstGeom>
+            <a:noFill/>
+            <a:ln w="19050">
+              <a:solidFill>
+                <a:schemeClr val="accent2">
+                  <a:lumMod val="60000"/>
+                  <a:lumOff val="40000"/>
+                </a:schemeClr>
+              </a:solidFill>
+            </a:ln>
+          </p:spPr>
+          <p:style>
+            <a:lnRef idx="2">
+              <a:schemeClr val="accent2">
+                <a:shade val="15000"/>
+              </a:schemeClr>
+            </a:lnRef>
+            <a:fillRef idx="1">
+              <a:schemeClr val="accent2"/>
+            </a:fillRef>
+            <a:effectRef idx="0">
+              <a:schemeClr val="accent2"/>
+            </a:effectRef>
+            <a:fontRef idx="minor">
+              <a:schemeClr val="lt1"/>
+            </a:fontRef>
+          </p:style>
+          <p:txBody>
+            <a:bodyPr rtlCol="0" anchor="ctr"/>
+            <a:lstStyle/>
+            <a:p>
+              <a:pPr algn="ctr"/>
+              <a:endParaRPr lang="en-GB" sz="1200" dirty="0">
+                <a:solidFill>
+                  <a:schemeClr val="tx1">
+                    <a:alpha val="16000"/>
+                  </a:schemeClr>
+                </a:solidFill>
+              </a:endParaRPr>
+            </a:p>
+          </p:txBody>
+        </p:sp>
+        <p:sp>
+          <p:nvSpPr>
+            <p:cNvPr id="63" name="TextBox 62">
+              <a:extLst>
+                <a:ext uri="{FF2B5EF4-FFF2-40B4-BE49-F238E27FC236}">
+                  <a16:creationId xmlns:a16="http://schemas.microsoft.com/office/drawing/2014/main" id="{E9599E8B-451A-29BE-6E4A-7C278951E670}"/>
+                </a:ext>
+              </a:extLst>
+            </p:cNvPr>
+            <p:cNvSpPr txBox="1"/>
+            <p:nvPr/>
+          </p:nvSpPr>
+          <p:spPr>
+            <a:xfrm>
+              <a:off x="6360278" y="1422711"/>
+              <a:ext cx="253746" cy="369332"/>
+            </a:xfrm>
+            <a:prstGeom prst="rect">
+              <a:avLst/>
+            </a:prstGeom>
+            <a:noFill/>
+          </p:spPr>
+          <p:txBody>
+            <a:bodyPr wrap="square">
+              <a:spAutoFit/>
+            </a:bodyPr>
+            <a:lstStyle/>
+            <a:p>
+              <a:r>
+                <a:rPr lang="en-US" b="1" dirty="0">
+                  <a:solidFill>
+                    <a:schemeClr val="tx1">
+                      <a:alpha val="44000"/>
+                    </a:schemeClr>
+                  </a:solidFill>
+                </a:rPr>
+                <a:t>1</a:t>
+              </a:r>
+              <a:endParaRPr lang="en-GB" dirty="0"/>
+            </a:p>
+          </p:txBody>
+        </p:sp>
+      </p:grpSp>
+      <p:grpSp>
+        <p:nvGrpSpPr>
+          <p:cNvPr id="64" name="Group 63">
+            <a:extLst>
+              <a:ext uri="{FF2B5EF4-FFF2-40B4-BE49-F238E27FC236}">
+                <a16:creationId xmlns:a16="http://schemas.microsoft.com/office/drawing/2014/main" id="{2F5C1BA0-893C-01D7-F62F-F4B35ABD93F2}"/>
+              </a:ext>
+            </a:extLst>
+          </p:cNvPr>
+          <p:cNvGrpSpPr/>
+          <p:nvPr/>
+        </p:nvGrpSpPr>
+        <p:grpSpPr>
+          <a:xfrm>
+            <a:off x="7737132" y="3234991"/>
+            <a:ext cx="379379" cy="369332"/>
+            <a:chOff x="6309571" y="1422711"/>
+            <a:chExt cx="379379" cy="369332"/>
+          </a:xfrm>
+        </p:grpSpPr>
+        <p:sp>
+          <p:nvSpPr>
+            <p:cNvPr id="65" name="Rectangle 64">
+              <a:extLst>
+                <a:ext uri="{FF2B5EF4-FFF2-40B4-BE49-F238E27FC236}">
+                  <a16:creationId xmlns:a16="http://schemas.microsoft.com/office/drawing/2014/main" id="{A3AB3DA2-E92C-F028-D671-12F1118341EF}"/>
+                </a:ext>
+              </a:extLst>
+            </p:cNvPr>
+            <p:cNvSpPr/>
+            <p:nvPr/>
+          </p:nvSpPr>
+          <p:spPr>
+            <a:xfrm>
+              <a:off x="6309571" y="1422711"/>
+              <a:ext cx="379379" cy="359924"/>
+            </a:xfrm>
+            <a:prstGeom prst="rect">
+              <a:avLst/>
+            </a:prstGeom>
+            <a:noFill/>
+            <a:ln w="19050">
+              <a:solidFill>
+                <a:schemeClr val="accent2">
+                  <a:lumMod val="60000"/>
+                  <a:lumOff val="40000"/>
+                </a:schemeClr>
+              </a:solidFill>
+            </a:ln>
+          </p:spPr>
+          <p:style>
+            <a:lnRef idx="2">
+              <a:schemeClr val="accent2">
+                <a:shade val="15000"/>
+              </a:schemeClr>
+            </a:lnRef>
+            <a:fillRef idx="1">
+              <a:schemeClr val="accent2"/>
+            </a:fillRef>
+            <a:effectRef idx="0">
+              <a:schemeClr val="accent2"/>
+            </a:effectRef>
+            <a:fontRef idx="minor">
+              <a:schemeClr val="lt1"/>
+            </a:fontRef>
+          </p:style>
+          <p:txBody>
+            <a:bodyPr rtlCol="0" anchor="ctr"/>
+            <a:lstStyle/>
+            <a:p>
+              <a:pPr algn="ctr"/>
+              <a:endParaRPr lang="en-GB" sz="1200" dirty="0">
+                <a:solidFill>
+                  <a:schemeClr val="tx1">
+                    <a:alpha val="16000"/>
+                  </a:schemeClr>
+                </a:solidFill>
+              </a:endParaRPr>
+            </a:p>
+          </p:txBody>
+        </p:sp>
+        <p:sp>
+          <p:nvSpPr>
+            <p:cNvPr id="66" name="TextBox 65">
+              <a:extLst>
+                <a:ext uri="{FF2B5EF4-FFF2-40B4-BE49-F238E27FC236}">
+                  <a16:creationId xmlns:a16="http://schemas.microsoft.com/office/drawing/2014/main" id="{E46A9AF1-718E-DE74-5F76-6D67D86B74B6}"/>
+                </a:ext>
+              </a:extLst>
+            </p:cNvPr>
+            <p:cNvSpPr txBox="1"/>
+            <p:nvPr/>
+          </p:nvSpPr>
+          <p:spPr>
+            <a:xfrm>
+              <a:off x="6360278" y="1422711"/>
+              <a:ext cx="253746" cy="369332"/>
+            </a:xfrm>
+            <a:prstGeom prst="rect">
+              <a:avLst/>
+            </a:prstGeom>
+            <a:noFill/>
+          </p:spPr>
+          <p:txBody>
+            <a:bodyPr wrap="square">
+              <a:spAutoFit/>
+            </a:bodyPr>
+            <a:lstStyle/>
+            <a:p>
+              <a:r>
+                <a:rPr lang="en-US" b="1" dirty="0">
+                  <a:solidFill>
+                    <a:schemeClr val="tx1">
+                      <a:alpha val="44000"/>
+                    </a:schemeClr>
+                  </a:solidFill>
+                </a:rPr>
+                <a:t>0</a:t>
+              </a:r>
+              <a:endParaRPr lang="en-GB" dirty="0"/>
+            </a:p>
+          </p:txBody>
+        </p:sp>
+      </p:grpSp>
+      <p:grpSp>
+        <p:nvGrpSpPr>
+          <p:cNvPr id="67" name="Group 66">
+            <a:extLst>
+              <a:ext uri="{FF2B5EF4-FFF2-40B4-BE49-F238E27FC236}">
+                <a16:creationId xmlns:a16="http://schemas.microsoft.com/office/drawing/2014/main" id="{F5C59F27-D979-04D9-4C86-6A03727CF23A}"/>
+              </a:ext>
+            </a:extLst>
+          </p:cNvPr>
+          <p:cNvGrpSpPr/>
+          <p:nvPr/>
+        </p:nvGrpSpPr>
+        <p:grpSpPr>
+          <a:xfrm>
+            <a:off x="8114554" y="3234991"/>
+            <a:ext cx="379379" cy="369332"/>
+            <a:chOff x="6309571" y="1422711"/>
+            <a:chExt cx="379379" cy="369332"/>
+          </a:xfrm>
+        </p:grpSpPr>
+        <p:sp>
+          <p:nvSpPr>
+            <p:cNvPr id="68" name="Rectangle 67">
+              <a:extLst>
+                <a:ext uri="{FF2B5EF4-FFF2-40B4-BE49-F238E27FC236}">
+                  <a16:creationId xmlns:a16="http://schemas.microsoft.com/office/drawing/2014/main" id="{A748057A-775B-F705-D2B6-33CA648C903E}"/>
+                </a:ext>
+              </a:extLst>
+            </p:cNvPr>
+            <p:cNvSpPr/>
+            <p:nvPr/>
+          </p:nvSpPr>
+          <p:spPr>
+            <a:xfrm>
+              <a:off x="6309571" y="1422711"/>
+              <a:ext cx="379379" cy="359924"/>
+            </a:xfrm>
+            <a:prstGeom prst="rect">
+              <a:avLst/>
+            </a:prstGeom>
+            <a:noFill/>
+            <a:ln w="19050">
+              <a:solidFill>
+                <a:schemeClr val="accent2">
+                  <a:lumMod val="60000"/>
+                  <a:lumOff val="40000"/>
+                </a:schemeClr>
+              </a:solidFill>
+            </a:ln>
+          </p:spPr>
+          <p:style>
+            <a:lnRef idx="2">
+              <a:schemeClr val="accent2">
+                <a:shade val="15000"/>
+              </a:schemeClr>
+            </a:lnRef>
+            <a:fillRef idx="1">
+              <a:schemeClr val="accent2"/>
+            </a:fillRef>
+            <a:effectRef idx="0">
+              <a:schemeClr val="accent2"/>
+            </a:effectRef>
+            <a:fontRef idx="minor">
+              <a:schemeClr val="lt1"/>
+            </a:fontRef>
+          </p:style>
+          <p:txBody>
+            <a:bodyPr rtlCol="0" anchor="ctr"/>
+            <a:lstStyle/>
+            <a:p>
+              <a:pPr algn="ctr"/>
+              <a:endParaRPr lang="en-GB" sz="1200" dirty="0">
+                <a:solidFill>
+                  <a:schemeClr val="tx1">
+                    <a:alpha val="16000"/>
+                  </a:schemeClr>
+                </a:solidFill>
+              </a:endParaRPr>
+            </a:p>
+          </p:txBody>
+        </p:sp>
+        <p:sp>
+          <p:nvSpPr>
+            <p:cNvPr id="69" name="TextBox 68">
+              <a:extLst>
+                <a:ext uri="{FF2B5EF4-FFF2-40B4-BE49-F238E27FC236}">
+                  <a16:creationId xmlns:a16="http://schemas.microsoft.com/office/drawing/2014/main" id="{D8F624E4-6A7F-0B2B-3057-F3FE605CADB5}"/>
+                </a:ext>
+              </a:extLst>
+            </p:cNvPr>
+            <p:cNvSpPr txBox="1"/>
+            <p:nvPr/>
+          </p:nvSpPr>
+          <p:spPr>
+            <a:xfrm>
+              <a:off x="6360278" y="1422711"/>
+              <a:ext cx="253746" cy="369332"/>
+            </a:xfrm>
+            <a:prstGeom prst="rect">
+              <a:avLst/>
+            </a:prstGeom>
+            <a:noFill/>
+          </p:spPr>
+          <p:txBody>
+            <a:bodyPr wrap="square">
+              <a:spAutoFit/>
+            </a:bodyPr>
+            <a:lstStyle/>
+            <a:p>
+              <a:r>
+                <a:rPr lang="en-US" b="1" dirty="0">
+                  <a:solidFill>
+                    <a:schemeClr val="tx1">
+                      <a:alpha val="44000"/>
+                    </a:schemeClr>
+                  </a:solidFill>
+                </a:rPr>
+                <a:t>1</a:t>
+              </a:r>
+              <a:endParaRPr lang="en-GB" dirty="0"/>
+            </a:p>
+          </p:txBody>
+        </p:sp>
+      </p:grpSp>
+      <p:grpSp>
+        <p:nvGrpSpPr>
+          <p:cNvPr id="70" name="Group 69">
+            <a:extLst>
+              <a:ext uri="{FF2B5EF4-FFF2-40B4-BE49-F238E27FC236}">
+                <a16:creationId xmlns:a16="http://schemas.microsoft.com/office/drawing/2014/main" id="{63425E32-9BE1-1977-FA11-5A11C9E23EC7}"/>
+              </a:ext>
+            </a:extLst>
+          </p:cNvPr>
+          <p:cNvGrpSpPr/>
+          <p:nvPr/>
+        </p:nvGrpSpPr>
+        <p:grpSpPr>
+          <a:xfrm>
+            <a:off x="8493933" y="3234991"/>
+            <a:ext cx="379379" cy="369332"/>
+            <a:chOff x="6309571" y="1422711"/>
+            <a:chExt cx="379379" cy="369332"/>
+          </a:xfrm>
+        </p:grpSpPr>
+        <p:sp>
+          <p:nvSpPr>
+            <p:cNvPr id="71" name="Rectangle 70">
+              <a:extLst>
+                <a:ext uri="{FF2B5EF4-FFF2-40B4-BE49-F238E27FC236}">
+                  <a16:creationId xmlns:a16="http://schemas.microsoft.com/office/drawing/2014/main" id="{A1543095-8981-3B92-2450-4AEE2639494A}"/>
+                </a:ext>
+              </a:extLst>
+            </p:cNvPr>
+            <p:cNvSpPr/>
+            <p:nvPr/>
+          </p:nvSpPr>
+          <p:spPr>
+            <a:xfrm>
+              <a:off x="6309571" y="1422711"/>
+              <a:ext cx="379379" cy="359924"/>
+            </a:xfrm>
+            <a:prstGeom prst="rect">
+              <a:avLst/>
+            </a:prstGeom>
+            <a:noFill/>
+            <a:ln w="19050">
+              <a:solidFill>
+                <a:schemeClr val="accent2">
+                  <a:lumMod val="60000"/>
+                  <a:lumOff val="40000"/>
+                </a:schemeClr>
+              </a:solidFill>
+            </a:ln>
+          </p:spPr>
+          <p:style>
+            <a:lnRef idx="2">
+              <a:schemeClr val="accent2">
+                <a:shade val="15000"/>
+              </a:schemeClr>
+            </a:lnRef>
+            <a:fillRef idx="1">
+              <a:schemeClr val="accent2"/>
+            </a:fillRef>
+            <a:effectRef idx="0">
+              <a:schemeClr val="accent2"/>
+            </a:effectRef>
+            <a:fontRef idx="minor">
+              <a:schemeClr val="lt1"/>
+            </a:fontRef>
+          </p:style>
+          <p:txBody>
+            <a:bodyPr rtlCol="0" anchor="ctr"/>
+            <a:lstStyle/>
+            <a:p>
+              <a:pPr algn="ctr"/>
+              <a:endParaRPr lang="en-GB" sz="1200" dirty="0">
+                <a:solidFill>
+                  <a:schemeClr val="tx1">
+                    <a:alpha val="16000"/>
+                  </a:schemeClr>
+                </a:solidFill>
+              </a:endParaRPr>
+            </a:p>
+          </p:txBody>
+        </p:sp>
+        <p:sp>
+          <p:nvSpPr>
+            <p:cNvPr id="72" name="TextBox 71">
+              <a:extLst>
+                <a:ext uri="{FF2B5EF4-FFF2-40B4-BE49-F238E27FC236}">
+                  <a16:creationId xmlns:a16="http://schemas.microsoft.com/office/drawing/2014/main" id="{3885C96F-E8E7-6488-2189-B32458B35C62}"/>
+                </a:ext>
+              </a:extLst>
+            </p:cNvPr>
+            <p:cNvSpPr txBox="1"/>
+            <p:nvPr/>
+          </p:nvSpPr>
+          <p:spPr>
+            <a:xfrm>
+              <a:off x="6360278" y="1422711"/>
+              <a:ext cx="253746" cy="369332"/>
+            </a:xfrm>
+            <a:prstGeom prst="rect">
+              <a:avLst/>
+            </a:prstGeom>
+            <a:noFill/>
+          </p:spPr>
+          <p:txBody>
+            <a:bodyPr wrap="square">
+              <a:spAutoFit/>
+            </a:bodyPr>
+            <a:lstStyle/>
+            <a:p>
+              <a:r>
+                <a:rPr lang="en-US" b="1" dirty="0">
+                  <a:solidFill>
+                    <a:schemeClr val="tx1">
+                      <a:alpha val="44000"/>
+                    </a:schemeClr>
+                  </a:solidFill>
+                </a:rPr>
+                <a:t>0</a:t>
+              </a:r>
+              <a:endParaRPr lang="en-GB" dirty="0"/>
+            </a:p>
+          </p:txBody>
+        </p:sp>
+      </p:grpSp>
+      <p:grpSp>
+        <p:nvGrpSpPr>
+          <p:cNvPr id="73" name="Group 72">
+            <a:extLst>
+              <a:ext uri="{FF2B5EF4-FFF2-40B4-BE49-F238E27FC236}">
+                <a16:creationId xmlns:a16="http://schemas.microsoft.com/office/drawing/2014/main" id="{7146CB83-84CC-ECB1-95DC-1069D8228431}"/>
+              </a:ext>
+            </a:extLst>
+          </p:cNvPr>
+          <p:cNvGrpSpPr/>
+          <p:nvPr/>
+        </p:nvGrpSpPr>
+        <p:grpSpPr>
+          <a:xfrm>
+            <a:off x="6655121" y="4151338"/>
+            <a:ext cx="379379" cy="369332"/>
+            <a:chOff x="7898099" y="1597969"/>
+            <a:chExt cx="379379" cy="369332"/>
+          </a:xfrm>
+        </p:grpSpPr>
+        <p:sp>
+          <p:nvSpPr>
+            <p:cNvPr id="74" name="Rectangle 73">
+              <a:extLst>
+                <a:ext uri="{FF2B5EF4-FFF2-40B4-BE49-F238E27FC236}">
+                  <a16:creationId xmlns:a16="http://schemas.microsoft.com/office/drawing/2014/main" id="{704AB8FB-32CD-C54A-51DC-B114443C4702}"/>
+                </a:ext>
+              </a:extLst>
+            </p:cNvPr>
+            <p:cNvSpPr/>
+            <p:nvPr/>
+          </p:nvSpPr>
+          <p:spPr>
+            <a:xfrm>
+              <a:off x="7898099" y="1597969"/>
+              <a:ext cx="379379" cy="359924"/>
+            </a:xfrm>
+            <a:prstGeom prst="rect">
+              <a:avLst/>
+            </a:prstGeom>
+            <a:noFill/>
+            <a:ln w="19050">
+              <a:solidFill>
+                <a:schemeClr val="accent2">
+                  <a:lumMod val="60000"/>
+                  <a:lumOff val="40000"/>
+                </a:schemeClr>
+              </a:solidFill>
+            </a:ln>
+          </p:spPr>
+          <p:style>
+            <a:lnRef idx="2">
+              <a:schemeClr val="accent2">
+                <a:shade val="15000"/>
+              </a:schemeClr>
+            </a:lnRef>
+            <a:fillRef idx="1">
+              <a:schemeClr val="accent2"/>
+            </a:fillRef>
+            <a:effectRef idx="0">
+              <a:schemeClr val="accent2"/>
+            </a:effectRef>
+            <a:fontRef idx="minor">
+              <a:schemeClr val="lt1"/>
+            </a:fontRef>
+          </p:style>
+          <p:txBody>
+            <a:bodyPr rtlCol="0" anchor="ctr"/>
+            <a:lstStyle/>
+            <a:p>
+              <a:pPr algn="ctr"/>
+              <a:endParaRPr lang="en-GB" sz="1200" dirty="0">
+                <a:solidFill>
+                  <a:schemeClr val="tx1">
+                    <a:alpha val="16000"/>
+                  </a:schemeClr>
+                </a:solidFill>
+              </a:endParaRPr>
+            </a:p>
+          </p:txBody>
+        </p:sp>
+        <p:sp>
+          <p:nvSpPr>
+            <p:cNvPr id="75" name="TextBox 74">
+              <a:extLst>
+                <a:ext uri="{FF2B5EF4-FFF2-40B4-BE49-F238E27FC236}">
+                  <a16:creationId xmlns:a16="http://schemas.microsoft.com/office/drawing/2014/main" id="{F1BA94B4-9D60-A697-E2D3-307568F5A371}"/>
+                </a:ext>
+              </a:extLst>
+            </p:cNvPr>
+            <p:cNvSpPr txBox="1"/>
+            <p:nvPr/>
+          </p:nvSpPr>
+          <p:spPr>
+            <a:xfrm>
+              <a:off x="7948806" y="1597969"/>
+              <a:ext cx="253746" cy="369332"/>
+            </a:xfrm>
+            <a:prstGeom prst="rect">
+              <a:avLst/>
+            </a:prstGeom>
+            <a:noFill/>
+          </p:spPr>
+          <p:txBody>
+            <a:bodyPr wrap="square">
+              <a:spAutoFit/>
+            </a:bodyPr>
+            <a:lstStyle/>
+            <a:p>
+              <a:r>
+                <a:rPr lang="en-US" b="1" dirty="0">
+                  <a:solidFill>
+                    <a:schemeClr val="tx1">
+                      <a:alpha val="44000"/>
+                    </a:schemeClr>
+                  </a:solidFill>
+                </a:rPr>
+                <a:t>9</a:t>
+              </a:r>
+              <a:endParaRPr lang="en-GB" dirty="0"/>
+            </a:p>
+          </p:txBody>
+        </p:sp>
+      </p:grpSp>
+      <p:sp>
+        <p:nvSpPr>
+          <p:cNvPr id="77" name="TextBox 76">
+            <a:extLst>
+              <a:ext uri="{FF2B5EF4-FFF2-40B4-BE49-F238E27FC236}">
+                <a16:creationId xmlns:a16="http://schemas.microsoft.com/office/drawing/2014/main" id="{665BAAC0-766A-37C0-7088-25D10726ED11}"/>
+              </a:ext>
+            </a:extLst>
+          </p:cNvPr>
+          <p:cNvSpPr txBox="1"/>
+          <p:nvPr/>
+        </p:nvSpPr>
+        <p:spPr>
+          <a:xfrm>
+            <a:off x="4618582" y="3244334"/>
+            <a:ext cx="747522" cy="369332"/>
+          </a:xfrm>
+          <a:prstGeom prst="rect">
+            <a:avLst/>
+          </a:prstGeom>
+          <a:noFill/>
+        </p:spPr>
+        <p:txBody>
+          <a:bodyPr wrap="square">
+            <a:spAutoFit/>
+          </a:bodyPr>
+          <a:lstStyle/>
+          <a:p>
+            <a:r>
+              <a:rPr lang="en-GB" dirty="0"/>
+              <a:t>mask</a:t>
+            </a:r>
+          </a:p>
+        </p:txBody>
+      </p:sp>
+      <p:sp>
+        <p:nvSpPr>
+          <p:cNvPr id="78" name="TextBox 77">
+            <a:extLst>
+              <a:ext uri="{FF2B5EF4-FFF2-40B4-BE49-F238E27FC236}">
+                <a16:creationId xmlns:a16="http://schemas.microsoft.com/office/drawing/2014/main" id="{35667B3F-D3E7-1B50-7041-8FE0F0065936}"/>
+              </a:ext>
+            </a:extLst>
+          </p:cNvPr>
+          <p:cNvSpPr txBox="1"/>
+          <p:nvPr/>
+        </p:nvSpPr>
+        <p:spPr>
+          <a:xfrm>
+            <a:off x="4618582" y="4124996"/>
+            <a:ext cx="747522" cy="369332"/>
+          </a:xfrm>
+          <a:prstGeom prst="rect">
+            <a:avLst/>
+          </a:prstGeom>
+          <a:noFill/>
+        </p:spPr>
+        <p:txBody>
+          <a:bodyPr wrap="square">
+            <a:spAutoFit/>
+          </a:bodyPr>
+          <a:lstStyle/>
+          <a:p>
+            <a:r>
+              <a:rPr lang="en-GB" dirty="0" err="1"/>
+              <a:t>vals</a:t>
+            </a:r>
+            <a:endParaRPr lang="en-GB" dirty="0"/>
+          </a:p>
+        </p:txBody>
+      </p:sp>
+      <p:sp>
+        <p:nvSpPr>
+          <p:cNvPr id="87" name="TextBox 86">
+            <a:extLst>
+              <a:ext uri="{FF2B5EF4-FFF2-40B4-BE49-F238E27FC236}">
+                <a16:creationId xmlns:a16="http://schemas.microsoft.com/office/drawing/2014/main" id="{4F0775C5-C44F-AC8D-159A-925AF6EA6921}"/>
+              </a:ext>
+            </a:extLst>
+          </p:cNvPr>
+          <p:cNvSpPr txBox="1"/>
+          <p:nvPr/>
+        </p:nvSpPr>
+        <p:spPr>
+          <a:xfrm>
+            <a:off x="4618582" y="5022592"/>
+            <a:ext cx="747522" cy="369332"/>
+          </a:xfrm>
+          <a:prstGeom prst="rect">
+            <a:avLst/>
+          </a:prstGeom>
+          <a:noFill/>
+        </p:spPr>
+        <p:txBody>
+          <a:bodyPr wrap="square">
+            <a:spAutoFit/>
+          </a:bodyPr>
+          <a:lstStyle/>
+          <a:p>
+            <a:r>
+              <a:rPr lang="en-GB" dirty="0"/>
+              <a:t>offset</a:t>
+            </a:r>
+          </a:p>
+        </p:txBody>
+      </p:sp>
+      <p:grpSp>
+        <p:nvGrpSpPr>
+          <p:cNvPr id="88" name="Group 87">
+            <a:extLst>
+              <a:ext uri="{FF2B5EF4-FFF2-40B4-BE49-F238E27FC236}">
+                <a16:creationId xmlns:a16="http://schemas.microsoft.com/office/drawing/2014/main" id="{2849272D-9424-D9E0-5776-908E5ACE50A4}"/>
+              </a:ext>
+            </a:extLst>
+          </p:cNvPr>
+          <p:cNvGrpSpPr/>
+          <p:nvPr/>
+        </p:nvGrpSpPr>
+        <p:grpSpPr>
+          <a:xfrm>
+            <a:off x="5484676" y="5005658"/>
+            <a:ext cx="379379" cy="369332"/>
+            <a:chOff x="6309571" y="1422711"/>
+            <a:chExt cx="379379" cy="369332"/>
+          </a:xfrm>
+        </p:grpSpPr>
+        <p:sp>
+          <p:nvSpPr>
+            <p:cNvPr id="89" name="Rectangle 88">
+              <a:extLst>
+                <a:ext uri="{FF2B5EF4-FFF2-40B4-BE49-F238E27FC236}">
+                  <a16:creationId xmlns:a16="http://schemas.microsoft.com/office/drawing/2014/main" id="{B1CF5F8E-725D-DDD5-72F3-B954C8B2DFCF}"/>
+                </a:ext>
+              </a:extLst>
+            </p:cNvPr>
+            <p:cNvSpPr/>
+            <p:nvPr/>
+          </p:nvSpPr>
+          <p:spPr>
+            <a:xfrm>
+              <a:off x="6309571" y="1422711"/>
+              <a:ext cx="379379" cy="359924"/>
+            </a:xfrm>
+            <a:prstGeom prst="rect">
+              <a:avLst/>
+            </a:prstGeom>
+            <a:noFill/>
+            <a:ln w="19050">
+              <a:solidFill>
+                <a:schemeClr val="accent2">
+                  <a:lumMod val="60000"/>
+                  <a:lumOff val="40000"/>
+                </a:schemeClr>
+              </a:solidFill>
+            </a:ln>
+          </p:spPr>
+          <p:style>
+            <a:lnRef idx="2">
+              <a:schemeClr val="accent2">
+                <a:shade val="15000"/>
+              </a:schemeClr>
+            </a:lnRef>
+            <a:fillRef idx="1">
+              <a:schemeClr val="accent2"/>
+            </a:fillRef>
+            <a:effectRef idx="0">
+              <a:schemeClr val="accent2"/>
+            </a:effectRef>
+            <a:fontRef idx="minor">
+              <a:schemeClr val="lt1"/>
+            </a:fontRef>
+          </p:style>
+          <p:txBody>
+            <a:bodyPr rtlCol="0" anchor="ctr"/>
+            <a:lstStyle/>
+            <a:p>
+              <a:pPr algn="ctr"/>
+              <a:endParaRPr lang="en-GB" sz="1200" dirty="0">
+                <a:solidFill>
+                  <a:schemeClr val="tx1">
+                    <a:alpha val="16000"/>
+                  </a:schemeClr>
+                </a:solidFill>
+              </a:endParaRPr>
+            </a:p>
+          </p:txBody>
+        </p:sp>
+        <p:sp>
+          <p:nvSpPr>
+            <p:cNvPr id="90" name="TextBox 89">
+              <a:extLst>
+                <a:ext uri="{FF2B5EF4-FFF2-40B4-BE49-F238E27FC236}">
+                  <a16:creationId xmlns:a16="http://schemas.microsoft.com/office/drawing/2014/main" id="{732A9445-8CFA-8FD9-7E87-8300DA31A51A}"/>
+                </a:ext>
+              </a:extLst>
+            </p:cNvPr>
+            <p:cNvSpPr txBox="1"/>
+            <p:nvPr/>
+          </p:nvSpPr>
+          <p:spPr>
+            <a:xfrm>
+              <a:off x="6360278" y="1422711"/>
+              <a:ext cx="253746" cy="369332"/>
+            </a:xfrm>
+            <a:prstGeom prst="rect">
+              <a:avLst/>
+            </a:prstGeom>
+            <a:noFill/>
+          </p:spPr>
+          <p:txBody>
+            <a:bodyPr wrap="square">
+              <a:spAutoFit/>
+            </a:bodyPr>
+            <a:lstStyle/>
+            <a:p>
+              <a:r>
+                <a:rPr lang="en-US" b="1" dirty="0">
+                  <a:solidFill>
+                    <a:schemeClr val="tx1">
+                      <a:alpha val="44000"/>
+                    </a:schemeClr>
+                  </a:solidFill>
+                </a:rPr>
+                <a:t>0</a:t>
+              </a:r>
+              <a:endParaRPr lang="en-GB" dirty="0"/>
+            </a:p>
+          </p:txBody>
+        </p:sp>
+      </p:grpSp>
+      <p:sp>
+        <p:nvSpPr>
+          <p:cNvPr id="93" name="TextBox 92">
+            <a:extLst>
+              <a:ext uri="{FF2B5EF4-FFF2-40B4-BE49-F238E27FC236}">
+                <a16:creationId xmlns:a16="http://schemas.microsoft.com/office/drawing/2014/main" id="{186CFFD3-F8B4-C228-3D48-96674C8CFD36}"/>
+              </a:ext>
+            </a:extLst>
+          </p:cNvPr>
+          <p:cNvSpPr txBox="1"/>
+          <p:nvPr/>
+        </p:nvSpPr>
+        <p:spPr>
+          <a:xfrm>
+            <a:off x="5484676" y="2976398"/>
+            <a:ext cx="3823561" cy="276999"/>
+          </a:xfrm>
+          <a:prstGeom prst="rect">
+            <a:avLst/>
+          </a:prstGeom>
+          <a:noFill/>
+        </p:spPr>
+        <p:txBody>
+          <a:bodyPr wrap="square">
+            <a:spAutoFit/>
+          </a:bodyPr>
+          <a:lstStyle/>
+          <a:p>
+            <a:r>
+              <a:rPr lang="en-US" sz="1200" b="1" dirty="0"/>
+              <a:t>64 bits (uint64_t) showing which indices are in use</a:t>
+            </a:r>
+            <a:endParaRPr lang="en-GB" sz="1200" dirty="0"/>
+          </a:p>
+        </p:txBody>
+      </p:sp>
+      <p:sp>
+        <p:nvSpPr>
+          <p:cNvPr id="94" name="TextBox 93">
+            <a:extLst>
+              <a:ext uri="{FF2B5EF4-FFF2-40B4-BE49-F238E27FC236}">
+                <a16:creationId xmlns:a16="http://schemas.microsoft.com/office/drawing/2014/main" id="{0BEA27B2-E42C-0D15-DF9D-00F346E88ECE}"/>
+              </a:ext>
+            </a:extLst>
+          </p:cNvPr>
+          <p:cNvSpPr txBox="1"/>
+          <p:nvPr/>
+        </p:nvSpPr>
+        <p:spPr>
+          <a:xfrm>
+            <a:off x="5366104" y="5543317"/>
+            <a:ext cx="4280816" cy="276999"/>
+          </a:xfrm>
+          <a:prstGeom prst="rect">
+            <a:avLst/>
+          </a:prstGeom>
+          <a:noFill/>
+        </p:spPr>
+        <p:txBody>
+          <a:bodyPr wrap="square">
+            <a:spAutoFit/>
+          </a:bodyPr>
+          <a:lstStyle/>
+          <a:p>
+            <a:r>
+              <a:rPr lang="en-US" sz="1200" b="1" dirty="0"/>
+              <a:t>The ‘block’ structure </a:t>
+            </a:r>
+            <a:r>
+              <a:rPr lang="en-US" sz="1200" b="1"/>
+              <a:t>: this block </a:t>
+            </a:r>
+            <a:r>
+              <a:rPr lang="en-US" sz="1200" b="1" dirty="0"/>
+              <a:t>represents a[1]=5 and a[3]=9</a:t>
+            </a:r>
+            <a:endParaRPr lang="en-GB" sz="1200" dirty="0"/>
+          </a:p>
+        </p:txBody>
+      </p:sp>
+      <p:sp>
+        <p:nvSpPr>
+          <p:cNvPr id="95" name="TextBox 94">
+            <a:extLst>
+              <a:ext uri="{FF2B5EF4-FFF2-40B4-BE49-F238E27FC236}">
+                <a16:creationId xmlns:a16="http://schemas.microsoft.com/office/drawing/2014/main" id="{B32E45CE-61BB-E60C-BBD2-F906284BA597}"/>
+              </a:ext>
+            </a:extLst>
+          </p:cNvPr>
+          <p:cNvSpPr txBox="1"/>
+          <p:nvPr/>
+        </p:nvSpPr>
+        <p:spPr>
+          <a:xfrm>
+            <a:off x="5442189" y="3862916"/>
+            <a:ext cx="3431123" cy="276999"/>
+          </a:xfrm>
+          <a:prstGeom prst="rect">
+            <a:avLst/>
+          </a:prstGeom>
+          <a:noFill/>
+        </p:spPr>
+        <p:txBody>
+          <a:bodyPr wrap="square">
+            <a:spAutoFit/>
+          </a:bodyPr>
+          <a:lstStyle/>
+          <a:p>
+            <a:r>
+              <a:rPr lang="en-US" sz="1200" b="1" dirty="0" err="1"/>
+              <a:t>realloc’d</a:t>
+            </a:r>
+            <a:r>
+              <a:rPr lang="en-US" sz="1200" b="1" dirty="0"/>
+              <a:t> array of </a:t>
+            </a:r>
+            <a:r>
+              <a:rPr lang="en-US" sz="1200" b="1" dirty="0" err="1"/>
+              <a:t>ints</a:t>
+            </a:r>
+            <a:r>
+              <a:rPr lang="en-US" sz="1200" b="1" dirty="0"/>
+              <a:t> containing array values</a:t>
+            </a:r>
+            <a:endParaRPr lang="en-GB" sz="1200" dirty="0"/>
+          </a:p>
+        </p:txBody>
+      </p:sp>
+      <p:sp>
+        <p:nvSpPr>
+          <p:cNvPr id="96" name="TextBox 95">
+            <a:extLst>
+              <a:ext uri="{FF2B5EF4-FFF2-40B4-BE49-F238E27FC236}">
+                <a16:creationId xmlns:a16="http://schemas.microsoft.com/office/drawing/2014/main" id="{DFEFCA74-8C16-F1DB-6601-143E8400D186}"/>
+              </a:ext>
+            </a:extLst>
+          </p:cNvPr>
+          <p:cNvSpPr txBox="1"/>
+          <p:nvPr/>
+        </p:nvSpPr>
+        <p:spPr>
+          <a:xfrm>
+            <a:off x="5420034" y="4741823"/>
+            <a:ext cx="2864430" cy="276999"/>
+          </a:xfrm>
+          <a:prstGeom prst="rect">
+            <a:avLst/>
+          </a:prstGeom>
+          <a:noFill/>
+        </p:spPr>
+        <p:txBody>
+          <a:bodyPr wrap="square">
+            <a:spAutoFit/>
+          </a:bodyPr>
+          <a:lstStyle/>
+          <a:p>
+            <a:r>
+              <a:rPr lang="en-US" sz="1200" b="1" dirty="0"/>
+              <a:t>integer showing offset to start of indices </a:t>
+            </a:r>
+            <a:endParaRPr lang="en-GB" sz="1200" dirty="0"/>
           </a:p>
         </p:txBody>
       </p:sp>

</xml_diff>